<commit_message>
big update! I think I figured out the forward pumping scheme :)
</commit_message>
<xml_diff>
--- a/memo.pptx
+++ b/memo.pptx
@@ -8,8 +8,8 @@
     <p:notesMasterId r:id="rId4"/>
   </p:notesMasterIdLst>
   <p:sldIdLst>
-    <p:sldId id="256" r:id="rId2"/>
-    <p:sldId id="257" r:id="rId3"/>
+    <p:sldId id="257" r:id="rId2"/>
+    <p:sldId id="258" r:id="rId3"/>
   </p:sldIdLst>
   <p:sldSz cx="12192000" cy="6858000"/>
   <p:notesSz cx="6858000" cy="9144000"/>
@@ -114,14 +114,6 @@
     </p:ext>
   </p:extLst>
 </p:presentation>
-</file>
-
-<file path=ppt/revisionInfo.xml><?xml version="1.0" encoding="utf-8"?>
-<p1510:revInfo xmlns:a="http://schemas.openxmlformats.org/drawingml/2006/main" xmlns:r="http://schemas.openxmlformats.org/officeDocument/2006/relationships" xmlns:p1510="http://schemas.microsoft.com/office/powerpoint/2015/10/main">
-  <p1510:revLst>
-    <p1510:client id="{EF1C0421-524F-4D34-ADB9-CE3E7E078A65}" v="485" dt="2022-12-02T17:02:37.943"/>
-  </p1510:revLst>
-</p1510:revInfo>
 </file>
 
 <file path=ppt/notesMasters/notesMaster1.xml><?xml version="1.0" encoding="utf-8"?>
@@ -538,7 +530,7 @@
           <a:p>
             <a:fld id="{F5C2B940-AEEC-CC41-A09A-F2DDC7CCAC30}" type="slidenum">
               <a:rPr lang="en-US" smtClean="0"/>
-              <a:t>2</a:t>
+              <a:t>1</a:t>
             </a:fld>
             <a:endParaRPr lang="en-US"/>
           </a:p>
@@ -4251,115 +4243,6 @@
           <a:chExt cx="0" cy="0"/>
         </a:xfrm>
       </p:grpSpPr>
-      <p:sp>
-        <p:nvSpPr>
-          <p:cNvPr id="2" name="Title 1">
-            <a:extLst>
-              <a:ext uri="{FF2B5EF4-FFF2-40B4-BE49-F238E27FC236}">
-                <a16:creationId xmlns:a16="http://schemas.microsoft.com/office/drawing/2014/main" id="{7B474532-7D40-E185-7C03-FB16CEA89356}"/>
-              </a:ext>
-            </a:extLst>
-          </p:cNvPr>
-          <p:cNvSpPr>
-            <a:spLocks noGrp="1"/>
-          </p:cNvSpPr>
-          <p:nvPr>
-            <p:ph type="ctrTitle"/>
-          </p:nvPr>
-        </p:nvSpPr>
-        <p:spPr/>
-        <p:txBody>
-          <a:bodyPr/>
-          <a:lstStyle/>
-          <a:p>
-            <a:endParaRPr lang="en-US"/>
-          </a:p>
-        </p:txBody>
-      </p:sp>
-      <p:sp>
-        <p:nvSpPr>
-          <p:cNvPr id="3" name="Subtitle 2">
-            <a:extLst>
-              <a:ext uri="{FF2B5EF4-FFF2-40B4-BE49-F238E27FC236}">
-                <a16:creationId xmlns:a16="http://schemas.microsoft.com/office/drawing/2014/main" id="{7FDE080B-CB73-DBC9-3B30-9990289A5CED}"/>
-              </a:ext>
-            </a:extLst>
-          </p:cNvPr>
-          <p:cNvSpPr>
-            <a:spLocks noGrp="1"/>
-          </p:cNvSpPr>
-          <p:nvPr>
-            <p:ph type="subTitle" idx="1"/>
-          </p:nvPr>
-        </p:nvSpPr>
-        <p:spPr/>
-        <p:txBody>
-          <a:bodyPr/>
-          <a:lstStyle/>
-          <a:p>
-            <a:endParaRPr lang="en-US"/>
-          </a:p>
-        </p:txBody>
-      </p:sp>
-      <p:sp>
-        <p:nvSpPr>
-          <p:cNvPr id="4" name="Slide Number Placeholder 3">
-            <a:extLst>
-              <a:ext uri="{FF2B5EF4-FFF2-40B4-BE49-F238E27FC236}">
-                <a16:creationId xmlns:a16="http://schemas.microsoft.com/office/drawing/2014/main" id="{A3EABC5E-8ABB-A541-75FA-9A2BA7DC9A8C}"/>
-              </a:ext>
-            </a:extLst>
-          </p:cNvPr>
-          <p:cNvSpPr>
-            <a:spLocks noGrp="1"/>
-          </p:cNvSpPr>
-          <p:nvPr>
-            <p:ph type="sldNum" sz="quarter" idx="12"/>
-          </p:nvPr>
-        </p:nvSpPr>
-        <p:spPr/>
-        <p:txBody>
-          <a:bodyPr/>
-          <a:lstStyle/>
-          <a:p>
-            <a:fld id="{B9982081-D51A-40C8-8A41-6498517A0DD4}" type="slidenum">
-              <a:rPr lang="en-US" smtClean="0"/>
-              <a:t>1</a:t>
-            </a:fld>
-            <a:endParaRPr lang="en-US"/>
-          </a:p>
-        </p:txBody>
-      </p:sp>
-    </p:spTree>
-    <p:extLst>
-      <p:ext uri="{BB962C8B-B14F-4D97-AF65-F5344CB8AC3E}">
-        <p14:creationId xmlns:p14="http://schemas.microsoft.com/office/powerpoint/2010/main" val="1565768309"/>
-      </p:ext>
-    </p:extLst>
-  </p:cSld>
-  <p:clrMapOvr>
-    <a:masterClrMapping/>
-  </p:clrMapOvr>
-</p:sld>
-</file>
-
-<file path=ppt/slides/slide2.xml><?xml version="1.0" encoding="utf-8"?>
-<p:sld xmlns:a="http://schemas.openxmlformats.org/drawingml/2006/main" xmlns:r="http://schemas.openxmlformats.org/officeDocument/2006/relationships" xmlns:p="http://schemas.openxmlformats.org/presentationml/2006/main">
-  <p:cSld>
-    <p:spTree>
-      <p:nvGrpSpPr>
-        <p:cNvPr id="1" name=""/>
-        <p:cNvGrpSpPr/>
-        <p:nvPr/>
-      </p:nvGrpSpPr>
-      <p:grpSpPr>
-        <a:xfrm>
-          <a:off x="0" y="0"/>
-          <a:ext cx="0" cy="0"/>
-          <a:chOff x="0" y="0"/>
-          <a:chExt cx="0" cy="0"/>
-        </a:xfrm>
-      </p:grpSpPr>
       <p:grpSp>
         <p:nvGrpSpPr>
           <p:cNvPr id="15" name="Group 14">
@@ -4487,7 +4370,7 @@
             </p:nvSpPr>
             <p:spPr>
               <a:xfrm>
-                <a:off x="554845" y="5171496"/>
+                <a:off x="155453" y="4361044"/>
                 <a:ext cx="2937599" cy="369332"/>
               </a:xfrm>
               <a:prstGeom prst="rect">
@@ -4641,7 +4524,7 @@
             </p:nvSpPr>
             <p:spPr>
               <a:xfrm>
-                <a:off x="554845" y="5171496"/>
+                <a:off x="155453" y="4361044"/>
                 <a:ext cx="2937599" cy="369332"/>
               </a:xfrm>
               <a:prstGeom prst="rect">
@@ -4685,7 +4568,7 @@
             </p:nvSpPr>
             <p:spPr>
               <a:xfrm>
-                <a:off x="737170" y="5540828"/>
+                <a:off x="155453" y="5166522"/>
                 <a:ext cx="2572948" cy="369332"/>
               </a:xfrm>
               <a:prstGeom prst="rect">
@@ -4810,7 +4693,7 @@
             </p:nvSpPr>
             <p:spPr>
               <a:xfrm>
-                <a:off x="737170" y="5540828"/>
+                <a:off x="155453" y="5166522"/>
                 <a:ext cx="2572948" cy="369332"/>
               </a:xfrm>
               <a:prstGeom prst="rect">
@@ -4819,7 +4702,7 @@
               <a:blipFill>
                 <a:blip r:embed="rId7"/>
                 <a:stretch>
-                  <a:fillRect b="-13333"/>
+                  <a:fillRect b="-17241"/>
                 </a:stretch>
               </a:blipFill>
             </p:spPr>
@@ -4838,10 +4721,360 @@
           </p:sp>
         </mc:Fallback>
       </mc:AlternateContent>
+      <p:sp>
+        <p:nvSpPr>
+          <p:cNvPr id="3" name="Title 2">
+            <a:extLst>
+              <a:ext uri="{FF2B5EF4-FFF2-40B4-BE49-F238E27FC236}">
+                <a16:creationId xmlns:a16="http://schemas.microsoft.com/office/drawing/2014/main" id="{ACEF141C-0841-6FF1-F298-B2410B535613}"/>
+              </a:ext>
+            </a:extLst>
+          </p:cNvPr>
+          <p:cNvSpPr>
+            <a:spLocks noGrp="1"/>
+          </p:cNvSpPr>
+          <p:nvPr>
+            <p:ph type="title"/>
+          </p:nvPr>
+        </p:nvSpPr>
+        <p:spPr/>
+        <p:txBody>
+          <a:bodyPr/>
+          <a:lstStyle/>
+          <a:p>
+            <a:r>
+              <a:rPr lang="en-US" dirty="0"/>
+              <a:t>Input Parameters</a:t>
+            </a:r>
+          </a:p>
+        </p:txBody>
+      </p:sp>
+      <p:sp>
+        <p:nvSpPr>
+          <p:cNvPr id="4" name="TextBox 3">
+            <a:extLst>
+              <a:ext uri="{FF2B5EF4-FFF2-40B4-BE49-F238E27FC236}">
+                <a16:creationId xmlns:a16="http://schemas.microsoft.com/office/drawing/2014/main" id="{2261289E-D5DA-619B-CA7E-884384736713}"/>
+              </a:ext>
+            </a:extLst>
+          </p:cNvPr>
+          <p:cNvSpPr txBox="1"/>
+          <p:nvPr/>
+        </p:nvSpPr>
+        <p:spPr>
+          <a:xfrm>
+            <a:off x="330069" y="4763783"/>
+            <a:ext cx="779572" cy="369332"/>
+          </a:xfrm>
+          <a:prstGeom prst="rect">
+            <a:avLst/>
+          </a:prstGeom>
+          <a:noFill/>
+        </p:spPr>
+        <p:txBody>
+          <a:bodyPr wrap="none" rtlCol="0">
+            <a:spAutoFit/>
+          </a:bodyPr>
+          <a:lstStyle/>
+          <a:p>
+            <a:r>
+              <a:rPr lang="en-US" dirty="0"/>
+              <a:t>where</a:t>
+            </a:r>
+          </a:p>
+        </p:txBody>
+      </p:sp>
+      <p:sp>
+        <p:nvSpPr>
+          <p:cNvPr id="7" name="TextBox 6">
+            <a:extLst>
+              <a:ext uri="{FF2B5EF4-FFF2-40B4-BE49-F238E27FC236}">
+                <a16:creationId xmlns:a16="http://schemas.microsoft.com/office/drawing/2014/main" id="{1BC8FF01-F482-AE89-9724-8665C9177A0D}"/>
+              </a:ext>
+            </a:extLst>
+          </p:cNvPr>
+          <p:cNvSpPr txBox="1"/>
+          <p:nvPr/>
+        </p:nvSpPr>
+        <p:spPr>
+          <a:xfrm>
+            <a:off x="9238593" y="4545710"/>
+            <a:ext cx="2228880" cy="369332"/>
+          </a:xfrm>
+          <a:prstGeom prst="rect">
+            <a:avLst/>
+          </a:prstGeom>
+          <a:noFill/>
+        </p:spPr>
+        <p:txBody>
+          <a:bodyPr wrap="none" rtlCol="0">
+            <a:spAutoFit/>
+          </a:bodyPr>
+          <a:lstStyle/>
+          <a:p>
+            <a:r>
+              <a:rPr lang="en-US" dirty="0"/>
+              <a:t>GVD for ER 110 4/125</a:t>
+            </a:r>
+          </a:p>
+        </p:txBody>
+      </p:sp>
     </p:spTree>
     <p:extLst>
       <p:ext uri="{BB962C8B-B14F-4D97-AF65-F5344CB8AC3E}">
         <p14:creationId xmlns:p14="http://schemas.microsoft.com/office/powerpoint/2010/main" val="2670367059"/>
+      </p:ext>
+    </p:extLst>
+  </p:cSld>
+  <p:clrMapOvr>
+    <a:masterClrMapping/>
+  </p:clrMapOvr>
+</p:sld>
+</file>
+
+<file path=ppt/slides/slide2.xml><?xml version="1.0" encoding="utf-8"?>
+<p:sld xmlns:a="http://schemas.openxmlformats.org/drawingml/2006/main" xmlns:r="http://schemas.openxmlformats.org/officeDocument/2006/relationships" xmlns:p="http://schemas.openxmlformats.org/presentationml/2006/main">
+  <p:cSld>
+    <p:spTree>
+      <p:nvGrpSpPr>
+        <p:cNvPr id="1" name=""/>
+        <p:cNvGrpSpPr/>
+        <p:nvPr/>
+      </p:nvGrpSpPr>
+      <p:grpSpPr>
+        <a:xfrm>
+          <a:off x="0" y="0"/>
+          <a:ext cx="0" cy="0"/>
+          <a:chOff x="0" y="0"/>
+          <a:chExt cx="0" cy="0"/>
+        </a:xfrm>
+      </p:grpSpPr>
+      <mc:AlternateContent xmlns:mc="http://schemas.openxmlformats.org/markup-compatibility/2006">
+        <mc:Choice xmlns:a14="http://schemas.microsoft.com/office/drawing/2010/main" Requires="a14">
+          <p:sp>
+            <p:nvSpPr>
+              <p:cNvPr id="2" name="Title 1">
+                <a:extLst>
+                  <a:ext uri="{FF2B5EF4-FFF2-40B4-BE49-F238E27FC236}">
+                    <a16:creationId xmlns:a16="http://schemas.microsoft.com/office/drawing/2014/main" id="{37B87062-235E-A840-D0E8-FEFA6CFA6C69}"/>
+                  </a:ext>
+                </a:extLst>
+              </p:cNvPr>
+              <p:cNvSpPr>
+                <a:spLocks noGrp="1"/>
+              </p:cNvSpPr>
+              <p:nvPr>
+                <p:ph type="title"/>
+              </p:nvPr>
+            </p:nvSpPr>
+            <p:spPr/>
+            <p:txBody>
+              <a:bodyPr>
+                <a:normAutofit/>
+              </a:bodyPr>
+              <a:lstStyle/>
+              <a:p>
+                <a:r>
+                  <a:rPr lang="en-US" dirty="0"/>
+                  <a:t>Simulation for no change in gain along </a:t>
+                </a:r>
+                <a14:m>
+                  <m:oMath xmlns:m="http://schemas.openxmlformats.org/officeDocument/2006/math">
+                    <m:r>
+                      <a:rPr lang="en-US" b="0" i="1" smtClean="0">
+                        <a:latin typeface="Cambria Math" panose="02040503050406030204" pitchFamily="18" charset="0"/>
+                      </a:rPr>
+                      <m:t>𝑧</m:t>
+                    </m:r>
+                  </m:oMath>
+                </a14:m>
+                <a:endParaRPr lang="en-US" dirty="0"/>
+              </a:p>
+            </p:txBody>
+          </p:sp>
+        </mc:Choice>
+        <mc:Fallback>
+          <p:sp>
+            <p:nvSpPr>
+              <p:cNvPr id="2" name="Title 1">
+                <a:extLst>
+                  <a:ext uri="{FF2B5EF4-FFF2-40B4-BE49-F238E27FC236}">
+                    <a16:creationId xmlns:a16="http://schemas.microsoft.com/office/drawing/2014/main" id="{37B87062-235E-A840-D0E8-FEFA6CFA6C69}"/>
+                  </a:ext>
+                </a:extLst>
+              </p:cNvPr>
+              <p:cNvSpPr>
+                <a:spLocks noGrp="1" noRot="1" noChangeAspect="1" noMove="1" noResize="1" noEditPoints="1" noAdjustHandles="1" noChangeArrowheads="1" noChangeShapeType="1" noTextEdit="1"/>
+              </p:cNvSpPr>
+              <p:nvPr>
+                <p:ph type="title"/>
+              </p:nvPr>
+            </p:nvSpPr>
+            <p:spPr>
+              <a:blipFill>
+                <a:blip r:embed="rId2"/>
+                <a:stretch>
+                  <a:fillRect l="-2413" t="-11268" b="-22535"/>
+                </a:stretch>
+              </a:blipFill>
+            </p:spPr>
+            <p:txBody>
+              <a:bodyPr/>
+              <a:lstStyle/>
+              <a:p>
+                <a:r>
+                  <a:rPr lang="en-US">
+                    <a:noFill/>
+                  </a:rPr>
+                  <a:t> </a:t>
+                </a:r>
+              </a:p>
+            </p:txBody>
+          </p:sp>
+        </mc:Fallback>
+      </mc:AlternateContent>
+      <p:sp>
+        <p:nvSpPr>
+          <p:cNvPr id="3" name="Slide Number Placeholder 2">
+            <a:extLst>
+              <a:ext uri="{FF2B5EF4-FFF2-40B4-BE49-F238E27FC236}">
+                <a16:creationId xmlns:a16="http://schemas.microsoft.com/office/drawing/2014/main" id="{37A36D0D-6B2E-68F1-822D-830A51A41C88}"/>
+              </a:ext>
+            </a:extLst>
+          </p:cNvPr>
+          <p:cNvSpPr>
+            <a:spLocks noGrp="1"/>
+          </p:cNvSpPr>
+          <p:nvPr>
+            <p:ph type="sldNum" sz="quarter" idx="12"/>
+          </p:nvPr>
+        </p:nvSpPr>
+        <p:spPr/>
+        <p:txBody>
+          <a:bodyPr/>
+          <a:lstStyle/>
+          <a:p>
+            <a:fld id="{B9982081-D51A-40C8-8A41-6498517A0DD4}" type="slidenum">
+              <a:rPr lang="en-US" smtClean="0"/>
+              <a:t>2</a:t>
+            </a:fld>
+            <a:endParaRPr lang="en-US"/>
+          </a:p>
+        </p:txBody>
+      </p:sp>
+      <p:pic>
+        <p:nvPicPr>
+          <p:cNvPr id="4" name="Picture 3">
+            <a:extLst>
+              <a:ext uri="{FF2B5EF4-FFF2-40B4-BE49-F238E27FC236}">
+                <a16:creationId xmlns:a16="http://schemas.microsoft.com/office/drawing/2014/main" id="{D522BCA7-9FB7-504F-CF12-4C68FEC2FA29}"/>
+              </a:ext>
+            </a:extLst>
+          </p:cNvPr>
+          <p:cNvPicPr>
+            <a:picLocks noChangeAspect="1"/>
+          </p:cNvPicPr>
+          <p:nvPr/>
+        </p:nvPicPr>
+        <p:blipFill>
+          <a:blip r:embed="rId3"/>
+          <a:stretch>
+            <a:fillRect/>
+          </a:stretch>
+        </p:blipFill>
+        <p:spPr>
+          <a:xfrm>
+            <a:off x="7725103" y="1152768"/>
+            <a:ext cx="4466897" cy="3350173"/>
+          </a:xfrm>
+          <a:prstGeom prst="rect">
+            <a:avLst/>
+          </a:prstGeom>
+        </p:spPr>
+      </p:pic>
+      <p:pic>
+        <p:nvPicPr>
+          <p:cNvPr id="5" name="Picture 4">
+            <a:extLst>
+              <a:ext uri="{FF2B5EF4-FFF2-40B4-BE49-F238E27FC236}">
+                <a16:creationId xmlns:a16="http://schemas.microsoft.com/office/drawing/2014/main" id="{44228C56-856C-1338-39C3-78DE1124D208}"/>
+              </a:ext>
+            </a:extLst>
+          </p:cNvPr>
+          <p:cNvPicPr>
+            <a:picLocks noChangeAspect="1"/>
+          </p:cNvPicPr>
+          <p:nvPr/>
+        </p:nvPicPr>
+        <p:blipFill>
+          <a:blip r:embed="rId4"/>
+          <a:stretch>
+            <a:fillRect/>
+          </a:stretch>
+        </p:blipFill>
+        <p:spPr>
+          <a:xfrm>
+            <a:off x="0" y="1483057"/>
+            <a:ext cx="7503209" cy="3014682"/>
+          </a:xfrm>
+          <a:prstGeom prst="rect">
+            <a:avLst/>
+          </a:prstGeom>
+        </p:spPr>
+      </p:pic>
+      <p:sp>
+        <p:nvSpPr>
+          <p:cNvPr id="6" name="TextBox 5">
+            <a:extLst>
+              <a:ext uri="{FF2B5EF4-FFF2-40B4-BE49-F238E27FC236}">
+                <a16:creationId xmlns:a16="http://schemas.microsoft.com/office/drawing/2014/main" id="{8F11BDB7-C1A7-F128-E8F3-5684614BEF71}"/>
+              </a:ext>
+            </a:extLst>
+          </p:cNvPr>
+          <p:cNvSpPr txBox="1"/>
+          <p:nvPr/>
+        </p:nvSpPr>
+        <p:spPr>
+          <a:xfrm>
+            <a:off x="7921520" y="4829481"/>
+            <a:ext cx="3335059" cy="1200329"/>
+          </a:xfrm>
+          <a:prstGeom prst="rect">
+            <a:avLst/>
+          </a:prstGeom>
+          <a:noFill/>
+        </p:spPr>
+        <p:txBody>
+          <a:bodyPr wrap="square" rtlCol="0">
+            <a:spAutoFit/>
+          </a:bodyPr>
+          <a:lstStyle/>
+          <a:p>
+            <a:pPr marL="285750" indent="-285750">
+              <a:buFont typeface="Arial" panose="020B0604020202020204" pitchFamily="34" charset="0"/>
+              <a:buChar char="•"/>
+            </a:pPr>
+            <a:r>
+              <a:rPr lang="en-US" dirty="0"/>
+              <a:t>Using a peak gain of 5 / m </a:t>
+            </a:r>
+          </a:p>
+          <a:p>
+            <a:pPr marL="285750" indent="-285750">
+              <a:buFont typeface="Arial" panose="020B0604020202020204" pitchFamily="34" charset="0"/>
+              <a:buChar char="•"/>
+            </a:pPr>
+            <a:r>
+              <a:rPr lang="en-US" dirty="0"/>
+              <a:t>No pump decay or gain saturation leads to very high power</a:t>
+            </a:r>
+          </a:p>
+        </p:txBody>
+      </p:sp>
+    </p:spTree>
+    <p:extLst>
+      <p:ext uri="{BB962C8B-B14F-4D97-AF65-F5344CB8AC3E}">
+        <p14:creationId xmlns:p14="http://schemas.microsoft.com/office/powerpoint/2010/main" val="583981711"/>
       </p:ext>
     </p:extLst>
   </p:cSld>

</xml_diff>

<commit_message>
small update: flip n2_n to forward before returning if it was flipped for backward pumping
</commit_message>
<xml_diff>
--- a/memo.pptx
+++ b/memo.pptx
@@ -5,16 +5,17 @@
     <p:sldMasterId id="2147483648" r:id="rId1"/>
   </p:sldMasterIdLst>
   <p:notesMasterIdLst>
-    <p:notesMasterId r:id="rId9"/>
+    <p:notesMasterId r:id="rId10"/>
   </p:notesMasterIdLst>
   <p:sldIdLst>
     <p:sldId id="257" r:id="rId2"/>
     <p:sldId id="258" r:id="rId3"/>
     <p:sldId id="263" r:id="rId4"/>
     <p:sldId id="261" r:id="rId5"/>
-    <p:sldId id="262" r:id="rId6"/>
-    <p:sldId id="259" r:id="rId7"/>
-    <p:sldId id="260" r:id="rId8"/>
+    <p:sldId id="259" r:id="rId6"/>
+    <p:sldId id="260" r:id="rId7"/>
+    <p:sldId id="264" r:id="rId8"/>
+    <p:sldId id="265" r:id="rId9"/>
   </p:sldIdLst>
   <p:sldSz cx="12192000" cy="6858000"/>
   <p:notesSz cx="6858000" cy="9144000"/>
@@ -203,7 +204,7 @@
           <a:p>
             <a:fld id="{95F362A7-A475-4602-906F-9130A1178AB1}" type="datetimeFigureOut">
               <a:rPr lang="en-US" smtClean="0"/>
-              <a:t>10/10/23</a:t>
+              <a:t>10/12/23</a:t>
             </a:fld>
             <a:endParaRPr lang="en-US"/>
           </a:p>
@@ -701,7 +702,7 @@
           <a:p>
             <a:fld id="{0D38F60B-329E-45AD-8EBB-D3927E357EB0}" type="datetime1">
               <a:rPr lang="en-US" smtClean="0"/>
-              <a:t>10/10/23</a:t>
+              <a:t>10/12/23</a:t>
             </a:fld>
             <a:endParaRPr lang="en-US"/>
           </a:p>
@@ -899,7 +900,7 @@
           <a:p>
             <a:fld id="{7644A20D-A245-4F10-84F9-51D5FC950958}" type="datetime1">
               <a:rPr lang="en-US" smtClean="0"/>
-              <a:t>10/10/23</a:t>
+              <a:t>10/12/23</a:t>
             </a:fld>
             <a:endParaRPr lang="en-US"/>
           </a:p>
@@ -1107,7 +1108,7 @@
           <a:p>
             <a:fld id="{9356318C-5F0D-4B43-96EA-F1352008C9B8}" type="datetime1">
               <a:rPr lang="en-US" smtClean="0"/>
-              <a:t>10/10/23</a:t>
+              <a:t>10/12/23</a:t>
             </a:fld>
             <a:endParaRPr lang="en-US"/>
           </a:p>
@@ -1315,7 +1316,7 @@
           <a:p>
             <a:fld id="{F6E96621-9D08-4937-91A6-0EA3793F0F07}" type="datetime1">
               <a:rPr lang="en-US" smtClean="0"/>
-              <a:t>10/10/23</a:t>
+              <a:t>10/12/23</a:t>
             </a:fld>
             <a:endParaRPr lang="en-US"/>
           </a:p>
@@ -1590,7 +1591,7 @@
           <a:p>
             <a:fld id="{3923D620-10DF-4508-991A-B9D388A501EE}" type="datetime1">
               <a:rPr lang="en-US" smtClean="0"/>
-              <a:t>10/10/23</a:t>
+              <a:t>10/12/23</a:t>
             </a:fld>
             <a:endParaRPr lang="en-US"/>
           </a:p>
@@ -1860,7 +1861,7 @@
           <a:p>
             <a:fld id="{92FA3270-DDBA-458A-9D06-6F36A210CFF8}" type="datetime1">
               <a:rPr lang="en-US" smtClean="0"/>
-              <a:t>10/10/23</a:t>
+              <a:t>10/12/23</a:t>
             </a:fld>
             <a:endParaRPr lang="en-US"/>
           </a:p>
@@ -2272,7 +2273,7 @@
           <a:p>
             <a:fld id="{BC650ADE-7CC5-4CA4-AEFD-DD163139B1E9}" type="datetime1">
               <a:rPr lang="en-US" smtClean="0"/>
-              <a:t>10/10/23</a:t>
+              <a:t>10/12/23</a:t>
             </a:fld>
             <a:endParaRPr lang="en-US"/>
           </a:p>
@@ -2418,7 +2419,7 @@
           <a:p>
             <a:fld id="{468D9ADD-CC3F-4DEB-87EF-630A12738E73}" type="datetime1">
               <a:rPr lang="en-US" smtClean="0"/>
-              <a:t>10/10/23</a:t>
+              <a:t>10/12/23</a:t>
             </a:fld>
             <a:endParaRPr lang="en-US"/>
           </a:p>
@@ -2531,7 +2532,7 @@
           <a:p>
             <a:fld id="{EC5B69B2-D125-4E7B-AA17-A8B6ACE8892E}" type="datetime1">
               <a:rPr lang="en-US" smtClean="0"/>
-              <a:t>10/10/23</a:t>
+              <a:t>10/12/23</a:t>
             </a:fld>
             <a:endParaRPr lang="en-US"/>
           </a:p>
@@ -2842,7 +2843,7 @@
           <a:p>
             <a:fld id="{BBE08CD8-AC86-4874-9FD2-AC99DC82CF46}" type="datetime1">
               <a:rPr lang="en-US" smtClean="0"/>
-              <a:t>10/10/23</a:t>
+              <a:t>10/12/23</a:t>
             </a:fld>
             <a:endParaRPr lang="en-US"/>
           </a:p>
@@ -3133,7 +3134,7 @@
           <a:p>
             <a:fld id="{3B82CD6C-2ADC-45ED-BCAD-25C1101DE6B9}" type="datetime1">
               <a:rPr lang="en-US" smtClean="0"/>
-              <a:t>10/10/23</a:t>
+              <a:t>10/12/23</a:t>
             </a:fld>
             <a:endParaRPr lang="en-US"/>
           </a:p>
@@ -3374,7 +3375,7 @@
           <a:p>
             <a:fld id="{BCB570C2-D09B-4F14-B535-9A0AFE946BB3}" type="datetime1">
               <a:rPr lang="en-US" smtClean="0"/>
-              <a:t>10/10/23</a:t>
+              <a:t>10/12/23</a:t>
             </a:fld>
             <a:endParaRPr lang="en-US"/>
           </a:p>
@@ -4359,8 +4360,8 @@
           </p:spPr>
         </p:pic>
       </p:grpSp>
-      <mc:AlternateContent xmlns:mc="http://schemas.openxmlformats.org/markup-compatibility/2006">
-        <mc:Choice xmlns:a14="http://schemas.microsoft.com/office/drawing/2010/main" Requires="a14">
+      <mc:AlternateContent xmlns:mc="http://schemas.openxmlformats.org/markup-compatibility/2006" xmlns:a14="http://schemas.microsoft.com/office/drawing/2010/main">
+        <mc:Choice Requires="a14">
           <p:sp>
             <p:nvSpPr>
               <p:cNvPr id="17" name="TextBox 16">
@@ -4389,6 +4390,7 @@
               </a:bodyPr>
               <a:lstStyle/>
               <a:p>
+                <a:pPr/>
                 <a14:m>
                   <m:oMathPara xmlns:m="http://schemas.openxmlformats.org/officeDocument/2006/math">
                     <m:oMathParaPr>
@@ -4512,7 +4514,7 @@
             </p:txBody>
           </p:sp>
         </mc:Choice>
-        <mc:Fallback>
+        <mc:Fallback xmlns="">
           <p:sp>
             <p:nvSpPr>
               <p:cNvPr id="17" name="TextBox 16">
@@ -4557,8 +4559,8 @@
           </p:sp>
         </mc:Fallback>
       </mc:AlternateContent>
-      <mc:AlternateContent xmlns:mc="http://schemas.openxmlformats.org/markup-compatibility/2006">
-        <mc:Choice xmlns:a14="http://schemas.microsoft.com/office/drawing/2010/main" Requires="a14">
+      <mc:AlternateContent xmlns:mc="http://schemas.openxmlformats.org/markup-compatibility/2006" xmlns:a14="http://schemas.microsoft.com/office/drawing/2010/main">
+        <mc:Choice Requires="a14">
           <p:sp>
             <p:nvSpPr>
               <p:cNvPr id="18" name="TextBox 17">
@@ -4587,6 +4589,7 @@
               </a:bodyPr>
               <a:lstStyle/>
               <a:p>
+                <a:pPr/>
                 <a14:m>
                   <m:oMathPara xmlns:m="http://schemas.openxmlformats.org/officeDocument/2006/math">
                     <m:oMathParaPr>
@@ -4681,7 +4684,7 @@
             </p:txBody>
           </p:sp>
         </mc:Choice>
-        <mc:Fallback>
+        <mc:Fallback xmlns="">
           <p:sp>
             <p:nvSpPr>
               <p:cNvPr id="18" name="TextBox 17">
@@ -4914,8 +4917,8 @@
           </a:prstGeom>
         </p:spPr>
       </p:pic>
-      <mc:AlternateContent xmlns:mc="http://schemas.openxmlformats.org/markup-compatibility/2006">
-        <mc:Choice xmlns:a14="http://schemas.microsoft.com/office/drawing/2010/main" Requires="a14">
+      <mc:AlternateContent xmlns:mc="http://schemas.openxmlformats.org/markup-compatibility/2006" xmlns:a14="http://schemas.microsoft.com/office/drawing/2010/main">
+        <mc:Choice Requires="a14">
           <p:sp>
             <p:nvSpPr>
               <p:cNvPr id="2" name="Title 1">
@@ -4958,7 +4961,7 @@
             </p:txBody>
           </p:sp>
         </mc:Choice>
-        <mc:Fallback>
+        <mc:Fallback xmlns="">
           <p:sp>
             <p:nvSpPr>
               <p:cNvPr id="2" name="Title 1">
@@ -5076,8 +5079,8 @@
           </a:p>
         </p:txBody>
       </p:sp>
-      <mc:AlternateContent xmlns:mc="http://schemas.openxmlformats.org/markup-compatibility/2006">
-        <mc:Choice xmlns:a14="http://schemas.microsoft.com/office/drawing/2010/main" Requires="a14">
+      <mc:AlternateContent xmlns:mc="http://schemas.openxmlformats.org/markup-compatibility/2006" xmlns:a14="http://schemas.microsoft.com/office/drawing/2010/main">
+        <mc:Choice Requires="a14">
           <p:sp>
             <p:nvSpPr>
               <p:cNvPr id="8" name="TextBox 7">
@@ -5166,7 +5169,7 @@
             </p:txBody>
           </p:sp>
         </mc:Choice>
-        <mc:Fallback>
+        <mc:Fallback xmlns="">
           <p:sp>
             <p:nvSpPr>
               <p:cNvPr id="8" name="TextBox 7">
@@ -5331,8 +5334,8 @@
           </a:prstGeom>
         </p:spPr>
       </p:pic>
-      <mc:AlternateContent xmlns:mc="http://schemas.openxmlformats.org/markup-compatibility/2006">
-        <mc:Choice xmlns:a14="http://schemas.microsoft.com/office/drawing/2010/main" Requires="a14">
+      <mc:AlternateContent xmlns:mc="http://schemas.openxmlformats.org/markup-compatibility/2006" xmlns:a14="http://schemas.microsoft.com/office/drawing/2010/main">
+        <mc:Choice Requires="a14">
           <p:sp>
             <p:nvSpPr>
               <p:cNvPr id="6" name="TextBox 5">
@@ -5361,6 +5364,7 @@
               </a:bodyPr>
               <a:lstStyle/>
               <a:p>
+                <a:pPr/>
                 <a14:m>
                   <m:oMathPara xmlns:m="http://schemas.openxmlformats.org/officeDocument/2006/math">
                     <m:oMathParaPr>
@@ -5456,7 +5460,7 @@
             </p:txBody>
           </p:sp>
         </mc:Choice>
-        <mc:Fallback>
+        <mc:Fallback xmlns="">
           <p:sp>
             <p:nvSpPr>
               <p:cNvPr id="6" name="TextBox 5">
@@ -5501,8 +5505,8 @@
           </p:sp>
         </mc:Fallback>
       </mc:AlternateContent>
-      <mc:AlternateContent xmlns:mc="http://schemas.openxmlformats.org/markup-compatibility/2006">
-        <mc:Choice xmlns:a14="http://schemas.microsoft.com/office/drawing/2010/main" Requires="a14">
+      <mc:AlternateContent xmlns:mc="http://schemas.openxmlformats.org/markup-compatibility/2006" xmlns:a14="http://schemas.microsoft.com/office/drawing/2010/main">
+        <mc:Choice Requires="a14">
           <p:sp>
             <p:nvSpPr>
               <p:cNvPr id="8" name="TextBox 7">
@@ -5667,7 +5671,7 @@
             </p:txBody>
           </p:sp>
         </mc:Choice>
-        <mc:Fallback>
+        <mc:Fallback xmlns="">
           <p:sp>
             <p:nvSpPr>
               <p:cNvPr id="8" name="TextBox 7">
@@ -5779,8 +5783,8 @@
             <a:chExt cx="3395325" cy="1920783"/>
           </a:xfrm>
         </p:grpSpPr>
-        <mc:AlternateContent xmlns:mc="http://schemas.openxmlformats.org/markup-compatibility/2006">
-          <mc:Choice xmlns:a14="http://schemas.microsoft.com/office/drawing/2010/main" Requires="a14">
+        <mc:AlternateContent xmlns:mc="http://schemas.openxmlformats.org/markup-compatibility/2006" xmlns:a14="http://schemas.microsoft.com/office/drawing/2010/main">
+          <mc:Choice Requires="a14">
             <p:sp>
               <p:nvSpPr>
                 <p:cNvPr id="13" name="TextBox 12">
@@ -5809,6 +5813,7 @@
                 </a:bodyPr>
                 <a:lstStyle/>
                 <a:p>
+                  <a:pPr/>
                   <a14:m>
                     <m:oMathPara xmlns:m="http://schemas.openxmlformats.org/officeDocument/2006/math">
                       <m:oMathParaPr>
@@ -6136,7 +6141,7 @@
               </p:txBody>
             </p:sp>
           </mc:Choice>
-          <mc:Fallback>
+          <mc:Fallback xmlns="">
             <p:sp>
               <p:nvSpPr>
                 <p:cNvPr id="13" name="TextBox 12">
@@ -6181,8 +6186,8 @@
             </p:sp>
           </mc:Fallback>
         </mc:AlternateContent>
-        <mc:AlternateContent xmlns:mc="http://schemas.openxmlformats.org/markup-compatibility/2006">
-          <mc:Choice xmlns:a14="http://schemas.microsoft.com/office/drawing/2010/main" Requires="a14">
+        <mc:AlternateContent xmlns:mc="http://schemas.openxmlformats.org/markup-compatibility/2006" xmlns:a14="http://schemas.microsoft.com/office/drawing/2010/main">
+          <mc:Choice Requires="a14">
             <p:sp>
               <p:nvSpPr>
                 <p:cNvPr id="14" name="TextBox 13">
@@ -6211,6 +6216,7 @@
                 </a:bodyPr>
                 <a:lstStyle/>
                 <a:p>
+                  <a:pPr/>
                   <a14:m>
                     <m:oMathPara xmlns:m="http://schemas.openxmlformats.org/officeDocument/2006/math">
                       <m:oMathParaPr>
@@ -6488,7 +6494,7 @@
               </p:txBody>
             </p:sp>
           </mc:Choice>
-          <mc:Fallback>
+          <mc:Fallback xmlns="">
             <p:sp>
               <p:nvSpPr>
                 <p:cNvPr id="14" name="TextBox 13">
@@ -6533,8 +6539,8 @@
             </p:sp>
           </mc:Fallback>
         </mc:AlternateContent>
-        <mc:AlternateContent xmlns:mc="http://schemas.openxmlformats.org/markup-compatibility/2006">
-          <mc:Choice xmlns:a14="http://schemas.microsoft.com/office/drawing/2010/main" Requires="a14">
+        <mc:AlternateContent xmlns:mc="http://schemas.openxmlformats.org/markup-compatibility/2006" xmlns:a14="http://schemas.microsoft.com/office/drawing/2010/main">
+          <mc:Choice Requires="a14">
             <p:sp>
               <p:nvSpPr>
                 <p:cNvPr id="15" name="TextBox 14">
@@ -6563,6 +6569,7 @@
                 </a:bodyPr>
                 <a:lstStyle/>
                 <a:p>
+                  <a:pPr/>
                   <a14:m>
                     <m:oMathPara xmlns:m="http://schemas.openxmlformats.org/officeDocument/2006/math">
                       <m:oMathParaPr>
@@ -6627,7 +6634,7 @@
               </p:txBody>
             </p:sp>
           </mc:Choice>
-          <mc:Fallback>
+          <mc:Fallback xmlns="">
             <p:sp>
               <p:nvSpPr>
                 <p:cNvPr id="15" name="TextBox 14">
@@ -6673,8 +6680,8 @@
           </mc:Fallback>
         </mc:AlternateContent>
       </p:grpSp>
-      <mc:AlternateContent xmlns:mc="http://schemas.openxmlformats.org/markup-compatibility/2006">
-        <mc:Choice xmlns:a14="http://schemas.microsoft.com/office/drawing/2010/main" Requires="a14">
+      <mc:AlternateContent xmlns:mc="http://schemas.openxmlformats.org/markup-compatibility/2006" xmlns:a14="http://schemas.microsoft.com/office/drawing/2010/main">
+        <mc:Choice Requires="a14">
           <p:sp>
             <p:nvSpPr>
               <p:cNvPr id="17" name="TextBox 16">
@@ -6850,7 +6857,7 @@
             </p:txBody>
           </p:sp>
         </mc:Choice>
-        <mc:Fallback>
+        <mc:Fallback xmlns="">
           <p:sp>
             <p:nvSpPr>
               <p:cNvPr id="17" name="TextBox 16">
@@ -6982,8 +6989,8 @@
           </a:p>
         </p:txBody>
       </p:sp>
-      <mc:AlternateContent xmlns:mc="http://schemas.openxmlformats.org/markup-compatibility/2006">
-        <mc:Choice xmlns:a14="http://schemas.microsoft.com/office/drawing/2010/main" Requires="a14">
+      <mc:AlternateContent xmlns:mc="http://schemas.openxmlformats.org/markup-compatibility/2006" xmlns:a14="http://schemas.microsoft.com/office/drawing/2010/main">
+        <mc:Choice Requires="a14">
           <p:sp>
             <p:nvSpPr>
               <p:cNvPr id="4" name="TextBox 3">
@@ -7017,6 +7024,7 @@
               </a:bodyPr>
               <a:lstStyle/>
               <a:p>
+                <a:pPr/>
                 <a14:m>
                   <m:oMathPara xmlns:m="http://schemas.openxmlformats.org/officeDocument/2006/math">
                     <m:oMathParaPr>
@@ -7889,7 +7897,7 @@
             </p:txBody>
           </p:sp>
         </mc:Choice>
-        <mc:Fallback>
+        <mc:Fallback xmlns="">
           <p:sp>
             <p:nvSpPr>
               <p:cNvPr id="4" name="TextBox 3">
@@ -7939,8 +7947,8 @@
           </p:sp>
         </mc:Fallback>
       </mc:AlternateContent>
-      <mc:AlternateContent xmlns:mc="http://schemas.openxmlformats.org/markup-compatibility/2006">
-        <mc:Choice xmlns:a14="http://schemas.microsoft.com/office/drawing/2010/main" Requires="a14">
+      <mc:AlternateContent xmlns:mc="http://schemas.openxmlformats.org/markup-compatibility/2006" xmlns:a14="http://schemas.microsoft.com/office/drawing/2010/main">
+        <mc:Choice Requires="a14">
           <p:sp>
             <p:nvSpPr>
               <p:cNvPr id="8" name="TextBox 7">
@@ -7969,6 +7977,7 @@
               </a:bodyPr>
               <a:lstStyle/>
               <a:p>
+                <a:pPr/>
                 <a14:m>
                   <m:oMathPara xmlns:m="http://schemas.openxmlformats.org/officeDocument/2006/math">
                     <m:oMathParaPr>
@@ -8075,7 +8084,7 @@
             </p:txBody>
           </p:sp>
         </mc:Choice>
-        <mc:Fallback>
+        <mc:Fallback xmlns="">
           <p:sp>
             <p:nvSpPr>
               <p:cNvPr id="8" name="TextBox 7">
@@ -8120,8 +8129,8 @@
           </p:sp>
         </mc:Fallback>
       </mc:AlternateContent>
-      <mc:AlternateContent xmlns:mc="http://schemas.openxmlformats.org/markup-compatibility/2006">
-        <mc:Choice xmlns:a14="http://schemas.microsoft.com/office/drawing/2010/main" Requires="a14">
+      <mc:AlternateContent xmlns:mc="http://schemas.openxmlformats.org/markup-compatibility/2006" xmlns:a14="http://schemas.microsoft.com/office/drawing/2010/main">
+        <mc:Choice Requires="a14">
           <p:sp>
             <p:nvSpPr>
               <p:cNvPr id="9" name="TextBox 8">
@@ -8150,6 +8159,7 @@
               </a:bodyPr>
               <a:lstStyle/>
               <a:p>
+                <a:pPr/>
                 <a14:m>
                   <m:oMathPara xmlns:m="http://schemas.openxmlformats.org/officeDocument/2006/math">
                     <m:oMathParaPr>
@@ -8232,7 +8242,7 @@
             </p:txBody>
           </p:sp>
         </mc:Choice>
-        <mc:Fallback>
+        <mc:Fallback xmlns="">
           <p:sp>
             <p:nvSpPr>
               <p:cNvPr id="9" name="TextBox 8">
@@ -8277,8 +8287,8 @@
           </p:sp>
         </mc:Fallback>
       </mc:AlternateContent>
-      <mc:AlternateContent xmlns:mc="http://schemas.openxmlformats.org/markup-compatibility/2006">
-        <mc:Choice xmlns:a14="http://schemas.microsoft.com/office/drawing/2010/main" Requires="a14">
+      <mc:AlternateContent xmlns:mc="http://schemas.openxmlformats.org/markup-compatibility/2006" xmlns:a14="http://schemas.microsoft.com/office/drawing/2010/main">
+        <mc:Choice Requires="a14">
           <p:sp>
             <p:nvSpPr>
               <p:cNvPr id="10" name="TextBox 9">
@@ -8312,6 +8322,7 @@
               </a:bodyPr>
               <a:lstStyle/>
               <a:p>
+                <a:pPr/>
                 <a14:m>
                   <m:oMathPara xmlns:m="http://schemas.openxmlformats.org/officeDocument/2006/math">
                     <m:oMathParaPr>
@@ -8502,7 +8513,7 @@
             </p:txBody>
           </p:sp>
         </mc:Choice>
-        <mc:Fallback>
+        <mc:Fallback xmlns="">
           <p:sp>
             <p:nvSpPr>
               <p:cNvPr id="10" name="TextBox 9">
@@ -8733,10 +8744,11 @@
               <a:p>
                 <a:r>
                   <a:rPr lang="en-US" dirty="0"/>
-                  <a:t>I’m taking 1-3 from an example from Ansys:</a:t>
+                  <a:t>I’m taking 1-5 from an example from Ansys:</a:t>
                 </a:r>
               </a:p>
               <a:p>
+                <a:pPr/>
                 <a14:m>
                   <m:oMathPara xmlns:m="http://schemas.openxmlformats.org/officeDocument/2006/math">
                     <m:oMathParaPr>
@@ -8817,6 +8829,7 @@
                 <a:endParaRPr lang="en-US" dirty="0"/>
               </a:p>
               <a:p>
+                <a:pPr/>
                 <a14:m>
                   <m:oMathPara xmlns:m="http://schemas.openxmlformats.org/officeDocument/2006/math">
                     <m:oMathParaPr>
@@ -8872,6 +8885,7 @@
                 <a:endParaRPr lang="en-US" dirty="0"/>
               </a:p>
               <a:p>
+                <a:pPr/>
                 <a14:m>
                   <m:oMathPara xmlns:m="http://schemas.openxmlformats.org/officeDocument/2006/math">
                     <m:oMathParaPr>
@@ -9019,8 +9033,8 @@
           </a:p>
         </p:txBody>
       </p:sp>
-      <mc:AlternateContent xmlns:mc="http://schemas.openxmlformats.org/markup-compatibility/2006">
-        <mc:Choice xmlns:a14="http://schemas.microsoft.com/office/drawing/2010/main" Requires="a14">
+      <mc:AlternateContent xmlns:mc="http://schemas.openxmlformats.org/markup-compatibility/2006" xmlns:a14="http://schemas.microsoft.com/office/drawing/2010/main">
+        <mc:Choice Requires="a14">
           <p:sp>
             <p:nvSpPr>
               <p:cNvPr id="22" name="TextBox 21">
@@ -9054,6 +9068,7 @@
               </a:bodyPr>
               <a:lstStyle/>
               <a:p>
+                <a:pPr/>
                 <a14:m>
                   <m:oMathPara xmlns:m="http://schemas.openxmlformats.org/officeDocument/2006/math">
                     <m:oMathParaPr>
@@ -9323,7 +9338,7 @@
             </p:txBody>
           </p:sp>
         </mc:Choice>
-        <mc:Fallback>
+        <mc:Fallback xmlns="">
           <p:sp>
             <p:nvSpPr>
               <p:cNvPr id="22" name="TextBox 21">
@@ -9497,8 +9512,8 @@
             </a:p>
           </p:txBody>
         </p:sp>
-        <mc:AlternateContent xmlns:mc="http://schemas.openxmlformats.org/markup-compatibility/2006">
-          <mc:Choice xmlns:a14="http://schemas.microsoft.com/office/drawing/2010/main" Requires="a14">
+        <mc:AlternateContent xmlns:mc="http://schemas.openxmlformats.org/markup-compatibility/2006" xmlns:a14="http://schemas.microsoft.com/office/drawing/2010/main">
+          <mc:Choice Requires="a14">
             <p:sp>
               <p:nvSpPr>
                 <p:cNvPr id="24" name="TextBox 23">
@@ -9527,6 +9542,7 @@
                 </a:bodyPr>
                 <a:lstStyle/>
                 <a:p>
+                  <a:pPr/>
                   <a14:m>
                     <m:oMathPara xmlns:m="http://schemas.openxmlformats.org/officeDocument/2006/math">
                       <m:oMathParaPr>
@@ -9579,7 +9595,7 @@
               </p:txBody>
             </p:sp>
           </mc:Choice>
-          <mc:Fallback>
+          <mc:Fallback xmlns="">
             <p:sp>
               <p:nvSpPr>
                 <p:cNvPr id="24" name="TextBox 23">
@@ -9624,8 +9640,8 @@
             </p:sp>
           </mc:Fallback>
         </mc:AlternateContent>
-        <mc:AlternateContent xmlns:mc="http://schemas.openxmlformats.org/markup-compatibility/2006">
-          <mc:Choice xmlns:a14="http://schemas.microsoft.com/office/drawing/2010/main" Requires="a14">
+        <mc:AlternateContent xmlns:mc="http://schemas.openxmlformats.org/markup-compatibility/2006" xmlns:a14="http://schemas.microsoft.com/office/drawing/2010/main">
+          <mc:Choice Requires="a14">
             <p:sp>
               <p:nvSpPr>
                 <p:cNvPr id="25" name="TextBox 24">
@@ -9654,6 +9670,7 @@
                 </a:bodyPr>
                 <a:lstStyle/>
                 <a:p>
+                  <a:pPr/>
                   <a14:m>
                     <m:oMathPara xmlns:m="http://schemas.openxmlformats.org/officeDocument/2006/math">
                       <m:oMathParaPr>
@@ -9706,7 +9723,7 @@
               </p:txBody>
             </p:sp>
           </mc:Choice>
-          <mc:Fallback>
+          <mc:Fallback xmlns="">
             <p:sp>
               <p:nvSpPr>
                 <p:cNvPr id="25" name="TextBox 24">
@@ -9825,93 +9842,6 @@
           <a:chExt cx="0" cy="0"/>
         </a:xfrm>
       </p:grpSpPr>
-      <p:sp>
-        <p:nvSpPr>
-          <p:cNvPr id="2" name="Title 1">
-            <a:extLst>
-              <a:ext uri="{FF2B5EF4-FFF2-40B4-BE49-F238E27FC236}">
-                <a16:creationId xmlns:a16="http://schemas.microsoft.com/office/drawing/2014/main" id="{997AEFE3-4881-9D7B-E14F-FE0EFF3177E6}"/>
-              </a:ext>
-            </a:extLst>
-          </p:cNvPr>
-          <p:cNvSpPr>
-            <a:spLocks noGrp="1"/>
-          </p:cNvSpPr>
-          <p:nvPr>
-            <p:ph type="title"/>
-          </p:nvPr>
-        </p:nvSpPr>
-        <p:spPr/>
-        <p:txBody>
-          <a:bodyPr/>
-          <a:lstStyle/>
-          <a:p>
-            <a:r>
-              <a:rPr lang="en-US" dirty="0"/>
-              <a:t>Jointly Solve RE and NLSE</a:t>
-            </a:r>
-          </a:p>
-        </p:txBody>
-      </p:sp>
-      <p:sp>
-        <p:nvSpPr>
-          <p:cNvPr id="3" name="Slide Number Placeholder 2">
-            <a:extLst>
-              <a:ext uri="{FF2B5EF4-FFF2-40B4-BE49-F238E27FC236}">
-                <a16:creationId xmlns:a16="http://schemas.microsoft.com/office/drawing/2014/main" id="{FB692347-6A09-7C68-4DED-A5DE41C4D914}"/>
-              </a:ext>
-            </a:extLst>
-          </p:cNvPr>
-          <p:cNvSpPr>
-            <a:spLocks noGrp="1"/>
-          </p:cNvSpPr>
-          <p:nvPr>
-            <p:ph type="sldNum" sz="quarter" idx="12"/>
-          </p:nvPr>
-        </p:nvSpPr>
-        <p:spPr/>
-        <p:txBody>
-          <a:bodyPr/>
-          <a:lstStyle/>
-          <a:p>
-            <a:fld id="{B9982081-D51A-40C8-8A41-6498517A0DD4}" type="slidenum">
-              <a:rPr lang="en-US" smtClean="0"/>
-              <a:t>5</a:t>
-            </a:fld>
-            <a:endParaRPr lang="en-US"/>
-          </a:p>
-        </p:txBody>
-      </p:sp>
-    </p:spTree>
-    <p:extLst>
-      <p:ext uri="{BB962C8B-B14F-4D97-AF65-F5344CB8AC3E}">
-        <p14:creationId xmlns:p14="http://schemas.microsoft.com/office/powerpoint/2010/main" val="1963120057"/>
-      </p:ext>
-    </p:extLst>
-  </p:cSld>
-  <p:clrMapOvr>
-    <a:masterClrMapping/>
-  </p:clrMapOvr>
-</p:sld>
-</file>
-
-<file path=ppt/slides/slide6.xml><?xml version="1.0" encoding="utf-8"?>
-<p:sld xmlns:a="http://schemas.openxmlformats.org/drawingml/2006/main" xmlns:r="http://schemas.openxmlformats.org/officeDocument/2006/relationships" xmlns:p="http://schemas.openxmlformats.org/presentationml/2006/main">
-  <p:cSld>
-    <p:spTree>
-      <p:nvGrpSpPr>
-        <p:cNvPr id="1" name=""/>
-        <p:cNvGrpSpPr/>
-        <p:nvPr/>
-      </p:nvGrpSpPr>
-      <p:grpSpPr>
-        <a:xfrm>
-          <a:off x="0" y="0"/>
-          <a:ext cx="0" cy="0"/>
-          <a:chOff x="0" y="0"/>
-          <a:chExt cx="0" cy="0"/>
-        </a:xfrm>
-      </p:grpSpPr>
       <p:pic>
         <p:nvPicPr>
           <p:cNvPr id="35" name="Picture 34">
@@ -9963,7 +9893,10 @@
           <a:bodyPr/>
           <a:lstStyle/>
           <a:p>
-            <a:endParaRPr lang="en-US" dirty="0"/>
+            <a:r>
+              <a:rPr lang="en-US" dirty="0"/>
+              <a:t>Forward Pumping</a:t>
+            </a:r>
           </a:p>
         </p:txBody>
       </p:sp>
@@ -9990,7 +9923,7 @@
           <a:p>
             <a:fld id="{B9982081-D51A-40C8-8A41-6498517A0DD4}" type="slidenum">
               <a:rPr lang="en-US" smtClean="0"/>
-              <a:t>6</a:t>
+              <a:t>5</a:t>
             </a:fld>
             <a:endParaRPr lang="en-US"/>
           </a:p>
@@ -10278,8 +10211,8 @@
           </a:p>
         </p:txBody>
       </p:sp>
-      <mc:AlternateContent xmlns:mc="http://schemas.openxmlformats.org/markup-compatibility/2006">
-        <mc:Choice xmlns:a14="http://schemas.microsoft.com/office/drawing/2010/main" Requires="a14">
+      <mc:AlternateContent xmlns:mc="http://schemas.openxmlformats.org/markup-compatibility/2006" xmlns:a14="http://schemas.microsoft.com/office/drawing/2010/main">
+        <mc:Choice Requires="a14">
           <p:sp>
             <p:nvSpPr>
               <p:cNvPr id="28" name="TextBox 27">
@@ -10308,6 +10241,7 @@
               </a:bodyPr>
               <a:lstStyle/>
               <a:p>
+                <a:pPr/>
                 <a14:m>
                   <m:oMathPara xmlns:m="http://schemas.openxmlformats.org/officeDocument/2006/math">
                     <m:oMathParaPr>
@@ -10403,7 +10337,7 @@
             </p:txBody>
           </p:sp>
         </mc:Choice>
-        <mc:Fallback>
+        <mc:Fallback xmlns="">
           <p:sp>
             <p:nvSpPr>
               <p:cNvPr id="28" name="TextBox 27">
@@ -10448,8 +10382,8 @@
           </p:sp>
         </mc:Fallback>
       </mc:AlternateContent>
-      <mc:AlternateContent xmlns:mc="http://schemas.openxmlformats.org/markup-compatibility/2006">
-        <mc:Choice xmlns:a14="http://schemas.microsoft.com/office/drawing/2010/main" Requires="a14">
+      <mc:AlternateContent xmlns:mc="http://schemas.openxmlformats.org/markup-compatibility/2006" xmlns:a14="http://schemas.microsoft.com/office/drawing/2010/main">
+        <mc:Choice Requires="a14">
           <p:sp>
             <p:nvSpPr>
               <p:cNvPr id="29" name="TextBox 28">
@@ -10478,6 +10412,7 @@
               </a:bodyPr>
               <a:lstStyle/>
               <a:p>
+                <a:pPr/>
                 <a14:m>
                   <m:oMathPara xmlns:m="http://schemas.openxmlformats.org/officeDocument/2006/math">
                     <m:oMathParaPr>
@@ -10573,7 +10508,7 @@
             </p:txBody>
           </p:sp>
         </mc:Choice>
-        <mc:Fallback>
+        <mc:Fallback xmlns="">
           <p:sp>
             <p:nvSpPr>
               <p:cNvPr id="29" name="TextBox 28">
@@ -10618,8 +10553,8 @@
           </p:sp>
         </mc:Fallback>
       </mc:AlternateContent>
-      <mc:AlternateContent xmlns:mc="http://schemas.openxmlformats.org/markup-compatibility/2006">
-        <mc:Choice xmlns:a14="http://schemas.microsoft.com/office/drawing/2010/main" Requires="a14">
+      <mc:AlternateContent xmlns:mc="http://schemas.openxmlformats.org/markup-compatibility/2006" xmlns:a14="http://schemas.microsoft.com/office/drawing/2010/main">
+        <mc:Choice Requires="a14">
           <p:sp>
             <p:nvSpPr>
               <p:cNvPr id="30" name="TextBox 29">
@@ -10648,6 +10583,7 @@
               </a:bodyPr>
               <a:lstStyle/>
               <a:p>
+                <a:pPr/>
                 <a14:m>
                   <m:oMathPara xmlns:m="http://schemas.openxmlformats.org/officeDocument/2006/math">
                     <m:oMathParaPr>
@@ -10743,7 +10679,7 @@
             </p:txBody>
           </p:sp>
         </mc:Choice>
-        <mc:Fallback>
+        <mc:Fallback xmlns="">
           <p:sp>
             <p:nvSpPr>
               <p:cNvPr id="30" name="TextBox 29">
@@ -10801,7 +10737,7 @@
 </p:sld>
 </file>
 
-<file path=ppt/slides/slide7.xml><?xml version="1.0" encoding="utf-8"?>
+<file path=ppt/slides/slide6.xml><?xml version="1.0" encoding="utf-8"?>
 <p:sld xmlns:a="http://schemas.openxmlformats.org/drawingml/2006/main" xmlns:r="http://schemas.openxmlformats.org/officeDocument/2006/relationships" xmlns:p="http://schemas.openxmlformats.org/presentationml/2006/main">
   <p:cSld>
     <p:spTree>
@@ -10959,7 +10895,7 @@
           <a:p>
             <a:fld id="{B9982081-D51A-40C8-8A41-6498517A0DD4}" type="slidenum">
               <a:rPr lang="en-US" smtClean="0"/>
-              <a:t>7</a:t>
+              <a:t>6</a:t>
             </a:fld>
             <a:endParaRPr lang="en-US"/>
           </a:p>
@@ -11134,6 +11070,651 @@
     <p:extLst>
       <p:ext uri="{BB962C8B-B14F-4D97-AF65-F5344CB8AC3E}">
         <p14:creationId xmlns:p14="http://schemas.microsoft.com/office/powerpoint/2010/main" val="3847931170"/>
+      </p:ext>
+    </p:extLst>
+  </p:cSld>
+  <p:clrMapOvr>
+    <a:masterClrMapping/>
+  </p:clrMapOvr>
+</p:sld>
+</file>
+
+<file path=ppt/slides/slide7.xml><?xml version="1.0" encoding="utf-8"?>
+<p:sld xmlns:a="http://schemas.openxmlformats.org/drawingml/2006/main" xmlns:r="http://schemas.openxmlformats.org/officeDocument/2006/relationships" xmlns:p="http://schemas.openxmlformats.org/presentationml/2006/main">
+  <p:cSld>
+    <p:spTree>
+      <p:nvGrpSpPr>
+        <p:cNvPr id="1" name=""/>
+        <p:cNvGrpSpPr/>
+        <p:nvPr/>
+      </p:nvGrpSpPr>
+      <p:grpSpPr>
+        <a:xfrm>
+          <a:off x="0" y="0"/>
+          <a:ext cx="0" cy="0"/>
+          <a:chOff x="0" y="0"/>
+          <a:chExt cx="0" cy="0"/>
+        </a:xfrm>
+      </p:grpSpPr>
+      <p:sp>
+        <p:nvSpPr>
+          <p:cNvPr id="2" name="Title 1">
+            <a:extLst>
+              <a:ext uri="{FF2B5EF4-FFF2-40B4-BE49-F238E27FC236}">
+                <a16:creationId xmlns:a16="http://schemas.microsoft.com/office/drawing/2014/main" id="{41637380-E457-CE38-FFBF-3BFD017C1510}"/>
+              </a:ext>
+            </a:extLst>
+          </p:cNvPr>
+          <p:cNvSpPr>
+            <a:spLocks noGrp="1"/>
+          </p:cNvSpPr>
+          <p:nvPr>
+            <p:ph type="title"/>
+          </p:nvPr>
+        </p:nvSpPr>
+        <p:spPr/>
+        <p:txBody>
+          <a:bodyPr/>
+          <a:lstStyle/>
+          <a:p>
+            <a:r>
+              <a:rPr lang="en-US" dirty="0"/>
+              <a:t>Backward Pumping</a:t>
+            </a:r>
+          </a:p>
+        </p:txBody>
+      </p:sp>
+      <p:sp>
+        <p:nvSpPr>
+          <p:cNvPr id="3" name="Slide Number Placeholder 2">
+            <a:extLst>
+              <a:ext uri="{FF2B5EF4-FFF2-40B4-BE49-F238E27FC236}">
+                <a16:creationId xmlns:a16="http://schemas.microsoft.com/office/drawing/2014/main" id="{A9F8114C-5C50-C7F6-A92A-0C093C678674}"/>
+              </a:ext>
+            </a:extLst>
+          </p:cNvPr>
+          <p:cNvSpPr>
+            <a:spLocks noGrp="1"/>
+          </p:cNvSpPr>
+          <p:nvPr>
+            <p:ph type="sldNum" sz="quarter" idx="12"/>
+          </p:nvPr>
+        </p:nvSpPr>
+        <p:spPr/>
+        <p:txBody>
+          <a:bodyPr/>
+          <a:lstStyle/>
+          <a:p>
+            <a:fld id="{B9982081-D51A-40C8-8A41-6498517A0DD4}" type="slidenum">
+              <a:rPr lang="en-US" smtClean="0"/>
+              <a:t>7</a:t>
+            </a:fld>
+            <a:endParaRPr lang="en-US"/>
+          </a:p>
+        </p:txBody>
+      </p:sp>
+      <p:pic>
+        <p:nvPicPr>
+          <p:cNvPr id="8" name="Picture 7">
+            <a:extLst>
+              <a:ext uri="{FF2B5EF4-FFF2-40B4-BE49-F238E27FC236}">
+                <a16:creationId xmlns:a16="http://schemas.microsoft.com/office/drawing/2014/main" id="{5AF8FB4D-C098-F1D3-6340-52BCC1C87E40}"/>
+              </a:ext>
+            </a:extLst>
+          </p:cNvPr>
+          <p:cNvPicPr>
+            <a:picLocks noChangeAspect="1"/>
+          </p:cNvPicPr>
+          <p:nvPr/>
+        </p:nvPicPr>
+        <p:blipFill>
+          <a:blip r:embed="rId2"/>
+          <a:stretch>
+            <a:fillRect/>
+          </a:stretch>
+        </p:blipFill>
+        <p:spPr>
+          <a:xfrm>
+            <a:off x="738235" y="1743777"/>
+            <a:ext cx="6108700" cy="4330700"/>
+          </a:xfrm>
+          <a:prstGeom prst="rect">
+            <a:avLst/>
+          </a:prstGeom>
+        </p:spPr>
+      </p:pic>
+      <p:pic>
+        <p:nvPicPr>
+          <p:cNvPr id="9" name="Picture 8">
+            <a:extLst>
+              <a:ext uri="{FF2B5EF4-FFF2-40B4-BE49-F238E27FC236}">
+                <a16:creationId xmlns:a16="http://schemas.microsoft.com/office/drawing/2014/main" id="{C556F207-61EB-2E87-8990-0D54821C0D44}"/>
+              </a:ext>
+            </a:extLst>
+          </p:cNvPr>
+          <p:cNvPicPr>
+            <a:picLocks noChangeAspect="1"/>
+          </p:cNvPicPr>
+          <p:nvPr/>
+        </p:nvPicPr>
+        <p:blipFill>
+          <a:blip r:embed="rId3"/>
+          <a:stretch>
+            <a:fillRect/>
+          </a:stretch>
+        </p:blipFill>
+        <p:spPr>
+          <a:xfrm>
+            <a:off x="6941520" y="-1"/>
+            <a:ext cx="3939197" cy="6858000"/>
+          </a:xfrm>
+          <a:prstGeom prst="rect">
+            <a:avLst/>
+          </a:prstGeom>
+        </p:spPr>
+      </p:pic>
+      <p:cxnSp>
+        <p:nvCxnSpPr>
+          <p:cNvPr id="10" name="Straight Arrow Connector 9">
+            <a:extLst>
+              <a:ext uri="{FF2B5EF4-FFF2-40B4-BE49-F238E27FC236}">
+                <a16:creationId xmlns:a16="http://schemas.microsoft.com/office/drawing/2014/main" id="{DFB5810A-7657-C807-E0A9-CD3B79C1CE2E}"/>
+              </a:ext>
+            </a:extLst>
+          </p:cNvPr>
+          <p:cNvCxnSpPr>
+            <a:cxnSpLocks/>
+          </p:cNvCxnSpPr>
+          <p:nvPr/>
+        </p:nvCxnSpPr>
+        <p:spPr>
+          <a:xfrm>
+            <a:off x="2340864" y="4766209"/>
+            <a:ext cx="4602102" cy="0"/>
+          </a:xfrm>
+          <a:prstGeom prst="straightConnector1">
+            <a:avLst/>
+          </a:prstGeom>
+          <a:ln w="25400">
+            <a:solidFill>
+              <a:schemeClr val="tx1"/>
+            </a:solidFill>
+            <a:prstDash val="dash"/>
+            <a:tailEnd type="triangle"/>
+          </a:ln>
+        </p:spPr>
+        <p:style>
+          <a:lnRef idx="1">
+            <a:schemeClr val="accent1"/>
+          </a:lnRef>
+          <a:fillRef idx="0">
+            <a:schemeClr val="accent1"/>
+          </a:fillRef>
+          <a:effectRef idx="0">
+            <a:schemeClr val="accent1"/>
+          </a:effectRef>
+          <a:fontRef idx="minor">
+            <a:schemeClr val="tx1"/>
+          </a:fontRef>
+        </p:style>
+      </p:cxnSp>
+      <p:cxnSp>
+        <p:nvCxnSpPr>
+          <p:cNvPr id="11" name="Straight Arrow Connector 10">
+            <a:extLst>
+              <a:ext uri="{FF2B5EF4-FFF2-40B4-BE49-F238E27FC236}">
+                <a16:creationId xmlns:a16="http://schemas.microsoft.com/office/drawing/2014/main" id="{443992B2-7972-7F71-3E33-BE7C0456D699}"/>
+              </a:ext>
+            </a:extLst>
+          </p:cNvPr>
+          <p:cNvCxnSpPr>
+            <a:cxnSpLocks/>
+          </p:cNvCxnSpPr>
+          <p:nvPr/>
+        </p:nvCxnSpPr>
+        <p:spPr>
+          <a:xfrm flipV="1">
+            <a:off x="2551176" y="3193441"/>
+            <a:ext cx="4391790" cy="336143"/>
+          </a:xfrm>
+          <a:prstGeom prst="straightConnector1">
+            <a:avLst/>
+          </a:prstGeom>
+          <a:ln w="25400">
+            <a:solidFill>
+              <a:schemeClr val="tx1"/>
+            </a:solidFill>
+            <a:prstDash val="dash"/>
+            <a:tailEnd type="triangle"/>
+          </a:ln>
+        </p:spPr>
+        <p:style>
+          <a:lnRef idx="1">
+            <a:schemeClr val="accent1"/>
+          </a:lnRef>
+          <a:fillRef idx="0">
+            <a:schemeClr val="accent1"/>
+          </a:fillRef>
+          <a:effectRef idx="0">
+            <a:schemeClr val="accent1"/>
+          </a:effectRef>
+          <a:fontRef idx="minor">
+            <a:schemeClr val="tx1"/>
+          </a:fontRef>
+        </p:style>
+      </p:cxnSp>
+      <p:cxnSp>
+        <p:nvCxnSpPr>
+          <p:cNvPr id="12" name="Straight Arrow Connector 11">
+            <a:extLst>
+              <a:ext uri="{FF2B5EF4-FFF2-40B4-BE49-F238E27FC236}">
+                <a16:creationId xmlns:a16="http://schemas.microsoft.com/office/drawing/2014/main" id="{B9061EE1-D0F1-F9D9-8941-B0A5B988EEAF}"/>
+              </a:ext>
+            </a:extLst>
+          </p:cNvPr>
+          <p:cNvCxnSpPr>
+            <a:cxnSpLocks/>
+          </p:cNvCxnSpPr>
+          <p:nvPr/>
+        </p:nvCxnSpPr>
+        <p:spPr>
+          <a:xfrm flipV="1">
+            <a:off x="6096000" y="1158177"/>
+            <a:ext cx="846966" cy="844359"/>
+          </a:xfrm>
+          <a:prstGeom prst="straightConnector1">
+            <a:avLst/>
+          </a:prstGeom>
+          <a:ln w="25400">
+            <a:solidFill>
+              <a:schemeClr val="tx1"/>
+            </a:solidFill>
+            <a:prstDash val="dash"/>
+            <a:tailEnd type="triangle"/>
+          </a:ln>
+        </p:spPr>
+        <p:style>
+          <a:lnRef idx="1">
+            <a:schemeClr val="accent1"/>
+          </a:lnRef>
+          <a:fillRef idx="0">
+            <a:schemeClr val="accent1"/>
+          </a:fillRef>
+          <a:effectRef idx="0">
+            <a:schemeClr val="accent1"/>
+          </a:effectRef>
+          <a:fontRef idx="minor">
+            <a:schemeClr val="tx1"/>
+          </a:fontRef>
+        </p:style>
+      </p:cxnSp>
+    </p:spTree>
+    <p:extLst>
+      <p:ext uri="{BB962C8B-B14F-4D97-AF65-F5344CB8AC3E}">
+        <p14:creationId xmlns:p14="http://schemas.microsoft.com/office/powerpoint/2010/main" val="512629173"/>
+      </p:ext>
+    </p:extLst>
+  </p:cSld>
+  <p:clrMapOvr>
+    <a:masterClrMapping/>
+  </p:clrMapOvr>
+</p:sld>
+</file>
+
+<file path=ppt/slides/slide8.xml><?xml version="1.0" encoding="utf-8"?>
+<p:sld xmlns:a="http://schemas.openxmlformats.org/drawingml/2006/main" xmlns:r="http://schemas.openxmlformats.org/officeDocument/2006/relationships" xmlns:p="http://schemas.openxmlformats.org/presentationml/2006/main">
+  <p:cSld>
+    <p:spTree>
+      <p:nvGrpSpPr>
+        <p:cNvPr id="1" name=""/>
+        <p:cNvGrpSpPr/>
+        <p:nvPr/>
+      </p:nvGrpSpPr>
+      <p:grpSpPr>
+        <a:xfrm>
+          <a:off x="0" y="0"/>
+          <a:ext cx="0" cy="0"/>
+          <a:chOff x="0" y="0"/>
+          <a:chExt cx="0" cy="0"/>
+        </a:xfrm>
+      </p:grpSpPr>
+      <p:sp>
+        <p:nvSpPr>
+          <p:cNvPr id="2" name="Title 1">
+            <a:extLst>
+              <a:ext uri="{FF2B5EF4-FFF2-40B4-BE49-F238E27FC236}">
+                <a16:creationId xmlns:a16="http://schemas.microsoft.com/office/drawing/2014/main" id="{0FB4781A-87D7-177C-0998-29CDA356711F}"/>
+              </a:ext>
+            </a:extLst>
+          </p:cNvPr>
+          <p:cNvSpPr>
+            <a:spLocks noGrp="1"/>
+          </p:cNvSpPr>
+          <p:nvPr>
+            <p:ph type="title"/>
+          </p:nvPr>
+        </p:nvSpPr>
+        <p:spPr/>
+        <p:txBody>
+          <a:bodyPr/>
+          <a:lstStyle/>
+          <a:p>
+            <a:r>
+              <a:rPr lang="en-US" dirty="0"/>
+              <a:t>Backward Pumping</a:t>
+            </a:r>
+          </a:p>
+        </p:txBody>
+      </p:sp>
+      <p:sp>
+        <p:nvSpPr>
+          <p:cNvPr id="3" name="Slide Number Placeholder 2">
+            <a:extLst>
+              <a:ext uri="{FF2B5EF4-FFF2-40B4-BE49-F238E27FC236}">
+                <a16:creationId xmlns:a16="http://schemas.microsoft.com/office/drawing/2014/main" id="{47FEB1D5-FA4A-1F5D-5F0B-0F8E2C4E6FD2}"/>
+              </a:ext>
+            </a:extLst>
+          </p:cNvPr>
+          <p:cNvSpPr>
+            <a:spLocks noGrp="1"/>
+          </p:cNvSpPr>
+          <p:nvPr>
+            <p:ph type="sldNum" sz="quarter" idx="12"/>
+          </p:nvPr>
+        </p:nvSpPr>
+        <p:spPr/>
+        <p:txBody>
+          <a:bodyPr/>
+          <a:lstStyle/>
+          <a:p>
+            <a:fld id="{B9982081-D51A-40C8-8A41-6498517A0DD4}" type="slidenum">
+              <a:rPr lang="en-US" smtClean="0"/>
+              <a:t>8</a:t>
+            </a:fld>
+            <a:endParaRPr lang="en-US"/>
+          </a:p>
+        </p:txBody>
+      </p:sp>
+      <p:pic>
+        <p:nvPicPr>
+          <p:cNvPr id="4" name="Picture 3">
+            <a:extLst>
+              <a:ext uri="{FF2B5EF4-FFF2-40B4-BE49-F238E27FC236}">
+                <a16:creationId xmlns:a16="http://schemas.microsoft.com/office/drawing/2014/main" id="{87DC9BC0-34BF-EA8D-BEF1-C0E12A6286DF}"/>
+              </a:ext>
+            </a:extLst>
+          </p:cNvPr>
+          <p:cNvPicPr>
+            <a:picLocks noChangeAspect="1"/>
+          </p:cNvPicPr>
+          <p:nvPr/>
+        </p:nvPicPr>
+        <p:blipFill>
+          <a:blip r:embed="rId2"/>
+          <a:stretch>
+            <a:fillRect/>
+          </a:stretch>
+        </p:blipFill>
+        <p:spPr>
+          <a:xfrm>
+            <a:off x="738235" y="1743777"/>
+            <a:ext cx="6108700" cy="4330700"/>
+          </a:xfrm>
+          <a:prstGeom prst="rect">
+            <a:avLst/>
+          </a:prstGeom>
+        </p:spPr>
+      </p:pic>
+      <p:grpSp>
+        <p:nvGrpSpPr>
+          <p:cNvPr id="9" name="Group 8">
+            <a:extLst>
+              <a:ext uri="{FF2B5EF4-FFF2-40B4-BE49-F238E27FC236}">
+                <a16:creationId xmlns:a16="http://schemas.microsoft.com/office/drawing/2014/main" id="{2F62ABB0-406D-A670-6FF4-A34DE657E0FA}"/>
+              </a:ext>
+            </a:extLst>
+          </p:cNvPr>
+          <p:cNvGrpSpPr/>
+          <p:nvPr/>
+        </p:nvGrpSpPr>
+        <p:grpSpPr>
+          <a:xfrm>
+            <a:off x="7494396" y="-26682"/>
+            <a:ext cx="2818977" cy="6858000"/>
+            <a:chOff x="14779256" y="-5406461"/>
+            <a:chExt cx="7776315" cy="18918199"/>
+          </a:xfrm>
+        </p:grpSpPr>
+        <p:pic>
+          <p:nvPicPr>
+            <p:cNvPr id="10" name="Picture 9">
+              <a:extLst>
+                <a:ext uri="{FF2B5EF4-FFF2-40B4-BE49-F238E27FC236}">
+                  <a16:creationId xmlns:a16="http://schemas.microsoft.com/office/drawing/2014/main" id="{3B3171FF-DD4A-CE2D-6338-60A28C94EFAB}"/>
+                </a:ext>
+              </a:extLst>
+            </p:cNvPr>
+            <p:cNvPicPr>
+              <a:picLocks noChangeAspect="1"/>
+            </p:cNvPicPr>
+            <p:nvPr/>
+          </p:nvPicPr>
+          <p:blipFill>
+            <a:blip r:embed="rId3"/>
+            <a:stretch>
+              <a:fillRect/>
+            </a:stretch>
+          </p:blipFill>
+          <p:spPr>
+            <a:xfrm>
+              <a:off x="14779256" y="-5406461"/>
+              <a:ext cx="7769053" cy="6300216"/>
+            </a:xfrm>
+            <a:prstGeom prst="rect">
+              <a:avLst/>
+            </a:prstGeom>
+          </p:spPr>
+        </p:pic>
+        <p:pic>
+          <p:nvPicPr>
+            <p:cNvPr id="11" name="Picture 10">
+              <a:extLst>
+                <a:ext uri="{FF2B5EF4-FFF2-40B4-BE49-F238E27FC236}">
+                  <a16:creationId xmlns:a16="http://schemas.microsoft.com/office/drawing/2014/main" id="{5F2A90C1-9BF1-903A-FFB4-1D94D50B546B}"/>
+                </a:ext>
+              </a:extLst>
+            </p:cNvPr>
+            <p:cNvPicPr>
+              <a:picLocks noChangeAspect="1"/>
+            </p:cNvPicPr>
+            <p:nvPr/>
+          </p:nvPicPr>
+          <p:blipFill>
+            <a:blip r:embed="rId4"/>
+            <a:stretch>
+              <a:fillRect/>
+            </a:stretch>
+          </p:blipFill>
+          <p:spPr>
+            <a:xfrm>
+              <a:off x="14779256" y="893755"/>
+              <a:ext cx="7772400" cy="6372631"/>
+            </a:xfrm>
+            <a:prstGeom prst="rect">
+              <a:avLst/>
+            </a:prstGeom>
+          </p:spPr>
+        </p:pic>
+        <p:pic>
+          <p:nvPicPr>
+            <p:cNvPr id="12" name="Picture 11">
+              <a:extLst>
+                <a:ext uri="{FF2B5EF4-FFF2-40B4-BE49-F238E27FC236}">
+                  <a16:creationId xmlns:a16="http://schemas.microsoft.com/office/drawing/2014/main" id="{7C964EF6-BCE9-2201-476C-8B6D1E7EE6F3}"/>
+                </a:ext>
+              </a:extLst>
+            </p:cNvPr>
+            <p:cNvPicPr>
+              <a:picLocks noChangeAspect="1"/>
+            </p:cNvPicPr>
+            <p:nvPr/>
+          </p:nvPicPr>
+          <p:blipFill>
+            <a:blip r:embed="rId5"/>
+            <a:stretch>
+              <a:fillRect/>
+            </a:stretch>
+          </p:blipFill>
+          <p:spPr>
+            <a:xfrm>
+              <a:off x="14779256" y="7266386"/>
+              <a:ext cx="7776315" cy="6245352"/>
+            </a:xfrm>
+            <a:prstGeom prst="rect">
+              <a:avLst/>
+            </a:prstGeom>
+          </p:spPr>
+        </p:pic>
+      </p:grpSp>
+      <p:cxnSp>
+        <p:nvCxnSpPr>
+          <p:cNvPr id="13" name="Straight Arrow Connector 12">
+            <a:extLst>
+              <a:ext uri="{FF2B5EF4-FFF2-40B4-BE49-F238E27FC236}">
+                <a16:creationId xmlns:a16="http://schemas.microsoft.com/office/drawing/2014/main" id="{6876179D-C6F5-22EF-2E11-90F5E3FD8B7A}"/>
+              </a:ext>
+            </a:extLst>
+          </p:cNvPr>
+          <p:cNvCxnSpPr>
+            <a:cxnSpLocks/>
+          </p:cNvCxnSpPr>
+          <p:nvPr/>
+        </p:nvCxnSpPr>
+        <p:spPr>
+          <a:xfrm>
+            <a:off x="2340864" y="4766209"/>
+            <a:ext cx="4602102" cy="0"/>
+          </a:xfrm>
+          <a:prstGeom prst="straightConnector1">
+            <a:avLst/>
+          </a:prstGeom>
+          <a:ln w="25400">
+            <a:solidFill>
+              <a:schemeClr val="tx1"/>
+            </a:solidFill>
+            <a:prstDash val="dash"/>
+            <a:tailEnd type="triangle"/>
+          </a:ln>
+        </p:spPr>
+        <p:style>
+          <a:lnRef idx="1">
+            <a:schemeClr val="accent1"/>
+          </a:lnRef>
+          <a:fillRef idx="0">
+            <a:schemeClr val="accent1"/>
+          </a:fillRef>
+          <a:effectRef idx="0">
+            <a:schemeClr val="accent1"/>
+          </a:effectRef>
+          <a:fontRef idx="minor">
+            <a:schemeClr val="tx1"/>
+          </a:fontRef>
+        </p:style>
+      </p:cxnSp>
+      <p:cxnSp>
+        <p:nvCxnSpPr>
+          <p:cNvPr id="14" name="Straight Arrow Connector 13">
+            <a:extLst>
+              <a:ext uri="{FF2B5EF4-FFF2-40B4-BE49-F238E27FC236}">
+                <a16:creationId xmlns:a16="http://schemas.microsoft.com/office/drawing/2014/main" id="{5053D68F-D0A5-D256-E716-3441AA66C878}"/>
+              </a:ext>
+            </a:extLst>
+          </p:cNvPr>
+          <p:cNvCxnSpPr>
+            <a:cxnSpLocks/>
+          </p:cNvCxnSpPr>
+          <p:nvPr/>
+        </p:nvCxnSpPr>
+        <p:spPr>
+          <a:xfrm flipV="1">
+            <a:off x="2551176" y="3193441"/>
+            <a:ext cx="4391790" cy="336143"/>
+          </a:xfrm>
+          <a:prstGeom prst="straightConnector1">
+            <a:avLst/>
+          </a:prstGeom>
+          <a:ln w="25400">
+            <a:solidFill>
+              <a:schemeClr val="tx1"/>
+            </a:solidFill>
+            <a:prstDash val="dash"/>
+            <a:tailEnd type="triangle"/>
+          </a:ln>
+        </p:spPr>
+        <p:style>
+          <a:lnRef idx="1">
+            <a:schemeClr val="accent1"/>
+          </a:lnRef>
+          <a:fillRef idx="0">
+            <a:schemeClr val="accent1"/>
+          </a:fillRef>
+          <a:effectRef idx="0">
+            <a:schemeClr val="accent1"/>
+          </a:effectRef>
+          <a:fontRef idx="minor">
+            <a:schemeClr val="tx1"/>
+          </a:fontRef>
+        </p:style>
+      </p:cxnSp>
+      <p:cxnSp>
+        <p:nvCxnSpPr>
+          <p:cNvPr id="15" name="Straight Arrow Connector 14">
+            <a:extLst>
+              <a:ext uri="{FF2B5EF4-FFF2-40B4-BE49-F238E27FC236}">
+                <a16:creationId xmlns:a16="http://schemas.microsoft.com/office/drawing/2014/main" id="{88A7C9EB-D792-CACE-EF1D-82B13100E0DB}"/>
+              </a:ext>
+            </a:extLst>
+          </p:cNvPr>
+          <p:cNvCxnSpPr>
+            <a:cxnSpLocks/>
+          </p:cNvCxnSpPr>
+          <p:nvPr/>
+        </p:nvCxnSpPr>
+        <p:spPr>
+          <a:xfrm flipV="1">
+            <a:off x="6096000" y="1158177"/>
+            <a:ext cx="846966" cy="844359"/>
+          </a:xfrm>
+          <a:prstGeom prst="straightConnector1">
+            <a:avLst/>
+          </a:prstGeom>
+          <a:ln w="25400">
+            <a:solidFill>
+              <a:schemeClr val="tx1"/>
+            </a:solidFill>
+            <a:prstDash val="dash"/>
+            <a:tailEnd type="triangle"/>
+          </a:ln>
+        </p:spPr>
+        <p:style>
+          <a:lnRef idx="1">
+            <a:schemeClr val="accent1"/>
+          </a:lnRef>
+          <a:fillRef idx="0">
+            <a:schemeClr val="accent1"/>
+          </a:fillRef>
+          <a:effectRef idx="0">
+            <a:schemeClr val="accent1"/>
+          </a:effectRef>
+          <a:fontRef idx="minor">
+            <a:schemeClr val="tx1"/>
+          </a:fontRef>
+        </p:style>
+      </p:cxnSp>
+    </p:spTree>
+    <p:extLst>
+      <p:ext uri="{BB962C8B-B14F-4D97-AF65-F5344CB8AC3E}">
+        <p14:creationId xmlns:p14="http://schemas.microsoft.com/office/powerpoint/2010/main" val="285692881"/>
       </p:ext>
     </p:extLst>
   </p:cSld>

</xml_diff>

<commit_message>
now can do both forward and backward pumping!
</commit_message>
<xml_diff>
--- a/memo.pptx
+++ b/memo.pptx
@@ -5,7 +5,7 @@
     <p:sldMasterId id="2147483648" r:id="rId1"/>
   </p:sldMasterIdLst>
   <p:notesMasterIdLst>
-    <p:notesMasterId r:id="rId10"/>
+    <p:notesMasterId r:id="rId12"/>
   </p:notesMasterIdLst>
   <p:sldIdLst>
     <p:sldId id="257" r:id="rId2"/>
@@ -16,6 +16,8 @@
     <p:sldId id="260" r:id="rId7"/>
     <p:sldId id="264" r:id="rId8"/>
     <p:sldId id="265" r:id="rId9"/>
+    <p:sldId id="266" r:id="rId10"/>
+    <p:sldId id="267" r:id="rId11"/>
   </p:sldIdLst>
   <p:sldSz cx="12192000" cy="6858000"/>
   <p:notesSz cx="6858000" cy="9144000"/>
@@ -4831,6 +4833,381 @@
     <p:extLst>
       <p:ext uri="{BB962C8B-B14F-4D97-AF65-F5344CB8AC3E}">
         <p14:creationId xmlns:p14="http://schemas.microsoft.com/office/powerpoint/2010/main" val="2670367059"/>
+      </p:ext>
+    </p:extLst>
+  </p:cSld>
+  <p:clrMapOvr>
+    <a:masterClrMapping/>
+  </p:clrMapOvr>
+</p:sld>
+</file>
+
+<file path=ppt/slides/slide10.xml><?xml version="1.0" encoding="utf-8"?>
+<p:sld xmlns:a="http://schemas.openxmlformats.org/drawingml/2006/main" xmlns:r="http://schemas.openxmlformats.org/officeDocument/2006/relationships" xmlns:p="http://schemas.openxmlformats.org/presentationml/2006/main">
+  <p:cSld>
+    <p:spTree>
+      <p:nvGrpSpPr>
+        <p:cNvPr id="1" name=""/>
+        <p:cNvGrpSpPr/>
+        <p:nvPr/>
+      </p:nvGrpSpPr>
+      <p:grpSpPr>
+        <a:xfrm>
+          <a:off x="0" y="0"/>
+          <a:ext cx="0" cy="0"/>
+          <a:chOff x="0" y="0"/>
+          <a:chExt cx="0" cy="0"/>
+        </a:xfrm>
+      </p:grpSpPr>
+      <p:sp>
+        <p:nvSpPr>
+          <p:cNvPr id="2" name="Title 1">
+            <a:extLst>
+              <a:ext uri="{FF2B5EF4-FFF2-40B4-BE49-F238E27FC236}">
+                <a16:creationId xmlns:a16="http://schemas.microsoft.com/office/drawing/2014/main" id="{983F0DE1-5808-0EE3-9C2C-BD2DF09FD3C0}"/>
+              </a:ext>
+            </a:extLst>
+          </p:cNvPr>
+          <p:cNvSpPr>
+            <a:spLocks noGrp="1"/>
+          </p:cNvSpPr>
+          <p:nvPr>
+            <p:ph type="title"/>
+          </p:nvPr>
+        </p:nvSpPr>
+        <p:spPr/>
+        <p:txBody>
+          <a:bodyPr/>
+          <a:lstStyle/>
+          <a:p>
+            <a:r>
+              <a:rPr lang="en-US" dirty="0" err="1"/>
+              <a:t>Fwd</a:t>
+            </a:r>
+            <a:r>
+              <a:rPr lang="en-US" dirty="0"/>
+              <a:t> + </a:t>
+            </a:r>
+            <a:r>
+              <a:rPr lang="en-US" dirty="0" err="1"/>
+              <a:t>Bckwd</a:t>
+            </a:r>
+            <a:r>
+              <a:rPr lang="en-US" dirty="0"/>
+              <a:t> Pumping</a:t>
+            </a:r>
+          </a:p>
+        </p:txBody>
+      </p:sp>
+      <p:sp>
+        <p:nvSpPr>
+          <p:cNvPr id="3" name="Slide Number Placeholder 2">
+            <a:extLst>
+              <a:ext uri="{FF2B5EF4-FFF2-40B4-BE49-F238E27FC236}">
+                <a16:creationId xmlns:a16="http://schemas.microsoft.com/office/drawing/2014/main" id="{EF0DA8C1-2B0A-60F8-6203-BBE7624F3239}"/>
+              </a:ext>
+            </a:extLst>
+          </p:cNvPr>
+          <p:cNvSpPr>
+            <a:spLocks noGrp="1"/>
+          </p:cNvSpPr>
+          <p:nvPr>
+            <p:ph type="sldNum" sz="quarter" idx="12"/>
+          </p:nvPr>
+        </p:nvSpPr>
+        <p:spPr/>
+        <p:txBody>
+          <a:bodyPr/>
+          <a:lstStyle/>
+          <a:p>
+            <a:fld id="{B9982081-D51A-40C8-8A41-6498517A0DD4}" type="slidenum">
+              <a:rPr lang="en-US" smtClean="0"/>
+              <a:t>10</a:t>
+            </a:fld>
+            <a:endParaRPr lang="en-US"/>
+          </a:p>
+        </p:txBody>
+      </p:sp>
+      <p:pic>
+        <p:nvPicPr>
+          <p:cNvPr id="4" name="Picture 3">
+            <a:extLst>
+              <a:ext uri="{FF2B5EF4-FFF2-40B4-BE49-F238E27FC236}">
+                <a16:creationId xmlns:a16="http://schemas.microsoft.com/office/drawing/2014/main" id="{6E320EDD-7A11-0ECB-0D10-34AF7A2D1545}"/>
+              </a:ext>
+            </a:extLst>
+          </p:cNvPr>
+          <p:cNvPicPr>
+            <a:picLocks noChangeAspect="1"/>
+          </p:cNvPicPr>
+          <p:nvPr/>
+        </p:nvPicPr>
+        <p:blipFill>
+          <a:blip r:embed="rId2"/>
+          <a:stretch>
+            <a:fillRect/>
+          </a:stretch>
+        </p:blipFill>
+        <p:spPr>
+          <a:xfrm>
+            <a:off x="987628" y="1627081"/>
+            <a:ext cx="5955338" cy="4564091"/>
+          </a:xfrm>
+          <a:prstGeom prst="rect">
+            <a:avLst/>
+          </a:prstGeom>
+        </p:spPr>
+      </p:pic>
+      <p:grpSp>
+        <p:nvGrpSpPr>
+          <p:cNvPr id="9" name="Group 8">
+            <a:extLst>
+              <a:ext uri="{FF2B5EF4-FFF2-40B4-BE49-F238E27FC236}">
+                <a16:creationId xmlns:a16="http://schemas.microsoft.com/office/drawing/2014/main" id="{29F180C3-740E-B9B2-A45A-8A33C9485BAC}"/>
+              </a:ext>
+            </a:extLst>
+          </p:cNvPr>
+          <p:cNvGrpSpPr/>
+          <p:nvPr/>
+        </p:nvGrpSpPr>
+        <p:grpSpPr>
+          <a:xfrm>
+            <a:off x="7371590" y="1"/>
+            <a:ext cx="3309495" cy="6858000"/>
+            <a:chOff x="6942965" y="0"/>
+            <a:chExt cx="4461418" cy="9245037"/>
+          </a:xfrm>
+        </p:grpSpPr>
+        <p:pic>
+          <p:nvPicPr>
+            <p:cNvPr id="6" name="Picture 5">
+              <a:extLst>
+                <a:ext uri="{FF2B5EF4-FFF2-40B4-BE49-F238E27FC236}">
+                  <a16:creationId xmlns:a16="http://schemas.microsoft.com/office/drawing/2014/main" id="{75243071-6264-3D85-DE59-426F75AC6919}"/>
+                </a:ext>
+              </a:extLst>
+            </p:cNvPr>
+            <p:cNvPicPr>
+              <a:picLocks noChangeAspect="1"/>
+            </p:cNvPicPr>
+            <p:nvPr/>
+          </p:nvPicPr>
+          <p:blipFill>
+            <a:blip r:embed="rId3"/>
+            <a:stretch>
+              <a:fillRect/>
+            </a:stretch>
+          </p:blipFill>
+          <p:spPr>
+            <a:xfrm>
+              <a:off x="6954049" y="0"/>
+              <a:ext cx="4399751" cy="3061253"/>
+            </a:xfrm>
+            <a:prstGeom prst="rect">
+              <a:avLst/>
+            </a:prstGeom>
+          </p:spPr>
+        </p:pic>
+        <p:pic>
+          <p:nvPicPr>
+            <p:cNvPr id="7" name="Picture 6">
+              <a:extLst>
+                <a:ext uri="{FF2B5EF4-FFF2-40B4-BE49-F238E27FC236}">
+                  <a16:creationId xmlns:a16="http://schemas.microsoft.com/office/drawing/2014/main" id="{E3416592-2FE6-E896-FB43-DE28864CB837}"/>
+                </a:ext>
+              </a:extLst>
+            </p:cNvPr>
+            <p:cNvPicPr>
+              <a:picLocks noChangeAspect="1"/>
+            </p:cNvPicPr>
+            <p:nvPr/>
+          </p:nvPicPr>
+          <p:blipFill>
+            <a:blip r:embed="rId4"/>
+            <a:stretch>
+              <a:fillRect/>
+            </a:stretch>
+          </p:blipFill>
+          <p:spPr>
+            <a:xfrm>
+              <a:off x="6942965" y="2964537"/>
+              <a:ext cx="4410835" cy="3140250"/>
+            </a:xfrm>
+            <a:prstGeom prst="rect">
+              <a:avLst/>
+            </a:prstGeom>
+          </p:spPr>
+        </p:pic>
+        <p:pic>
+          <p:nvPicPr>
+            <p:cNvPr id="8" name="Picture 7">
+              <a:extLst>
+                <a:ext uri="{FF2B5EF4-FFF2-40B4-BE49-F238E27FC236}">
+                  <a16:creationId xmlns:a16="http://schemas.microsoft.com/office/drawing/2014/main" id="{0C11DEF4-98AE-B996-05B3-E4DB14BA455A}"/>
+                </a:ext>
+              </a:extLst>
+            </p:cNvPr>
+            <p:cNvPicPr>
+              <a:picLocks noChangeAspect="1"/>
+            </p:cNvPicPr>
+            <p:nvPr/>
+          </p:nvPicPr>
+          <p:blipFill>
+            <a:blip r:embed="rId5"/>
+            <a:stretch>
+              <a:fillRect/>
+            </a:stretch>
+          </p:blipFill>
+          <p:spPr>
+            <a:xfrm>
+              <a:off x="6954049" y="6104787"/>
+              <a:ext cx="4450334" cy="3140250"/>
+            </a:xfrm>
+            <a:prstGeom prst="rect">
+              <a:avLst/>
+            </a:prstGeom>
+          </p:spPr>
+        </p:pic>
+      </p:grpSp>
+      <p:cxnSp>
+        <p:nvCxnSpPr>
+          <p:cNvPr id="10" name="Straight Arrow Connector 9">
+            <a:extLst>
+              <a:ext uri="{FF2B5EF4-FFF2-40B4-BE49-F238E27FC236}">
+                <a16:creationId xmlns:a16="http://schemas.microsoft.com/office/drawing/2014/main" id="{C5D29300-650F-1142-41B7-C6C9E14F368E}"/>
+              </a:ext>
+            </a:extLst>
+          </p:cNvPr>
+          <p:cNvCxnSpPr>
+            <a:cxnSpLocks/>
+          </p:cNvCxnSpPr>
+          <p:nvPr/>
+        </p:nvCxnSpPr>
+        <p:spPr>
+          <a:xfrm flipV="1">
+            <a:off x="2271713" y="4766209"/>
+            <a:ext cx="4671253" cy="291566"/>
+          </a:xfrm>
+          <a:prstGeom prst="straightConnector1">
+            <a:avLst/>
+          </a:prstGeom>
+          <a:ln w="25400">
+            <a:solidFill>
+              <a:schemeClr val="tx1"/>
+            </a:solidFill>
+            <a:prstDash val="dash"/>
+            <a:tailEnd type="triangle"/>
+          </a:ln>
+        </p:spPr>
+        <p:style>
+          <a:lnRef idx="1">
+            <a:schemeClr val="accent1"/>
+          </a:lnRef>
+          <a:fillRef idx="0">
+            <a:schemeClr val="accent1"/>
+          </a:fillRef>
+          <a:effectRef idx="0">
+            <a:schemeClr val="accent1"/>
+          </a:effectRef>
+          <a:fontRef idx="minor">
+            <a:schemeClr val="tx1"/>
+          </a:fontRef>
+        </p:style>
+      </p:cxnSp>
+      <p:cxnSp>
+        <p:nvCxnSpPr>
+          <p:cNvPr id="11" name="Straight Arrow Connector 10">
+            <a:extLst>
+              <a:ext uri="{FF2B5EF4-FFF2-40B4-BE49-F238E27FC236}">
+                <a16:creationId xmlns:a16="http://schemas.microsoft.com/office/drawing/2014/main" id="{9859DBCF-467C-C7A9-550B-F7D64953F54D}"/>
+              </a:ext>
+            </a:extLst>
+          </p:cNvPr>
+          <p:cNvCxnSpPr>
+            <a:cxnSpLocks/>
+          </p:cNvCxnSpPr>
+          <p:nvPr/>
+        </p:nvCxnSpPr>
+        <p:spPr>
+          <a:xfrm flipV="1">
+            <a:off x="2414588" y="3193441"/>
+            <a:ext cx="4528378" cy="492734"/>
+          </a:xfrm>
+          <a:prstGeom prst="straightConnector1">
+            <a:avLst/>
+          </a:prstGeom>
+          <a:ln w="25400">
+            <a:solidFill>
+              <a:schemeClr val="tx1"/>
+            </a:solidFill>
+            <a:prstDash val="dash"/>
+            <a:tailEnd type="triangle"/>
+          </a:ln>
+        </p:spPr>
+        <p:style>
+          <a:lnRef idx="1">
+            <a:schemeClr val="accent1"/>
+          </a:lnRef>
+          <a:fillRef idx="0">
+            <a:schemeClr val="accent1"/>
+          </a:fillRef>
+          <a:effectRef idx="0">
+            <a:schemeClr val="accent1"/>
+          </a:effectRef>
+          <a:fontRef idx="minor">
+            <a:schemeClr val="tx1"/>
+          </a:fontRef>
+        </p:style>
+      </p:cxnSp>
+      <p:cxnSp>
+        <p:nvCxnSpPr>
+          <p:cNvPr id="12" name="Straight Arrow Connector 11">
+            <a:extLst>
+              <a:ext uri="{FF2B5EF4-FFF2-40B4-BE49-F238E27FC236}">
+                <a16:creationId xmlns:a16="http://schemas.microsoft.com/office/drawing/2014/main" id="{0C345CFC-FA1E-51C8-31DB-B0373362F8AC}"/>
+              </a:ext>
+            </a:extLst>
+          </p:cNvPr>
+          <p:cNvCxnSpPr>
+            <a:cxnSpLocks/>
+          </p:cNvCxnSpPr>
+          <p:nvPr/>
+        </p:nvCxnSpPr>
+        <p:spPr>
+          <a:xfrm flipV="1">
+            <a:off x="6315075" y="1158177"/>
+            <a:ext cx="627891" cy="727773"/>
+          </a:xfrm>
+          <a:prstGeom prst="straightConnector1">
+            <a:avLst/>
+          </a:prstGeom>
+          <a:ln w="25400">
+            <a:solidFill>
+              <a:schemeClr val="tx1"/>
+            </a:solidFill>
+            <a:prstDash val="dash"/>
+            <a:tailEnd type="triangle"/>
+          </a:ln>
+        </p:spPr>
+        <p:style>
+          <a:lnRef idx="1">
+            <a:schemeClr val="accent1"/>
+          </a:lnRef>
+          <a:fillRef idx="0">
+            <a:schemeClr val="accent1"/>
+          </a:fillRef>
+          <a:effectRef idx="0">
+            <a:schemeClr val="accent1"/>
+          </a:effectRef>
+          <a:fontRef idx="minor">
+            <a:schemeClr val="tx1"/>
+          </a:fontRef>
+        </p:style>
+      </p:cxnSp>
+    </p:spTree>
+    <p:extLst>
+      <p:ext uri="{BB962C8B-B14F-4D97-AF65-F5344CB8AC3E}">
+        <p14:creationId xmlns:p14="http://schemas.microsoft.com/office/powerpoint/2010/main" val="2610779335"/>
       </p:ext>
     </p:extLst>
   </p:cSld>
@@ -11724,6 +12101,300 @@
 </p:sld>
 </file>
 
+<file path=ppt/slides/slide9.xml><?xml version="1.0" encoding="utf-8"?>
+<p:sld xmlns:a="http://schemas.openxmlformats.org/drawingml/2006/main" xmlns:r="http://schemas.openxmlformats.org/officeDocument/2006/relationships" xmlns:p="http://schemas.openxmlformats.org/presentationml/2006/main">
+  <p:cSld>
+    <p:spTree>
+      <p:nvGrpSpPr>
+        <p:cNvPr id="1" name=""/>
+        <p:cNvGrpSpPr/>
+        <p:nvPr/>
+      </p:nvGrpSpPr>
+      <p:grpSpPr>
+        <a:xfrm>
+          <a:off x="0" y="0"/>
+          <a:ext cx="0" cy="0"/>
+          <a:chOff x="0" y="0"/>
+          <a:chExt cx="0" cy="0"/>
+        </a:xfrm>
+      </p:grpSpPr>
+      <p:sp>
+        <p:nvSpPr>
+          <p:cNvPr id="2" name="Title 1">
+            <a:extLst>
+              <a:ext uri="{FF2B5EF4-FFF2-40B4-BE49-F238E27FC236}">
+                <a16:creationId xmlns:a16="http://schemas.microsoft.com/office/drawing/2014/main" id="{24C37E4A-2006-2F3A-7CEF-C1B5E0307F4A}"/>
+              </a:ext>
+            </a:extLst>
+          </p:cNvPr>
+          <p:cNvSpPr>
+            <a:spLocks noGrp="1"/>
+          </p:cNvSpPr>
+          <p:nvPr>
+            <p:ph type="title"/>
+          </p:nvPr>
+        </p:nvSpPr>
+        <p:spPr/>
+        <p:txBody>
+          <a:bodyPr/>
+          <a:lstStyle/>
+          <a:p>
+            <a:r>
+              <a:rPr lang="en-US" dirty="0" err="1"/>
+              <a:t>Fwd</a:t>
+            </a:r>
+            <a:r>
+              <a:rPr lang="en-US" dirty="0"/>
+              <a:t> + </a:t>
+            </a:r>
+            <a:r>
+              <a:rPr lang="en-US" dirty="0" err="1"/>
+              <a:t>Bckwd</a:t>
+            </a:r>
+            <a:r>
+              <a:rPr lang="en-US" dirty="0"/>
+              <a:t> Pumping</a:t>
+            </a:r>
+          </a:p>
+        </p:txBody>
+      </p:sp>
+      <p:sp>
+        <p:nvSpPr>
+          <p:cNvPr id="3" name="Slide Number Placeholder 2">
+            <a:extLst>
+              <a:ext uri="{FF2B5EF4-FFF2-40B4-BE49-F238E27FC236}">
+                <a16:creationId xmlns:a16="http://schemas.microsoft.com/office/drawing/2014/main" id="{0569D8B0-4AD7-AE0B-1C6E-2AA8E5B09F19}"/>
+              </a:ext>
+            </a:extLst>
+          </p:cNvPr>
+          <p:cNvSpPr>
+            <a:spLocks noGrp="1"/>
+          </p:cNvSpPr>
+          <p:nvPr>
+            <p:ph type="sldNum" sz="quarter" idx="12"/>
+          </p:nvPr>
+        </p:nvSpPr>
+        <p:spPr/>
+        <p:txBody>
+          <a:bodyPr/>
+          <a:lstStyle/>
+          <a:p>
+            <a:fld id="{B9982081-D51A-40C8-8A41-6498517A0DD4}" type="slidenum">
+              <a:rPr lang="en-US" smtClean="0"/>
+              <a:t>9</a:t>
+            </a:fld>
+            <a:endParaRPr lang="en-US"/>
+          </a:p>
+        </p:txBody>
+      </p:sp>
+      <p:pic>
+        <p:nvPicPr>
+          <p:cNvPr id="5" name="Picture 4">
+            <a:extLst>
+              <a:ext uri="{FF2B5EF4-FFF2-40B4-BE49-F238E27FC236}">
+                <a16:creationId xmlns:a16="http://schemas.microsoft.com/office/drawing/2014/main" id="{5DC714BC-588E-CFB1-E3A4-8D21BA3D6FF3}"/>
+              </a:ext>
+            </a:extLst>
+          </p:cNvPr>
+          <p:cNvPicPr>
+            <a:picLocks noChangeAspect="1"/>
+          </p:cNvPicPr>
+          <p:nvPr/>
+        </p:nvPicPr>
+        <p:blipFill>
+          <a:blip r:embed="rId2"/>
+          <a:stretch>
+            <a:fillRect/>
+          </a:stretch>
+        </p:blipFill>
+        <p:spPr>
+          <a:xfrm>
+            <a:off x="987628" y="1627081"/>
+            <a:ext cx="5955338" cy="4564091"/>
+          </a:xfrm>
+          <a:prstGeom prst="rect">
+            <a:avLst/>
+          </a:prstGeom>
+        </p:spPr>
+      </p:pic>
+      <p:pic>
+        <p:nvPicPr>
+          <p:cNvPr id="6" name="Picture 5">
+            <a:extLst>
+              <a:ext uri="{FF2B5EF4-FFF2-40B4-BE49-F238E27FC236}">
+                <a16:creationId xmlns:a16="http://schemas.microsoft.com/office/drawing/2014/main" id="{F73C2E6B-F99A-FA99-4757-1BA9A7C6F3DA}"/>
+              </a:ext>
+            </a:extLst>
+          </p:cNvPr>
+          <p:cNvPicPr>
+            <a:picLocks noChangeAspect="1"/>
+          </p:cNvPicPr>
+          <p:nvPr/>
+        </p:nvPicPr>
+        <p:blipFill>
+          <a:blip r:embed="rId3"/>
+          <a:stretch>
+            <a:fillRect/>
+          </a:stretch>
+        </p:blipFill>
+        <p:spPr>
+          <a:xfrm>
+            <a:off x="7019192" y="-1"/>
+            <a:ext cx="3780692" cy="6858000"/>
+          </a:xfrm>
+          <a:prstGeom prst="rect">
+            <a:avLst/>
+          </a:prstGeom>
+        </p:spPr>
+      </p:pic>
+      <p:cxnSp>
+        <p:nvCxnSpPr>
+          <p:cNvPr id="7" name="Straight Arrow Connector 6">
+            <a:extLst>
+              <a:ext uri="{FF2B5EF4-FFF2-40B4-BE49-F238E27FC236}">
+                <a16:creationId xmlns:a16="http://schemas.microsoft.com/office/drawing/2014/main" id="{5D697AC0-97FB-F844-AEF7-A9470CB8AE50}"/>
+              </a:ext>
+            </a:extLst>
+          </p:cNvPr>
+          <p:cNvCxnSpPr>
+            <a:cxnSpLocks/>
+          </p:cNvCxnSpPr>
+          <p:nvPr/>
+        </p:nvCxnSpPr>
+        <p:spPr>
+          <a:xfrm flipV="1">
+            <a:off x="2271713" y="4766209"/>
+            <a:ext cx="4671253" cy="291566"/>
+          </a:xfrm>
+          <a:prstGeom prst="straightConnector1">
+            <a:avLst/>
+          </a:prstGeom>
+          <a:ln w="25400">
+            <a:solidFill>
+              <a:schemeClr val="tx1"/>
+            </a:solidFill>
+            <a:prstDash val="dash"/>
+            <a:tailEnd type="triangle"/>
+          </a:ln>
+        </p:spPr>
+        <p:style>
+          <a:lnRef idx="1">
+            <a:schemeClr val="accent1"/>
+          </a:lnRef>
+          <a:fillRef idx="0">
+            <a:schemeClr val="accent1"/>
+          </a:fillRef>
+          <a:effectRef idx="0">
+            <a:schemeClr val="accent1"/>
+          </a:effectRef>
+          <a:fontRef idx="minor">
+            <a:schemeClr val="tx1"/>
+          </a:fontRef>
+        </p:style>
+      </p:cxnSp>
+      <p:cxnSp>
+        <p:nvCxnSpPr>
+          <p:cNvPr id="8" name="Straight Arrow Connector 7">
+            <a:extLst>
+              <a:ext uri="{FF2B5EF4-FFF2-40B4-BE49-F238E27FC236}">
+                <a16:creationId xmlns:a16="http://schemas.microsoft.com/office/drawing/2014/main" id="{061BEFDE-10B2-379A-3029-18A1EE777A24}"/>
+              </a:ext>
+            </a:extLst>
+          </p:cNvPr>
+          <p:cNvCxnSpPr>
+            <a:cxnSpLocks/>
+          </p:cNvCxnSpPr>
+          <p:nvPr/>
+        </p:nvCxnSpPr>
+        <p:spPr>
+          <a:xfrm flipV="1">
+            <a:off x="2414588" y="3193441"/>
+            <a:ext cx="4528378" cy="492734"/>
+          </a:xfrm>
+          <a:prstGeom prst="straightConnector1">
+            <a:avLst/>
+          </a:prstGeom>
+          <a:ln w="25400">
+            <a:solidFill>
+              <a:schemeClr val="tx1"/>
+            </a:solidFill>
+            <a:prstDash val="dash"/>
+            <a:tailEnd type="triangle"/>
+          </a:ln>
+        </p:spPr>
+        <p:style>
+          <a:lnRef idx="1">
+            <a:schemeClr val="accent1"/>
+          </a:lnRef>
+          <a:fillRef idx="0">
+            <a:schemeClr val="accent1"/>
+          </a:fillRef>
+          <a:effectRef idx="0">
+            <a:schemeClr val="accent1"/>
+          </a:effectRef>
+          <a:fontRef idx="minor">
+            <a:schemeClr val="tx1"/>
+          </a:fontRef>
+        </p:style>
+      </p:cxnSp>
+      <p:cxnSp>
+        <p:nvCxnSpPr>
+          <p:cNvPr id="9" name="Straight Arrow Connector 8">
+            <a:extLst>
+              <a:ext uri="{FF2B5EF4-FFF2-40B4-BE49-F238E27FC236}">
+                <a16:creationId xmlns:a16="http://schemas.microsoft.com/office/drawing/2014/main" id="{31467DF2-3651-6600-6760-A13AF371F7A1}"/>
+              </a:ext>
+            </a:extLst>
+          </p:cNvPr>
+          <p:cNvCxnSpPr>
+            <a:cxnSpLocks/>
+          </p:cNvCxnSpPr>
+          <p:nvPr/>
+        </p:nvCxnSpPr>
+        <p:spPr>
+          <a:xfrm flipV="1">
+            <a:off x="6315075" y="1158177"/>
+            <a:ext cx="627891" cy="727773"/>
+          </a:xfrm>
+          <a:prstGeom prst="straightConnector1">
+            <a:avLst/>
+          </a:prstGeom>
+          <a:ln w="25400">
+            <a:solidFill>
+              <a:schemeClr val="tx1"/>
+            </a:solidFill>
+            <a:prstDash val="dash"/>
+            <a:tailEnd type="triangle"/>
+          </a:ln>
+        </p:spPr>
+        <p:style>
+          <a:lnRef idx="1">
+            <a:schemeClr val="accent1"/>
+          </a:lnRef>
+          <a:fillRef idx="0">
+            <a:schemeClr val="accent1"/>
+          </a:fillRef>
+          <a:effectRef idx="0">
+            <a:schemeClr val="accent1"/>
+          </a:effectRef>
+          <a:fontRef idx="minor">
+            <a:schemeClr val="tx1"/>
+          </a:fontRef>
+        </p:style>
+      </p:cxnSp>
+    </p:spTree>
+    <p:extLst>
+      <p:ext uri="{BB962C8B-B14F-4D97-AF65-F5344CB8AC3E}">
+        <p14:creationId xmlns:p14="http://schemas.microsoft.com/office/powerpoint/2010/main" val="3770553687"/>
+      </p:ext>
+    </p:extLst>
+  </p:cSld>
+  <p:clrMapOvr>
+    <a:masterClrMapping/>
+  </p:clrMapOvr>
+</p:sld>
+</file>
+
 <file path=ppt/theme/theme1.xml><?xml version="1.0" encoding="utf-8"?>
 <a:theme xmlns:a="http://schemas.openxmlformats.org/drawingml/2006/main" name="Office Theme">
   <a:themeElements>

</xml_diff>

<commit_message>
latest working updates, current issue is output power is too high
</commit_message>
<xml_diff>
--- a/memo.pptx
+++ b/memo.pptx
@@ -5,13 +5,15 @@
     <p:sldMasterId id="2147483648" r:id="rId1"/>
   </p:sldMasterIdLst>
   <p:notesMasterIdLst>
-    <p:notesMasterId r:id="rId6"/>
+    <p:notesMasterId r:id="rId8"/>
   </p:notesMasterIdLst>
   <p:sldIdLst>
     <p:sldId id="263" r:id="rId2"/>
     <p:sldId id="261" r:id="rId3"/>
     <p:sldId id="269" r:id="rId4"/>
     <p:sldId id="270" r:id="rId5"/>
+    <p:sldId id="272" r:id="rId6"/>
+    <p:sldId id="273" r:id="rId7"/>
   </p:sldIdLst>
   <p:sldSz cx="12192000" cy="6858000"/>
   <p:notesSz cx="6858000" cy="9144000"/>
@@ -200,7 +202,7 @@
           <a:p>
             <a:fld id="{95F362A7-A475-4602-906F-9130A1178AB1}" type="datetimeFigureOut">
               <a:rPr lang="en-US" smtClean="0"/>
-              <a:t>10/13/23</a:t>
+              <a:t>10/20/23</a:t>
             </a:fld>
             <a:endParaRPr lang="en-US"/>
           </a:p>
@@ -614,7 +616,7 @@
           <a:p>
             <a:fld id="{0D38F60B-329E-45AD-8EBB-D3927E357EB0}" type="datetime1">
               <a:rPr lang="en-US" smtClean="0"/>
-              <a:t>10/13/23</a:t>
+              <a:t>10/20/23</a:t>
             </a:fld>
             <a:endParaRPr lang="en-US"/>
           </a:p>
@@ -812,7 +814,7 @@
           <a:p>
             <a:fld id="{7644A20D-A245-4F10-84F9-51D5FC950958}" type="datetime1">
               <a:rPr lang="en-US" smtClean="0"/>
-              <a:t>10/13/23</a:t>
+              <a:t>10/20/23</a:t>
             </a:fld>
             <a:endParaRPr lang="en-US"/>
           </a:p>
@@ -1020,7 +1022,7 @@
           <a:p>
             <a:fld id="{9356318C-5F0D-4B43-96EA-F1352008C9B8}" type="datetime1">
               <a:rPr lang="en-US" smtClean="0"/>
-              <a:t>10/13/23</a:t>
+              <a:t>10/20/23</a:t>
             </a:fld>
             <a:endParaRPr lang="en-US"/>
           </a:p>
@@ -1228,7 +1230,7 @@
           <a:p>
             <a:fld id="{F6E96621-9D08-4937-91A6-0EA3793F0F07}" type="datetime1">
               <a:rPr lang="en-US" smtClean="0"/>
-              <a:t>10/13/23</a:t>
+              <a:t>10/20/23</a:t>
             </a:fld>
             <a:endParaRPr lang="en-US"/>
           </a:p>
@@ -1503,7 +1505,7 @@
           <a:p>
             <a:fld id="{3923D620-10DF-4508-991A-B9D388A501EE}" type="datetime1">
               <a:rPr lang="en-US" smtClean="0"/>
-              <a:t>10/13/23</a:t>
+              <a:t>10/20/23</a:t>
             </a:fld>
             <a:endParaRPr lang="en-US"/>
           </a:p>
@@ -1773,7 +1775,7 @@
           <a:p>
             <a:fld id="{92FA3270-DDBA-458A-9D06-6F36A210CFF8}" type="datetime1">
               <a:rPr lang="en-US" smtClean="0"/>
-              <a:t>10/13/23</a:t>
+              <a:t>10/20/23</a:t>
             </a:fld>
             <a:endParaRPr lang="en-US"/>
           </a:p>
@@ -2185,7 +2187,7 @@
           <a:p>
             <a:fld id="{BC650ADE-7CC5-4CA4-AEFD-DD163139B1E9}" type="datetime1">
               <a:rPr lang="en-US" smtClean="0"/>
-              <a:t>10/13/23</a:t>
+              <a:t>10/20/23</a:t>
             </a:fld>
             <a:endParaRPr lang="en-US"/>
           </a:p>
@@ -2331,7 +2333,7 @@
           <a:p>
             <a:fld id="{468D9ADD-CC3F-4DEB-87EF-630A12738E73}" type="datetime1">
               <a:rPr lang="en-US" smtClean="0"/>
-              <a:t>10/13/23</a:t>
+              <a:t>10/20/23</a:t>
             </a:fld>
             <a:endParaRPr lang="en-US"/>
           </a:p>
@@ -2444,7 +2446,7 @@
           <a:p>
             <a:fld id="{EC5B69B2-D125-4E7B-AA17-A8B6ACE8892E}" type="datetime1">
               <a:rPr lang="en-US" smtClean="0"/>
-              <a:t>10/13/23</a:t>
+              <a:t>10/20/23</a:t>
             </a:fld>
             <a:endParaRPr lang="en-US"/>
           </a:p>
@@ -2755,7 +2757,7 @@
           <a:p>
             <a:fld id="{BBE08CD8-AC86-4874-9FD2-AC99DC82CF46}" type="datetime1">
               <a:rPr lang="en-US" smtClean="0"/>
-              <a:t>10/13/23</a:t>
+              <a:t>10/20/23</a:t>
             </a:fld>
             <a:endParaRPr lang="en-US"/>
           </a:p>
@@ -3046,7 +3048,7 @@
           <a:p>
             <a:fld id="{3B82CD6C-2ADC-45ED-BCAD-25C1101DE6B9}" type="datetime1">
               <a:rPr lang="en-US" smtClean="0"/>
-              <a:t>10/13/23</a:t>
+              <a:t>10/20/23</a:t>
             </a:fld>
             <a:endParaRPr lang="en-US"/>
           </a:p>
@@ -3287,7 +3289,7 @@
           <a:p>
             <a:fld id="{BCB570C2-D09B-4F14-B535-9A0AFE946BB3}" type="datetime1">
               <a:rPr lang="en-US" smtClean="0"/>
-              <a:t>10/13/23</a:t>
+              <a:t>10/20/23</a:t>
             </a:fld>
             <a:endParaRPr lang="en-US"/>
           </a:p>
@@ -7532,8 +7534,8 @@
         </p:nvSpPr>
         <p:spPr>
           <a:xfrm>
-            <a:off x="7560768" y="994917"/>
-            <a:ext cx="4082592" cy="1754326"/>
+            <a:off x="7526325" y="1473115"/>
+            <a:ext cx="3303020" cy="1477328"/>
           </a:xfrm>
           <a:prstGeom prst="rect">
             <a:avLst/>
@@ -7558,11 +7560,11 @@
             </a:pPr>
             <a:r>
               <a:rPr lang="en-US" dirty="0"/>
-              <a:t>Total doping concentration (ions / m</a:t>
+              <a:t>Absorption cross-section (m</a:t>
             </a:r>
             <a:r>
               <a:rPr lang="en-US" baseline="30000" dirty="0"/>
-              <a:t>3</a:t>
+              <a:t>2</a:t>
             </a:r>
             <a:r>
               <a:rPr lang="en-US" dirty="0"/>
@@ -7576,7 +7578,7 @@
             </a:pPr>
             <a:r>
               <a:rPr lang="en-US" dirty="0"/>
-              <a:t>Absorption cross-section (m</a:t>
+              <a:t>Emission cross-section (m</a:t>
             </a:r>
             <a:r>
               <a:rPr lang="en-US" baseline="30000" dirty="0"/>
@@ -7594,15 +7596,7 @@
             </a:pPr>
             <a:r>
               <a:rPr lang="en-US" dirty="0"/>
-              <a:t>Emission cross-section (m</a:t>
-            </a:r>
-            <a:r>
-              <a:rPr lang="en-US" baseline="30000" dirty="0"/>
-              <a:t>2</a:t>
-            </a:r>
-            <a:r>
-              <a:rPr lang="en-US" dirty="0"/>
-              <a:t>)</a:t>
+              <a:t>Fiber core size</a:t>
             </a:r>
           </a:p>
           <a:p>
@@ -7612,282 +7606,11 @@
             </a:pPr>
             <a:r>
               <a:rPr lang="en-US" dirty="0"/>
-              <a:t>Fiber core size</a:t>
-            </a:r>
-          </a:p>
-          <a:p>
-            <a:pPr marL="342900" indent="-342900">
-              <a:buFont typeface="+mj-lt"/>
-              <a:buAutoNum type="arabicPeriod"/>
-            </a:pPr>
-            <a:r>
-              <a:rPr lang="en-US" dirty="0"/>
               <a:t>Excited state lifetime</a:t>
             </a:r>
           </a:p>
         </p:txBody>
       </p:sp>
-      <mc:AlternateContent xmlns:mc="http://schemas.openxmlformats.org/markup-compatibility/2006" xmlns:a14="http://schemas.microsoft.com/office/drawing/2010/main">
-        <mc:Choice Requires="a14">
-          <p:sp>
-            <p:nvSpPr>
-              <p:cNvPr id="16" name="TextBox 15">
-                <a:extLst>
-                  <a:ext uri="{FF2B5EF4-FFF2-40B4-BE49-F238E27FC236}">
-                    <a16:creationId xmlns:a16="http://schemas.microsoft.com/office/drawing/2014/main" id="{431691A4-A96B-63F4-E224-323DEDD3739E}"/>
-                  </a:ext>
-                </a:extLst>
-              </p:cNvPr>
-              <p:cNvSpPr txBox="1"/>
-              <p:nvPr/>
-            </p:nvSpPr>
-            <p:spPr>
-              <a:xfrm>
-                <a:off x="7209997" y="2889208"/>
-                <a:ext cx="4252703" cy="1200329"/>
-              </a:xfrm>
-              <a:prstGeom prst="rect">
-                <a:avLst/>
-              </a:prstGeom>
-              <a:noFill/>
-              <a:ln w="19050">
-                <a:solidFill>
-                  <a:schemeClr val="tx1"/>
-                </a:solidFill>
-              </a:ln>
-            </p:spPr>
-            <p:txBody>
-              <a:bodyPr wrap="none" rtlCol="0">
-                <a:spAutoFit/>
-              </a:bodyPr>
-              <a:lstStyle/>
-              <a:p>
-                <a:r>
-                  <a:rPr lang="en-US" dirty="0"/>
-                  <a:t>I’m taking 1-5 from an example from Ansys:</a:t>
-                </a:r>
-              </a:p>
-              <a:p>
-                <a:pPr/>
-                <a14:m>
-                  <m:oMathPara xmlns:m="http://schemas.openxmlformats.org/officeDocument/2006/math">
-                    <m:oMathParaPr>
-                      <m:jc m:val="centerGroup"/>
-                    </m:oMathParaPr>
-                    <m:oMath xmlns:m="http://schemas.openxmlformats.org/officeDocument/2006/math">
-                      <m:r>
-                        <a:rPr lang="en-US" b="0" i="1" smtClean="0">
-                          <a:latin typeface="Cambria Math" panose="02040503050406030204" pitchFamily="18" charset="0"/>
-                        </a:rPr>
-                        <m:t>𝑛</m:t>
-                      </m:r>
-                      <m:r>
-                        <a:rPr lang="en-US" b="0" i="1" smtClean="0">
-                          <a:latin typeface="Cambria Math" panose="02040503050406030204" pitchFamily="18" charset="0"/>
-                        </a:rPr>
-                        <m:t>=7×</m:t>
-                      </m:r>
-                      <m:sSup>
-                        <m:sSupPr>
-                          <m:ctrlPr>
-                            <a:rPr lang="en-US" b="0" i="1" smtClean="0">
-                              <a:latin typeface="Cambria Math" panose="02040503050406030204" pitchFamily="18" charset="0"/>
-                            </a:rPr>
-                          </m:ctrlPr>
-                        </m:sSupPr>
-                        <m:e>
-                          <m:r>
-                            <a:rPr lang="en-US" b="0" i="1" smtClean="0">
-                              <a:latin typeface="Cambria Math" panose="02040503050406030204" pitchFamily="18" charset="0"/>
-                            </a:rPr>
-                            <m:t>10</m:t>
-                          </m:r>
-                        </m:e>
-                        <m:sup>
-                          <m:r>
-                            <a:rPr lang="en-US" b="0" i="1" smtClean="0">
-                              <a:latin typeface="Cambria Math" panose="02040503050406030204" pitchFamily="18" charset="0"/>
-                            </a:rPr>
-                            <m:t>24</m:t>
-                          </m:r>
-                        </m:sup>
-                      </m:sSup>
-                      <m:r>
-                        <a:rPr lang="en-US" b="0" i="1" smtClean="0">
-                          <a:latin typeface="Cambria Math" panose="02040503050406030204" pitchFamily="18" charset="0"/>
-                        </a:rPr>
-                        <m:t> </m:t>
-                      </m:r>
-                      <m:sSup>
-                        <m:sSupPr>
-                          <m:ctrlPr>
-                            <a:rPr lang="en-US" b="0" i="1" smtClean="0">
-                              <a:latin typeface="Cambria Math" panose="02040503050406030204" pitchFamily="18" charset="0"/>
-                            </a:rPr>
-                          </m:ctrlPr>
-                        </m:sSupPr>
-                        <m:e>
-                          <m:r>
-                            <a:rPr lang="en-US" b="0" i="1" smtClean="0">
-                              <a:latin typeface="Cambria Math" panose="02040503050406030204" pitchFamily="18" charset="0"/>
-                            </a:rPr>
-                            <m:t>𝑚</m:t>
-                          </m:r>
-                        </m:e>
-                        <m:sup>
-                          <m:r>
-                            <a:rPr lang="en-US" b="0" i="1" smtClean="0">
-                              <a:latin typeface="Cambria Math" panose="02040503050406030204" pitchFamily="18" charset="0"/>
-                            </a:rPr>
-                            <m:t>−3</m:t>
-                          </m:r>
-                        </m:sup>
-                      </m:sSup>
-                    </m:oMath>
-                  </m:oMathPara>
-                </a14:m>
-                <a:endParaRPr lang="en-US" dirty="0"/>
-              </a:p>
-              <a:p>
-                <a:pPr/>
-                <a14:m>
-                  <m:oMathPara xmlns:m="http://schemas.openxmlformats.org/officeDocument/2006/math">
-                    <m:oMathParaPr>
-                      <m:jc m:val="centerGroup"/>
-                    </m:oMathParaPr>
-                    <m:oMath xmlns:m="http://schemas.openxmlformats.org/officeDocument/2006/math">
-                      <m:sSub>
-                        <m:sSubPr>
-                          <m:ctrlPr>
-                            <a:rPr lang="en-US" b="0" i="1" smtClean="0">
-                              <a:latin typeface="Cambria Math" panose="02040503050406030204" pitchFamily="18" charset="0"/>
-                            </a:rPr>
-                          </m:ctrlPr>
-                        </m:sSubPr>
-                        <m:e>
-                          <m:r>
-                            <a:rPr lang="en-US" b="0" i="1" smtClean="0">
-                              <a:latin typeface="Cambria Math" panose="02040503050406030204" pitchFamily="18" charset="0"/>
-                            </a:rPr>
-                            <m:t>𝑟</m:t>
-                          </m:r>
-                        </m:e>
-                        <m:sub>
-                          <m:r>
-                            <a:rPr lang="en-US" b="0" i="1" smtClean="0">
-                              <a:latin typeface="Cambria Math" panose="02040503050406030204" pitchFamily="18" charset="0"/>
-                            </a:rPr>
-                            <m:t>𝑐𝑜𝑟𝑒</m:t>
-                          </m:r>
-                        </m:sub>
-                      </m:sSub>
-                      <m:r>
-                        <a:rPr lang="en-US" b="0" i="1" smtClean="0">
-                          <a:latin typeface="Cambria Math" panose="02040503050406030204" pitchFamily="18" charset="0"/>
-                        </a:rPr>
-                        <m:t>=1.05 </m:t>
-                      </m:r>
-                      <m:r>
-                        <a:rPr lang="en-US" b="0" i="1" smtClean="0">
-                          <a:latin typeface="Cambria Math" panose="02040503050406030204" pitchFamily="18" charset="0"/>
-                        </a:rPr>
-                        <m:t>𝜇</m:t>
-                      </m:r>
-                      <m:r>
-                        <a:rPr lang="en-US" b="0" i="1" smtClean="0">
-                          <a:latin typeface="Cambria Math" panose="02040503050406030204" pitchFamily="18" charset="0"/>
-                        </a:rPr>
-                        <m:t>𝑚</m:t>
-                      </m:r>
-                    </m:oMath>
-                  </m:oMathPara>
-                </a14:m>
-                <a:endParaRPr lang="en-US" dirty="0"/>
-              </a:p>
-              <a:p>
-                <a:pPr/>
-                <a14:m>
-                  <m:oMathPara xmlns:m="http://schemas.openxmlformats.org/officeDocument/2006/math">
-                    <m:oMathParaPr>
-                      <m:jc m:val="centerGroup"/>
-                    </m:oMathParaPr>
-                    <m:oMath xmlns:m="http://schemas.openxmlformats.org/officeDocument/2006/math">
-                      <m:r>
-                        <a:rPr lang="en-US" b="0" i="1" smtClean="0">
-                          <a:latin typeface="Cambria Math" panose="02040503050406030204" pitchFamily="18" charset="0"/>
-                        </a:rPr>
-                        <m:t>𝜏</m:t>
-                      </m:r>
-                      <m:r>
-                        <a:rPr lang="en-US" b="0" i="1" smtClean="0">
-                          <a:latin typeface="Cambria Math" panose="02040503050406030204" pitchFamily="18" charset="0"/>
-                        </a:rPr>
-                        <m:t>=10.2 </m:t>
-                      </m:r>
-                      <m:r>
-                        <a:rPr lang="en-US" b="0" i="1" smtClean="0">
-                          <a:latin typeface="Cambria Math" panose="02040503050406030204" pitchFamily="18" charset="0"/>
-                        </a:rPr>
-                        <m:t>𝑚𝑠</m:t>
-                      </m:r>
-                    </m:oMath>
-                  </m:oMathPara>
-                </a14:m>
-                <a:endParaRPr lang="en-US" dirty="0"/>
-              </a:p>
-            </p:txBody>
-          </p:sp>
-        </mc:Choice>
-        <mc:Fallback xmlns="">
-          <p:sp>
-            <p:nvSpPr>
-              <p:cNvPr id="16" name="TextBox 15">
-                <a:extLst>
-                  <a:ext uri="{FF2B5EF4-FFF2-40B4-BE49-F238E27FC236}">
-                    <a16:creationId xmlns:a16="http://schemas.microsoft.com/office/drawing/2014/main" id="{431691A4-A96B-63F4-E224-323DEDD3739E}"/>
-                  </a:ext>
-                </a:extLst>
-              </p:cNvPr>
-              <p:cNvSpPr txBox="1">
-                <a:spLocks noRot="1" noChangeAspect="1" noMove="1" noResize="1" noEditPoints="1" noAdjustHandles="1" noChangeArrowheads="1" noChangeShapeType="1" noTextEdit="1"/>
-              </p:cNvSpPr>
-              <p:nvPr/>
-            </p:nvSpPr>
-            <p:spPr>
-              <a:xfrm>
-                <a:off x="7209997" y="2889208"/>
-                <a:ext cx="4252703" cy="1200329"/>
-              </a:xfrm>
-              <a:prstGeom prst="rect">
-                <a:avLst/>
-              </a:prstGeom>
-              <a:blipFill>
-                <a:blip r:embed="rId6"/>
-                <a:stretch>
-                  <a:fillRect l="-1187" t="-2062" b="-3093"/>
-                </a:stretch>
-              </a:blipFill>
-              <a:ln w="19050">
-                <a:solidFill>
-                  <a:schemeClr val="tx1"/>
-                </a:solidFill>
-              </a:ln>
-            </p:spPr>
-            <p:txBody>
-              <a:bodyPr/>
-              <a:lstStyle/>
-              <a:p>
-                <a:r>
-                  <a:rPr lang="en-US">
-                    <a:noFill/>
-                  </a:rPr>
-                  <a:t> </a:t>
-                </a:r>
-              </a:p>
-            </p:txBody>
-          </p:sp>
-        </mc:Fallback>
-      </mc:AlternateContent>
       <p:pic>
         <p:nvPicPr>
           <p:cNvPr id="20" name="Picture 19">
@@ -7903,7 +7626,7 @@
           <p:nvPr/>
         </p:nvPicPr>
         <p:blipFill>
-          <a:blip r:embed="rId7"/>
+          <a:blip r:embed="rId6"/>
           <a:stretch>
             <a:fillRect/>
           </a:stretch>
@@ -8732,6 +8455,167 @@
           </a:fontRef>
         </p:style>
       </p:cxnSp>
+      <mc:AlternateContent xmlns:mc="http://schemas.openxmlformats.org/markup-compatibility/2006">
+        <mc:Choice xmlns:a14="http://schemas.microsoft.com/office/drawing/2010/main" Requires="a14">
+          <p:sp>
+            <p:nvSpPr>
+              <p:cNvPr id="7" name="TextBox 6">
+                <a:extLst>
+                  <a:ext uri="{FF2B5EF4-FFF2-40B4-BE49-F238E27FC236}">
+                    <a16:creationId xmlns:a16="http://schemas.microsoft.com/office/drawing/2014/main" id="{2786311C-0A03-6097-C308-3FA1A5195932}"/>
+                  </a:ext>
+                </a:extLst>
+              </p:cNvPr>
+              <p:cNvSpPr txBox="1"/>
+              <p:nvPr/>
+            </p:nvSpPr>
+            <p:spPr>
+              <a:xfrm>
+                <a:off x="6809671" y="3243014"/>
+                <a:ext cx="4544129" cy="374270"/>
+              </a:xfrm>
+              <a:prstGeom prst="rect">
+                <a:avLst/>
+              </a:prstGeom>
+              <a:noFill/>
+            </p:spPr>
+            <p:txBody>
+              <a:bodyPr wrap="none" rtlCol="0">
+                <a:spAutoFit/>
+              </a:bodyPr>
+              <a:lstStyle/>
+              <a:p>
+                <a14:m>
+                  <m:oMath xmlns:m="http://schemas.openxmlformats.org/officeDocument/2006/math">
+                    <m:sSup>
+                      <m:sSupPr>
+                        <m:ctrlPr>
+                          <a:rPr lang="en-US" b="0" i="1" smtClean="0">
+                            <a:latin typeface="Cambria Math" panose="02040503050406030204" pitchFamily="18" charset="0"/>
+                          </a:rPr>
+                        </m:ctrlPr>
+                      </m:sSupPr>
+                      <m:e>
+                        <m:r>
+                          <a:rPr lang="en-US" b="0" i="1" smtClean="0">
+                            <a:latin typeface="Cambria Math" panose="02040503050406030204" pitchFamily="18" charset="0"/>
+                          </a:rPr>
+                          <m:t>𝑒</m:t>
+                        </m:r>
+                      </m:e>
+                      <m:sup>
+                        <m:r>
+                          <a:rPr lang="en-US" b="0" i="1" smtClean="0">
+                            <a:latin typeface="Cambria Math" panose="02040503050406030204" pitchFamily="18" charset="0"/>
+                          </a:rPr>
+                          <m:t>−</m:t>
+                        </m:r>
+                        <m:r>
+                          <m:rPr>
+                            <m:sty m:val="p"/>
+                          </m:rPr>
+                          <a:rPr lang="en-US" b="0" i="0" smtClean="0">
+                            <a:latin typeface="Cambria Math" panose="02040503050406030204" pitchFamily="18" charset="0"/>
+                          </a:rPr>
+                          <m:t>Γ</m:t>
+                        </m:r>
+                        <m:r>
+                          <a:rPr lang="en-US" b="0" i="1" smtClean="0">
+                            <a:latin typeface="Cambria Math" panose="02040503050406030204" pitchFamily="18" charset="0"/>
+                          </a:rPr>
+                          <m:t>𝜎</m:t>
+                        </m:r>
+                        <m:r>
+                          <a:rPr lang="en-US" b="0" i="1" smtClean="0">
+                            <a:latin typeface="Cambria Math" panose="02040503050406030204" pitchFamily="18" charset="0"/>
+                          </a:rPr>
+                          <m:t>𝑛𝑧</m:t>
+                        </m:r>
+                      </m:sup>
+                    </m:sSup>
+                  </m:oMath>
+                </a14:m>
+                <a:r>
+                  <a:rPr lang="en-US" dirty="0"/>
+                  <a:t> = small signal absorption </a:t>
+                </a:r>
+                <a14:m>
+                  <m:oMath xmlns:m="http://schemas.openxmlformats.org/officeDocument/2006/math">
+                    <m:r>
+                      <a:rPr lang="en-US" b="0" i="1" smtClean="0">
+                        <a:latin typeface="Cambria Math" panose="02040503050406030204" pitchFamily="18" charset="0"/>
+                      </a:rPr>
+                      <m:t>→</m:t>
+                    </m:r>
+                  </m:oMath>
+                </a14:m>
+                <a:r>
+                  <a:rPr lang="en-US" dirty="0"/>
+                  <a:t> </a:t>
+                </a:r>
+                <a14:m>
+                  <m:oMath xmlns:m="http://schemas.openxmlformats.org/officeDocument/2006/math">
+                    <m:r>
+                      <a:rPr lang="en-US" b="0" i="1" dirty="0" smtClean="0">
+                        <a:latin typeface="Cambria Math" panose="02040503050406030204" pitchFamily="18" charset="0"/>
+                      </a:rPr>
+                      <m:t>𝑛</m:t>
+                    </m:r>
+                  </m:oMath>
+                </a14:m>
+                <a:r>
+                  <a:rPr lang="en-US" dirty="0"/>
+                  <a:t> is known</a:t>
+                </a:r>
+              </a:p>
+            </p:txBody>
+          </p:sp>
+        </mc:Choice>
+        <mc:Fallback>
+          <p:sp>
+            <p:nvSpPr>
+              <p:cNvPr id="7" name="TextBox 6">
+                <a:extLst>
+                  <a:ext uri="{FF2B5EF4-FFF2-40B4-BE49-F238E27FC236}">
+                    <a16:creationId xmlns:a16="http://schemas.microsoft.com/office/drawing/2014/main" id="{2786311C-0A03-6097-C308-3FA1A5195932}"/>
+                  </a:ext>
+                </a:extLst>
+              </p:cNvPr>
+              <p:cNvSpPr txBox="1">
+                <a:spLocks noRot="1" noChangeAspect="1" noMove="1" noResize="1" noEditPoints="1" noAdjustHandles="1" noChangeArrowheads="1" noChangeShapeType="1" noTextEdit="1"/>
+              </p:cNvSpPr>
+              <p:nvPr/>
+            </p:nvSpPr>
+            <p:spPr>
+              <a:xfrm>
+                <a:off x="6809671" y="3243014"/>
+                <a:ext cx="4544129" cy="374270"/>
+              </a:xfrm>
+              <a:prstGeom prst="rect">
+                <a:avLst/>
+              </a:prstGeom>
+              <a:blipFill>
+                <a:blip r:embed="rId12"/>
+                <a:stretch>
+                  <a:fillRect t="-6667" b="-26667"/>
+                </a:stretch>
+              </a:blipFill>
+            </p:spPr>
+            <p:txBody>
+              <a:bodyPr/>
+              <a:lstStyle/>
+              <a:p>
+                <a:r>
+                  <a:rPr lang="en-US">
+                    <a:noFill/>
+                  </a:rPr>
+                  <a:t> </a:t>
+                </a:r>
+              </a:p>
+            </p:txBody>
+          </p:sp>
+        </mc:Fallback>
+      </mc:AlternateContent>
     </p:spTree>
     <p:extLst>
       <p:ext uri="{BB962C8B-B14F-4D97-AF65-F5344CB8AC3E}">
@@ -8819,8 +8703,8 @@
           </a:p>
         </p:txBody>
       </p:sp>
-      <mc:AlternateContent xmlns:mc="http://schemas.openxmlformats.org/markup-compatibility/2006">
-        <mc:Choice xmlns:a14="http://schemas.microsoft.com/office/drawing/2010/main" Requires="a14">
+      <mc:AlternateContent xmlns:mc="http://schemas.openxmlformats.org/markup-compatibility/2006" xmlns:a14="http://schemas.microsoft.com/office/drawing/2010/main">
+        <mc:Choice Requires="a14">
           <p:sp>
             <p:nvSpPr>
               <p:cNvPr id="9" name="TextBox 8">
@@ -8905,7 +8789,7 @@
                 </a:pPr>
                 <a:r>
                   <a:rPr lang="en-US" dirty="0"/>
-                  <a:t>Starting out first with forward pumping</a:t>
+                  <a:t>Starting out first with forward pumping. Solve backward pumping with shooting method.</a:t>
                 </a:r>
               </a:p>
               <a:p>
@@ -9010,7 +8894,7 @@
             </p:txBody>
           </p:sp>
         </mc:Choice>
-        <mc:Fallback>
+        <mc:Fallback xmlns="">
           <p:sp>
             <p:nvSpPr>
               <p:cNvPr id="9" name="TextBox 8">
@@ -9216,6 +9100,526 @@
     <p:extLst>
       <p:ext uri="{BB962C8B-B14F-4D97-AF65-F5344CB8AC3E}">
         <p14:creationId xmlns:p14="http://schemas.microsoft.com/office/powerpoint/2010/main" val="1775009256"/>
+      </p:ext>
+    </p:extLst>
+  </p:cSld>
+  <p:clrMapOvr>
+    <a:masterClrMapping/>
+  </p:clrMapOvr>
+</p:sld>
+</file>
+
+<file path=ppt/slides/slide5.xml><?xml version="1.0" encoding="utf-8"?>
+<p:sld xmlns:a="http://schemas.openxmlformats.org/drawingml/2006/main" xmlns:r="http://schemas.openxmlformats.org/officeDocument/2006/relationships" xmlns:p="http://schemas.openxmlformats.org/presentationml/2006/main">
+  <p:cSld>
+    <p:spTree>
+      <p:nvGrpSpPr>
+        <p:cNvPr id="1" name=""/>
+        <p:cNvGrpSpPr/>
+        <p:nvPr/>
+      </p:nvGrpSpPr>
+      <p:grpSpPr>
+        <a:xfrm>
+          <a:off x="0" y="0"/>
+          <a:ext cx="0" cy="0"/>
+          <a:chOff x="0" y="0"/>
+          <a:chExt cx="0" cy="0"/>
+        </a:xfrm>
+      </p:grpSpPr>
+      <p:sp>
+        <p:nvSpPr>
+          <p:cNvPr id="6" name="Title 5">
+            <a:extLst>
+              <a:ext uri="{FF2B5EF4-FFF2-40B4-BE49-F238E27FC236}">
+                <a16:creationId xmlns:a16="http://schemas.microsoft.com/office/drawing/2014/main" id="{00C4124E-C7EA-DE4A-4868-7AC9A19B3CE0}"/>
+              </a:ext>
+            </a:extLst>
+          </p:cNvPr>
+          <p:cNvSpPr>
+            <a:spLocks noGrp="1"/>
+          </p:cNvSpPr>
+          <p:nvPr>
+            <p:ph type="title"/>
+          </p:nvPr>
+        </p:nvSpPr>
+        <p:spPr/>
+        <p:txBody>
+          <a:bodyPr/>
+          <a:lstStyle/>
+          <a:p>
+            <a:r>
+              <a:rPr lang="en-US" dirty="0"/>
+              <a:t>Accounting for excited state absorption</a:t>
+            </a:r>
+          </a:p>
+        </p:txBody>
+      </p:sp>
+      <p:sp>
+        <p:nvSpPr>
+          <p:cNvPr id="7" name="Text Placeholder 6">
+            <a:extLst>
+              <a:ext uri="{FF2B5EF4-FFF2-40B4-BE49-F238E27FC236}">
+                <a16:creationId xmlns:a16="http://schemas.microsoft.com/office/drawing/2014/main" id="{143E3D10-ECD0-713B-31F0-9532D178AAC4}"/>
+              </a:ext>
+            </a:extLst>
+          </p:cNvPr>
+          <p:cNvSpPr>
+            <a:spLocks noGrp="1"/>
+          </p:cNvSpPr>
+          <p:nvPr>
+            <p:ph type="body" idx="1"/>
+          </p:nvPr>
+        </p:nvSpPr>
+        <p:spPr/>
+        <p:txBody>
+          <a:bodyPr/>
+          <a:lstStyle/>
+          <a:p>
+            <a:endParaRPr lang="en-US" dirty="0"/>
+          </a:p>
+        </p:txBody>
+      </p:sp>
+      <p:sp>
+        <p:nvSpPr>
+          <p:cNvPr id="3" name="Slide Number Placeholder 2">
+            <a:extLst>
+              <a:ext uri="{FF2B5EF4-FFF2-40B4-BE49-F238E27FC236}">
+                <a16:creationId xmlns:a16="http://schemas.microsoft.com/office/drawing/2014/main" id="{B144C6E4-7F9D-7DE2-811D-1D4B6E46F08C}"/>
+              </a:ext>
+            </a:extLst>
+          </p:cNvPr>
+          <p:cNvSpPr>
+            <a:spLocks noGrp="1"/>
+          </p:cNvSpPr>
+          <p:nvPr>
+            <p:ph type="sldNum" sz="quarter" idx="12"/>
+          </p:nvPr>
+        </p:nvSpPr>
+        <p:spPr/>
+        <p:txBody>
+          <a:bodyPr/>
+          <a:lstStyle/>
+          <a:p>
+            <a:fld id="{B9982081-D51A-40C8-8A41-6498517A0DD4}" type="slidenum">
+              <a:rPr lang="en-US" smtClean="0"/>
+              <a:t>5</a:t>
+            </a:fld>
+            <a:endParaRPr lang="en-US"/>
+          </a:p>
+        </p:txBody>
+      </p:sp>
+    </p:spTree>
+    <p:extLst>
+      <p:ext uri="{BB962C8B-B14F-4D97-AF65-F5344CB8AC3E}">
+        <p14:creationId xmlns:p14="http://schemas.microsoft.com/office/powerpoint/2010/main" val="3837137468"/>
+      </p:ext>
+    </p:extLst>
+  </p:cSld>
+  <p:clrMapOvr>
+    <a:masterClrMapping/>
+  </p:clrMapOvr>
+</p:sld>
+</file>
+
+<file path=ppt/slides/slide6.xml><?xml version="1.0" encoding="utf-8"?>
+<p:sld xmlns:a="http://schemas.openxmlformats.org/drawingml/2006/main" xmlns:r="http://schemas.openxmlformats.org/officeDocument/2006/relationships" xmlns:p="http://schemas.openxmlformats.org/presentationml/2006/main">
+  <p:cSld>
+    <p:spTree>
+      <p:nvGrpSpPr>
+        <p:cNvPr id="1" name=""/>
+        <p:cNvGrpSpPr/>
+        <p:nvPr/>
+      </p:nvGrpSpPr>
+      <p:grpSpPr>
+        <a:xfrm>
+          <a:off x="0" y="0"/>
+          <a:ext cx="0" cy="0"/>
+          <a:chOff x="0" y="0"/>
+          <a:chExt cx="0" cy="0"/>
+        </a:xfrm>
+      </p:grpSpPr>
+      <mc:AlternateContent xmlns:mc="http://schemas.openxmlformats.org/markup-compatibility/2006">
+        <mc:Choice xmlns:a14="http://schemas.microsoft.com/office/drawing/2010/main" Requires="a14">
+          <p:sp>
+            <p:nvSpPr>
+              <p:cNvPr id="5" name="Title 4">
+                <a:extLst>
+                  <a:ext uri="{FF2B5EF4-FFF2-40B4-BE49-F238E27FC236}">
+                    <a16:creationId xmlns:a16="http://schemas.microsoft.com/office/drawing/2014/main" id="{F4E580B5-A9FD-9CC8-F608-E1B662FF13AD}"/>
+                  </a:ext>
+                </a:extLst>
+              </p:cNvPr>
+              <p:cNvSpPr>
+                <a:spLocks noGrp="1"/>
+              </p:cNvSpPr>
+              <p:nvPr>
+                <p:ph type="title"/>
+              </p:nvPr>
+            </p:nvSpPr>
+            <p:spPr/>
+            <p:txBody>
+              <a:bodyPr>
+                <a:normAutofit/>
+              </a:bodyPr>
+              <a:lstStyle/>
+              <a:p>
+                <a:r>
+                  <a:rPr lang="en-US" dirty="0"/>
+                  <a:t>ESA for both pump and signal </a:t>
+                </a:r>
+                <a14:m>
+                  <m:oMath xmlns:m="http://schemas.openxmlformats.org/officeDocument/2006/math">
+                    <m:r>
+                      <a:rPr lang="en-US" b="0" i="1" smtClean="0">
+                        <a:latin typeface="Cambria Math" panose="02040503050406030204" pitchFamily="18" charset="0"/>
+                      </a:rPr>
+                      <m:t>→</m:t>
+                    </m:r>
+                  </m:oMath>
+                </a14:m>
+                <a:r>
+                  <a:rPr lang="en-US" dirty="0"/>
+                  <a:t> 5-levels</a:t>
+                </a:r>
+              </a:p>
+            </p:txBody>
+          </p:sp>
+        </mc:Choice>
+        <mc:Fallback>
+          <p:sp>
+            <p:nvSpPr>
+              <p:cNvPr id="5" name="Title 4">
+                <a:extLst>
+                  <a:ext uri="{FF2B5EF4-FFF2-40B4-BE49-F238E27FC236}">
+                    <a16:creationId xmlns:a16="http://schemas.microsoft.com/office/drawing/2014/main" id="{F4E580B5-A9FD-9CC8-F608-E1B662FF13AD}"/>
+                  </a:ext>
+                </a:extLst>
+              </p:cNvPr>
+              <p:cNvSpPr>
+                <a:spLocks noGrp="1" noRot="1" noChangeAspect="1" noMove="1" noResize="1" noEditPoints="1" noAdjustHandles="1" noChangeArrowheads="1" noChangeShapeType="1" noTextEdit="1"/>
+              </p:cNvSpPr>
+              <p:nvPr>
+                <p:ph type="title"/>
+              </p:nvPr>
+            </p:nvSpPr>
+            <p:spPr>
+              <a:blipFill>
+                <a:blip r:embed="rId2"/>
+                <a:stretch>
+                  <a:fillRect l="-2413" t="-11268" b="-22535"/>
+                </a:stretch>
+              </a:blipFill>
+            </p:spPr>
+            <p:txBody>
+              <a:bodyPr/>
+              <a:lstStyle/>
+              <a:p>
+                <a:r>
+                  <a:rPr lang="en-US">
+                    <a:noFill/>
+                  </a:rPr>
+                  <a:t> </a:t>
+                </a:r>
+              </a:p>
+            </p:txBody>
+          </p:sp>
+        </mc:Fallback>
+      </mc:AlternateContent>
+      <p:sp>
+        <p:nvSpPr>
+          <p:cNvPr id="4" name="Slide Number Placeholder 3">
+            <a:extLst>
+              <a:ext uri="{FF2B5EF4-FFF2-40B4-BE49-F238E27FC236}">
+                <a16:creationId xmlns:a16="http://schemas.microsoft.com/office/drawing/2014/main" id="{56AA6F92-F9C4-C646-B0B0-159F125BEA46}"/>
+              </a:ext>
+            </a:extLst>
+          </p:cNvPr>
+          <p:cNvSpPr>
+            <a:spLocks noGrp="1"/>
+          </p:cNvSpPr>
+          <p:nvPr>
+            <p:ph type="sldNum" sz="quarter" idx="12"/>
+          </p:nvPr>
+        </p:nvSpPr>
+        <p:spPr/>
+        <p:txBody>
+          <a:bodyPr/>
+          <a:lstStyle/>
+          <a:p>
+            <a:fld id="{B9982081-D51A-40C8-8A41-6498517A0DD4}" type="slidenum">
+              <a:rPr lang="en-US" smtClean="0"/>
+              <a:t>6</a:t>
+            </a:fld>
+            <a:endParaRPr lang="en-US"/>
+          </a:p>
+        </p:txBody>
+      </p:sp>
+      <p:pic>
+        <p:nvPicPr>
+          <p:cNvPr id="3" name="Picture 2" descr="A black background with blue text&#10;&#10;Description automatically generated">
+            <a:extLst>
+              <a:ext uri="{FF2B5EF4-FFF2-40B4-BE49-F238E27FC236}">
+                <a16:creationId xmlns:a16="http://schemas.microsoft.com/office/drawing/2014/main" id="{DB607998-0BAF-0F70-CD19-D0AD4CEA67CC}"/>
+              </a:ext>
+            </a:extLst>
+          </p:cNvPr>
+          <p:cNvPicPr>
+            <a:picLocks noChangeAspect="1"/>
+          </p:cNvPicPr>
+          <p:nvPr/>
+        </p:nvPicPr>
+        <p:blipFill>
+          <a:blip r:embed="rId3">
+            <a:extLst>
+              <a:ext uri="{28A0092B-C50C-407E-A947-70E740481C1C}">
+                <a14:useLocalDpi xmlns:a14="http://schemas.microsoft.com/office/drawing/2010/main" val="0"/>
+              </a:ext>
+            </a:extLst>
+          </a:blip>
+          <a:stretch>
+            <a:fillRect/>
+          </a:stretch>
+        </p:blipFill>
+        <p:spPr>
+          <a:xfrm>
+            <a:off x="838200" y="1064028"/>
+            <a:ext cx="4711700" cy="5346700"/>
+          </a:xfrm>
+          <a:prstGeom prst="rect">
+            <a:avLst/>
+          </a:prstGeom>
+        </p:spPr>
+      </p:pic>
+      <p:sp>
+        <p:nvSpPr>
+          <p:cNvPr id="6" name="TextBox 5">
+            <a:extLst>
+              <a:ext uri="{FF2B5EF4-FFF2-40B4-BE49-F238E27FC236}">
+                <a16:creationId xmlns:a16="http://schemas.microsoft.com/office/drawing/2014/main" id="{4A45212B-4295-B918-335C-C6452541EAC2}"/>
+              </a:ext>
+            </a:extLst>
+          </p:cNvPr>
+          <p:cNvSpPr txBox="1"/>
+          <p:nvPr/>
+        </p:nvSpPr>
+        <p:spPr>
+          <a:xfrm>
+            <a:off x="6620933" y="1346200"/>
+            <a:ext cx="4182534" cy="3139321"/>
+          </a:xfrm>
+          <a:prstGeom prst="rect">
+            <a:avLst/>
+          </a:prstGeom>
+          <a:noFill/>
+        </p:spPr>
+        <p:txBody>
+          <a:bodyPr wrap="square" rtlCol="0">
+            <a:spAutoFit/>
+          </a:bodyPr>
+          <a:lstStyle/>
+          <a:p>
+            <a:pPr marL="342900" indent="-342900">
+              <a:buFont typeface="Arial" panose="020B0604020202020204" pitchFamily="34" charset="0"/>
+              <a:buChar char="•"/>
+            </a:pPr>
+            <a:r>
+              <a:rPr lang="en-US" dirty="0"/>
+              <a:t>You need to include lifetimes to “close” the circuit if you want to apply steady state (i.e. energy needs to be conserved). </a:t>
+            </a:r>
+          </a:p>
+          <a:p>
+            <a:pPr marL="342900" indent="-342900">
+              <a:buFont typeface="Arial" panose="020B0604020202020204" pitchFamily="34" charset="0"/>
+              <a:buChar char="•"/>
+            </a:pPr>
+            <a:r>
+              <a:rPr lang="en-US" dirty="0"/>
+              <a:t>You can isolate population to the pump level (3), laser excited state (2), and (5) which is responsible for the green fluorescence.</a:t>
+            </a:r>
+          </a:p>
+          <a:p>
+            <a:pPr marL="800100" lvl="1" indent="-342900">
+              <a:buFont typeface="Arial" panose="020B0604020202020204" pitchFamily="34" charset="0"/>
+              <a:buChar char="•"/>
+            </a:pPr>
+            <a:r>
+              <a:rPr lang="en-US" dirty="0"/>
+              <a:t>Done by making the lifetime of (4) much smaller than the others (e.g. ns)</a:t>
+            </a:r>
+          </a:p>
+        </p:txBody>
+      </p:sp>
+      <p:sp>
+        <p:nvSpPr>
+          <p:cNvPr id="7" name="TextBox 6">
+            <a:extLst>
+              <a:ext uri="{FF2B5EF4-FFF2-40B4-BE49-F238E27FC236}">
+                <a16:creationId xmlns:a16="http://schemas.microsoft.com/office/drawing/2014/main" id="{574732EA-45D5-DD9D-2442-51D3266C27DE}"/>
+              </a:ext>
+            </a:extLst>
+          </p:cNvPr>
+          <p:cNvSpPr txBox="1"/>
+          <p:nvPr/>
+        </p:nvSpPr>
+        <p:spPr>
+          <a:xfrm>
+            <a:off x="0" y="6581001"/>
+            <a:ext cx="4642425" cy="276999"/>
+          </a:xfrm>
+          <a:prstGeom prst="rect">
+            <a:avLst/>
+          </a:prstGeom>
+          <a:noFill/>
+        </p:spPr>
+        <p:txBody>
+          <a:bodyPr wrap="none" rtlCol="0">
+            <a:spAutoFit/>
+          </a:bodyPr>
+          <a:lstStyle/>
+          <a:p>
+            <a:r>
+              <a:rPr lang="en-US" sz="1200" dirty="0"/>
+              <a:t>Yu. O. </a:t>
+            </a:r>
+            <a:r>
+              <a:rPr lang="en-US" sz="1200" dirty="0" err="1"/>
+              <a:t>Barmenkov</a:t>
+            </a:r>
+            <a:r>
+              <a:rPr lang="en-US" sz="1200" dirty="0"/>
+              <a:t>, et al., Journal of Applied Physics 106, 083108 (2009).</a:t>
+            </a:r>
+          </a:p>
+        </p:txBody>
+      </p:sp>
+      <p:sp>
+        <p:nvSpPr>
+          <p:cNvPr id="8" name="TextBox 7">
+            <a:extLst>
+              <a:ext uri="{FF2B5EF4-FFF2-40B4-BE49-F238E27FC236}">
+                <a16:creationId xmlns:a16="http://schemas.microsoft.com/office/drawing/2014/main" id="{37AB44EC-52B1-DB32-6903-2A03F53854AA}"/>
+              </a:ext>
+            </a:extLst>
+          </p:cNvPr>
+          <p:cNvSpPr txBox="1"/>
+          <p:nvPr/>
+        </p:nvSpPr>
+        <p:spPr>
+          <a:xfrm>
+            <a:off x="4775200" y="5424640"/>
+            <a:ext cx="5751511" cy="369332"/>
+          </a:xfrm>
+          <a:prstGeom prst="rect">
+            <a:avLst/>
+          </a:prstGeom>
+          <a:noFill/>
+        </p:spPr>
+        <p:txBody>
+          <a:bodyPr wrap="none" rtlCol="0">
+            <a:spAutoFit/>
+          </a:bodyPr>
+          <a:lstStyle/>
+          <a:p>
+            <a:r>
+              <a:rPr lang="en-US" dirty="0"/>
+              <a:t>Solve for n</a:t>
+            </a:r>
+            <a:r>
+              <a:rPr lang="en-US" baseline="-25000" dirty="0"/>
+              <a:t>1</a:t>
+            </a:r>
+            <a:r>
+              <a:rPr lang="en-US" dirty="0"/>
+              <a:t> n</a:t>
+            </a:r>
+            <a:r>
+              <a:rPr lang="en-US" baseline="-25000" dirty="0"/>
+              <a:t>2</a:t>
+            </a:r>
+            <a:r>
+              <a:rPr lang="en-US" dirty="0"/>
+              <a:t> n</a:t>
+            </a:r>
+            <a:r>
+              <a:rPr lang="en-US" baseline="-25000" dirty="0"/>
+              <a:t>3</a:t>
+            </a:r>
+            <a:r>
+              <a:rPr lang="en-US" dirty="0"/>
+              <a:t> n</a:t>
+            </a:r>
+            <a:r>
+              <a:rPr lang="en-US" baseline="-25000" dirty="0"/>
+              <a:t>4</a:t>
+            </a:r>
+            <a:r>
+              <a:rPr lang="en-US" dirty="0"/>
+              <a:t> n</a:t>
+            </a:r>
+            <a:r>
+              <a:rPr lang="en-US" baseline="-25000" dirty="0"/>
+              <a:t>5</a:t>
+            </a:r>
+            <a:r>
+              <a:rPr lang="en-US" dirty="0"/>
+              <a:t> in terms of </a:t>
+            </a:r>
+            <a:r>
+              <a:rPr lang="en-US" dirty="0" err="1"/>
+              <a:t>n</a:t>
+            </a:r>
+            <a:r>
+              <a:rPr lang="en-US" baseline="-25000" dirty="0" err="1"/>
+              <a:t>tot</a:t>
+            </a:r>
+            <a:r>
+              <a:rPr lang="en-US" dirty="0"/>
+              <a:t> = n</a:t>
+            </a:r>
+            <a:r>
+              <a:rPr lang="en-US" baseline="-25000" dirty="0"/>
+              <a:t>1</a:t>
+            </a:r>
+            <a:r>
+              <a:rPr lang="en-US" dirty="0"/>
+              <a:t> + n</a:t>
+            </a:r>
+            <a:r>
+              <a:rPr lang="en-US" baseline="-25000" dirty="0"/>
+              <a:t>2</a:t>
+            </a:r>
+            <a:r>
+              <a:rPr lang="en-US" dirty="0"/>
+              <a:t> + n</a:t>
+            </a:r>
+            <a:r>
+              <a:rPr lang="en-US" baseline="-25000" dirty="0"/>
+              <a:t>3</a:t>
+            </a:r>
+            <a:r>
+              <a:rPr lang="en-US" dirty="0"/>
+              <a:t> + n</a:t>
+            </a:r>
+            <a:r>
+              <a:rPr lang="en-US" baseline="-25000" dirty="0"/>
+              <a:t>4</a:t>
+            </a:r>
+            <a:r>
+              <a:rPr lang="en-US" dirty="0"/>
+              <a:t> + n</a:t>
+            </a:r>
+            <a:r>
+              <a:rPr lang="en-US" baseline="-25000" dirty="0"/>
+              <a:t>5</a:t>
+            </a:r>
+            <a:endParaRPr lang="en-US" dirty="0"/>
+          </a:p>
+        </p:txBody>
+      </p:sp>
+    </p:spTree>
+    <p:extLst>
+      <p:ext uri="{BB962C8B-B14F-4D97-AF65-F5344CB8AC3E}">
+        <p14:creationId xmlns:p14="http://schemas.microsoft.com/office/powerpoint/2010/main" val="4119830051"/>
       </p:ext>
     </p:extLst>
   </p:cSld>

</xml_diff>

<commit_message>
scripting and ppt update
</commit_message>
<xml_diff>
--- a/memo.pptx
+++ b/memo.pptx
@@ -5,7 +5,7 @@
     <p:sldMasterId id="2147483648" r:id="rId1"/>
   </p:sldMasterIdLst>
   <p:notesMasterIdLst>
-    <p:notesMasterId r:id="rId11"/>
+    <p:notesMasterId r:id="rId15"/>
   </p:notesMasterIdLst>
   <p:sldIdLst>
     <p:sldId id="278" r:id="rId2"/>
@@ -16,7 +16,11 @@
     <p:sldId id="273" r:id="rId7"/>
     <p:sldId id="274" r:id="rId8"/>
     <p:sldId id="276" r:id="rId9"/>
-    <p:sldId id="277" r:id="rId10"/>
+    <p:sldId id="281" r:id="rId10"/>
+    <p:sldId id="282" r:id="rId11"/>
+    <p:sldId id="277" r:id="rId12"/>
+    <p:sldId id="279" r:id="rId13"/>
+    <p:sldId id="280" r:id="rId14"/>
   </p:sldIdLst>
   <p:sldSz cx="12192000" cy="6858000"/>
   <p:notesSz cx="6858000" cy="9144000"/>
@@ -4252,6 +4256,2623 @@
     <p:extLst>
       <p:ext uri="{BB962C8B-B14F-4D97-AF65-F5344CB8AC3E}">
         <p14:creationId xmlns:p14="http://schemas.microsoft.com/office/powerpoint/2010/main" val="2481435167"/>
+      </p:ext>
+    </p:extLst>
+  </p:cSld>
+  <p:clrMapOvr>
+    <a:masterClrMapping/>
+  </p:clrMapOvr>
+</p:sld>
+</file>
+
+<file path=ppt/slides/slide10.xml><?xml version="1.0" encoding="utf-8"?>
+<p:sld xmlns:a="http://schemas.openxmlformats.org/drawingml/2006/main" xmlns:r="http://schemas.openxmlformats.org/officeDocument/2006/relationships" xmlns:p="http://schemas.openxmlformats.org/presentationml/2006/main">
+  <p:cSld>
+    <p:spTree>
+      <p:nvGrpSpPr>
+        <p:cNvPr id="1" name=""/>
+        <p:cNvGrpSpPr/>
+        <p:nvPr/>
+      </p:nvGrpSpPr>
+      <p:grpSpPr>
+        <a:xfrm>
+          <a:off x="0" y="0"/>
+          <a:ext cx="0" cy="0"/>
+          <a:chOff x="0" y="0"/>
+          <a:chExt cx="0" cy="0"/>
+        </a:xfrm>
+      </p:grpSpPr>
+      <p:sp>
+        <p:nvSpPr>
+          <p:cNvPr id="5" name="Title 4">
+            <a:extLst>
+              <a:ext uri="{FF2B5EF4-FFF2-40B4-BE49-F238E27FC236}">
+                <a16:creationId xmlns:a16="http://schemas.microsoft.com/office/drawing/2014/main" id="{F4140D05-015F-D05E-58FE-DAC001B4728F}"/>
+              </a:ext>
+            </a:extLst>
+          </p:cNvPr>
+          <p:cNvSpPr>
+            <a:spLocks noGrp="1"/>
+          </p:cNvSpPr>
+          <p:nvPr>
+            <p:ph type="title"/>
+          </p:nvPr>
+        </p:nvSpPr>
+        <p:spPr/>
+        <p:txBody>
+          <a:bodyPr/>
+          <a:lstStyle/>
+          <a:p>
+            <a:r>
+              <a:rPr lang="en-US" dirty="0"/>
+              <a:t>Setup</a:t>
+            </a:r>
+          </a:p>
+        </p:txBody>
+      </p:sp>
+      <p:sp>
+        <p:nvSpPr>
+          <p:cNvPr id="4" name="Slide Number Placeholder 3">
+            <a:extLst>
+              <a:ext uri="{FF2B5EF4-FFF2-40B4-BE49-F238E27FC236}">
+                <a16:creationId xmlns:a16="http://schemas.microsoft.com/office/drawing/2014/main" id="{AA5FC38E-76F7-3ED6-5DB4-57CC6D0E8645}"/>
+              </a:ext>
+            </a:extLst>
+          </p:cNvPr>
+          <p:cNvSpPr>
+            <a:spLocks noGrp="1"/>
+          </p:cNvSpPr>
+          <p:nvPr>
+            <p:ph type="sldNum" sz="quarter" idx="12"/>
+          </p:nvPr>
+        </p:nvSpPr>
+        <p:spPr/>
+        <p:txBody>
+          <a:bodyPr/>
+          <a:lstStyle/>
+          <a:p>
+            <a:fld id="{B9982081-D51A-40C8-8A41-6498517A0DD4}" type="slidenum">
+              <a:rPr lang="en-US" smtClean="0"/>
+              <a:t>10</a:t>
+            </a:fld>
+            <a:endParaRPr lang="en-US" dirty="0"/>
+          </a:p>
+        </p:txBody>
+      </p:sp>
+      <p:pic>
+        <p:nvPicPr>
+          <p:cNvPr id="6" name="Picture 5" descr="A black background with a black square&#10;&#10;Description automatically generated with medium confidence">
+            <a:extLst>
+              <a:ext uri="{FF2B5EF4-FFF2-40B4-BE49-F238E27FC236}">
+                <a16:creationId xmlns:a16="http://schemas.microsoft.com/office/drawing/2014/main" id="{97CB0CBF-BFB9-0A5C-CC00-C3934B3029FC}"/>
+              </a:ext>
+            </a:extLst>
+          </p:cNvPr>
+          <p:cNvPicPr>
+            <a:picLocks noChangeAspect="1"/>
+          </p:cNvPicPr>
+          <p:nvPr/>
+        </p:nvPicPr>
+        <p:blipFill>
+          <a:blip r:embed="rId2">
+            <a:extLst>
+              <a:ext uri="{28A0092B-C50C-407E-A947-70E740481C1C}">
+                <a14:useLocalDpi xmlns:a14="http://schemas.microsoft.com/office/drawing/2010/main" val="0"/>
+              </a:ext>
+            </a:extLst>
+          </a:blip>
+          <a:stretch>
+            <a:fillRect/>
+          </a:stretch>
+        </p:blipFill>
+        <p:spPr>
+          <a:xfrm>
+            <a:off x="697498" y="1083295"/>
+            <a:ext cx="4779971" cy="1883019"/>
+          </a:xfrm>
+          <a:prstGeom prst="rect">
+            <a:avLst/>
+          </a:prstGeom>
+        </p:spPr>
+      </p:pic>
+      <mc:AlternateContent xmlns:mc="http://schemas.openxmlformats.org/markup-compatibility/2006">
+        <mc:Choice xmlns:a14="http://schemas.microsoft.com/office/drawing/2010/main" Requires="a14">
+          <p:sp>
+            <p:nvSpPr>
+              <p:cNvPr id="8" name="TextBox 7">
+                <a:extLst>
+                  <a:ext uri="{FF2B5EF4-FFF2-40B4-BE49-F238E27FC236}">
+                    <a16:creationId xmlns:a16="http://schemas.microsoft.com/office/drawing/2014/main" id="{E8032E2A-2936-0AB5-F0FE-25A94718EF5F}"/>
+                  </a:ext>
+                </a:extLst>
+              </p:cNvPr>
+              <p:cNvSpPr txBox="1"/>
+              <p:nvPr/>
+            </p:nvSpPr>
+            <p:spPr>
+              <a:xfrm>
+                <a:off x="6155266" y="1126067"/>
+                <a:ext cx="4893733" cy="3416320"/>
+              </a:xfrm>
+              <a:prstGeom prst="rect">
+                <a:avLst/>
+              </a:prstGeom>
+              <a:noFill/>
+            </p:spPr>
+            <p:txBody>
+              <a:bodyPr wrap="square" rtlCol="0">
+                <a:spAutoFit/>
+              </a:bodyPr>
+              <a:lstStyle/>
+              <a:p>
+                <a:r>
+                  <a:rPr lang="en-US" dirty="0"/>
+                  <a:t>While loop:</a:t>
+                </a:r>
+              </a:p>
+              <a:p>
+                <a:pPr marL="342900" indent="-342900">
+                  <a:buFont typeface="+mj-lt"/>
+                  <a:buAutoNum type="arabicPeriod"/>
+                </a:pPr>
+                <a:r>
+                  <a:rPr lang="en-US" dirty="0"/>
+                  <a:t>Splitter splits envelope 50/50</a:t>
+                </a:r>
+              </a:p>
+              <a:p>
+                <a:pPr marL="342900" indent="-342900">
+                  <a:buFont typeface="+mj-lt"/>
+                  <a:buAutoNum type="arabicPeriod"/>
+                </a:pPr>
+                <a:r>
+                  <a:rPr lang="en-US" dirty="0"/>
+                  <a:t>Clockwise arm:</a:t>
+                </a:r>
+              </a:p>
+              <a:p>
+                <a:pPr marL="800100" lvl="1" indent="-342900">
+                  <a:buFont typeface="+mj-lt"/>
+                  <a:buAutoNum type="arabicPeriod"/>
+                </a:pPr>
+                <a:r>
+                  <a:rPr lang="en-US" dirty="0"/>
+                  <a:t>gain section, propagated </a:t>
+                </a:r>
+                <a:r>
+                  <a:rPr lang="en-US" i="1" dirty="0"/>
+                  <a:t>with</a:t>
+                </a:r>
+                <a:r>
+                  <a:rPr lang="en-US" dirty="0"/>
+                  <a:t> the pump</a:t>
+                </a:r>
+              </a:p>
+              <a:p>
+                <a:pPr marL="800100" lvl="1" indent="-342900">
+                  <a:buFont typeface="+mj-lt"/>
+                  <a:buAutoNum type="arabicPeriod"/>
+                </a:pPr>
+                <a:r>
+                  <a:rPr lang="en-US" dirty="0"/>
+                  <a:t>phase bias</a:t>
+                </a:r>
+              </a:p>
+              <a:p>
+                <a:pPr marL="342900" indent="-342900">
+                  <a:buFont typeface="+mj-lt"/>
+                  <a:buAutoNum type="arabicPeriod"/>
+                </a:pPr>
+                <a:r>
+                  <a:rPr lang="en-US" dirty="0"/>
+                  <a:t>Counter-Clockwise arm:</a:t>
+                </a:r>
+              </a:p>
+              <a:p>
+                <a:pPr marL="800100" lvl="1" indent="-342900">
+                  <a:buFont typeface="+mj-lt"/>
+                  <a:buAutoNum type="arabicPeriod"/>
+                </a:pPr>
+                <a:r>
+                  <a:rPr lang="en-US" dirty="0"/>
+                  <a:t>Phase bias</a:t>
+                </a:r>
+              </a:p>
+              <a:p>
+                <a:pPr marL="800100" lvl="1" indent="-342900">
+                  <a:buFont typeface="+mj-lt"/>
+                  <a:buAutoNum type="arabicPeriod"/>
+                </a:pPr>
+                <a:r>
+                  <a:rPr lang="en-US" dirty="0"/>
+                  <a:t>Gain section, propagated </a:t>
+                </a:r>
+                <a:r>
+                  <a:rPr lang="en-US" i="1" dirty="0"/>
+                  <a:t>against</a:t>
+                </a:r>
+                <a:r>
+                  <a:rPr lang="en-US" dirty="0"/>
+                  <a:t> the pump</a:t>
+                </a:r>
+              </a:p>
+              <a:p>
+                <a:pPr marL="342900" indent="-342900">
+                  <a:buFont typeface="+mj-lt"/>
+                  <a:buAutoNum type="arabicPeriod"/>
+                </a:pPr>
+                <a:r>
+                  <a:rPr lang="en-US" dirty="0"/>
+                  <a:t>The sum of the two fields: </a:t>
+                </a:r>
+                <a14:m>
+                  <m:oMath xmlns:m="http://schemas.openxmlformats.org/officeDocument/2006/math">
+                    <m:sSub>
+                      <m:sSubPr>
+                        <m:ctrlPr>
+                          <a:rPr lang="en-US" b="0" i="1" smtClean="0">
+                            <a:latin typeface="Cambria Math" panose="02040503050406030204" pitchFamily="18" charset="0"/>
+                          </a:rPr>
+                        </m:ctrlPr>
+                      </m:sSubPr>
+                      <m:e>
+                        <m:r>
+                          <a:rPr lang="en-US" b="0" i="1" smtClean="0">
+                            <a:latin typeface="Cambria Math" panose="02040503050406030204" pitchFamily="18" charset="0"/>
+                          </a:rPr>
+                          <m:t>𝐴</m:t>
+                        </m:r>
+                      </m:e>
+                      <m:sub>
+                        <m:r>
+                          <a:rPr lang="en-US" b="0" i="1" smtClean="0">
+                            <a:latin typeface="Cambria Math" panose="02040503050406030204" pitchFamily="18" charset="0"/>
+                          </a:rPr>
+                          <m:t>𝑐𝑤</m:t>
+                        </m:r>
+                      </m:sub>
+                    </m:sSub>
+                    <m:r>
+                      <a:rPr lang="en-US" b="0" i="1" smtClean="0">
+                        <a:latin typeface="Cambria Math" panose="02040503050406030204" pitchFamily="18" charset="0"/>
+                      </a:rPr>
+                      <m:t>+</m:t>
+                    </m:r>
+                    <m:sSub>
+                      <m:sSubPr>
+                        <m:ctrlPr>
+                          <a:rPr lang="en-US" b="0" i="1" smtClean="0">
+                            <a:latin typeface="Cambria Math" panose="02040503050406030204" pitchFamily="18" charset="0"/>
+                          </a:rPr>
+                        </m:ctrlPr>
+                      </m:sSubPr>
+                      <m:e>
+                        <m:r>
+                          <a:rPr lang="en-US" b="0" i="1" smtClean="0">
+                            <a:latin typeface="Cambria Math" panose="02040503050406030204" pitchFamily="18" charset="0"/>
+                          </a:rPr>
+                          <m:t>𝐴</m:t>
+                        </m:r>
+                      </m:e>
+                      <m:sub>
+                        <m:r>
+                          <a:rPr lang="en-US" b="0" i="1" smtClean="0">
+                            <a:latin typeface="Cambria Math" panose="02040503050406030204" pitchFamily="18" charset="0"/>
+                          </a:rPr>
+                          <m:t>𝑐𝑐𝑤</m:t>
+                        </m:r>
+                      </m:sub>
+                    </m:sSub>
+                  </m:oMath>
+                </a14:m>
+                <a:r>
+                  <a:rPr lang="en-US" dirty="0"/>
+                  <a:t> is sent to the straight section, which means the output coupler takes out </a:t>
+                </a:r>
+                <a14:m>
+                  <m:oMath xmlns:m="http://schemas.openxmlformats.org/officeDocument/2006/math">
+                    <m:sSub>
+                      <m:sSubPr>
+                        <m:ctrlPr>
+                          <a:rPr lang="en-US" b="0" i="1" smtClean="0">
+                            <a:latin typeface="Cambria Math" panose="02040503050406030204" pitchFamily="18" charset="0"/>
+                          </a:rPr>
+                        </m:ctrlPr>
+                      </m:sSubPr>
+                      <m:e>
+                        <m:r>
+                          <a:rPr lang="en-US" b="0" i="1" smtClean="0">
+                            <a:latin typeface="Cambria Math" panose="02040503050406030204" pitchFamily="18" charset="0"/>
+                          </a:rPr>
+                          <m:t>𝐴</m:t>
+                        </m:r>
+                      </m:e>
+                      <m:sub>
+                        <m:r>
+                          <a:rPr lang="en-US" b="0" i="1" smtClean="0">
+                            <a:latin typeface="Cambria Math" panose="02040503050406030204" pitchFamily="18" charset="0"/>
+                          </a:rPr>
+                          <m:t>𝑐𝑤</m:t>
+                        </m:r>
+                      </m:sub>
+                    </m:sSub>
+                    <m:r>
+                      <a:rPr lang="en-US" b="0" i="1" smtClean="0">
+                        <a:latin typeface="Cambria Math" panose="02040503050406030204" pitchFamily="18" charset="0"/>
+                      </a:rPr>
+                      <m:t>−</m:t>
+                    </m:r>
+                    <m:sSub>
+                      <m:sSubPr>
+                        <m:ctrlPr>
+                          <a:rPr lang="en-US" b="0" i="1" smtClean="0">
+                            <a:latin typeface="Cambria Math" panose="02040503050406030204" pitchFamily="18" charset="0"/>
+                          </a:rPr>
+                        </m:ctrlPr>
+                      </m:sSubPr>
+                      <m:e>
+                        <m:r>
+                          <a:rPr lang="en-US" b="0" i="1" smtClean="0">
+                            <a:latin typeface="Cambria Math" panose="02040503050406030204" pitchFamily="18" charset="0"/>
+                          </a:rPr>
+                          <m:t>𝐴</m:t>
+                        </m:r>
+                      </m:e>
+                      <m:sub>
+                        <m:r>
+                          <a:rPr lang="en-US" b="0" i="1" smtClean="0">
+                            <a:latin typeface="Cambria Math" panose="02040503050406030204" pitchFamily="18" charset="0"/>
+                          </a:rPr>
+                          <m:t>𝑐𝑐𝑤</m:t>
+                        </m:r>
+                      </m:sub>
+                    </m:sSub>
+                  </m:oMath>
+                </a14:m>
+                <a:endParaRPr lang="en-US" dirty="0"/>
+              </a:p>
+            </p:txBody>
+          </p:sp>
+        </mc:Choice>
+        <mc:Fallback>
+          <p:sp>
+            <p:nvSpPr>
+              <p:cNvPr id="8" name="TextBox 7">
+                <a:extLst>
+                  <a:ext uri="{FF2B5EF4-FFF2-40B4-BE49-F238E27FC236}">
+                    <a16:creationId xmlns:a16="http://schemas.microsoft.com/office/drawing/2014/main" id="{E8032E2A-2936-0AB5-F0FE-25A94718EF5F}"/>
+                  </a:ext>
+                </a:extLst>
+              </p:cNvPr>
+              <p:cNvSpPr txBox="1">
+                <a:spLocks noRot="1" noChangeAspect="1" noMove="1" noResize="1" noEditPoints="1" noAdjustHandles="1" noChangeArrowheads="1" noChangeShapeType="1" noTextEdit="1"/>
+              </p:cNvSpPr>
+              <p:nvPr/>
+            </p:nvSpPr>
+            <p:spPr>
+              <a:xfrm>
+                <a:off x="6155266" y="1126067"/>
+                <a:ext cx="4893733" cy="3416320"/>
+              </a:xfrm>
+              <a:prstGeom prst="rect">
+                <a:avLst/>
+              </a:prstGeom>
+              <a:blipFill>
+                <a:blip r:embed="rId3"/>
+                <a:stretch>
+                  <a:fillRect l="-1036" t="-741" b="-2222"/>
+                </a:stretch>
+              </a:blipFill>
+            </p:spPr>
+            <p:txBody>
+              <a:bodyPr/>
+              <a:lstStyle/>
+              <a:p>
+                <a:r>
+                  <a:rPr lang="en-US">
+                    <a:noFill/>
+                  </a:rPr>
+                  <a:t> </a:t>
+                </a:r>
+              </a:p>
+            </p:txBody>
+          </p:sp>
+        </mc:Fallback>
+      </mc:AlternateContent>
+      <p:grpSp>
+        <p:nvGrpSpPr>
+          <p:cNvPr id="12" name="Group 11">
+            <a:extLst>
+              <a:ext uri="{FF2B5EF4-FFF2-40B4-BE49-F238E27FC236}">
+                <a16:creationId xmlns:a16="http://schemas.microsoft.com/office/drawing/2014/main" id="{56062030-7047-46CB-614A-D69EA0E48E79}"/>
+              </a:ext>
+            </a:extLst>
+          </p:cNvPr>
+          <p:cNvGrpSpPr/>
+          <p:nvPr/>
+        </p:nvGrpSpPr>
+        <p:grpSpPr>
+          <a:xfrm>
+            <a:off x="0" y="4621419"/>
+            <a:ext cx="5986792" cy="2245047"/>
+            <a:chOff x="414867" y="649817"/>
+            <a:chExt cx="15544800" cy="5829300"/>
+          </a:xfrm>
+        </p:grpSpPr>
+        <p:pic>
+          <p:nvPicPr>
+            <p:cNvPr id="10" name="Picture 9">
+              <a:extLst>
+                <a:ext uri="{FF2B5EF4-FFF2-40B4-BE49-F238E27FC236}">
+                  <a16:creationId xmlns:a16="http://schemas.microsoft.com/office/drawing/2014/main" id="{C39952BD-F523-ECA5-19DE-6351BADA4AD5}"/>
+                </a:ext>
+              </a:extLst>
+            </p:cNvPr>
+            <p:cNvPicPr>
+              <a:picLocks noChangeAspect="1"/>
+            </p:cNvPicPr>
+            <p:nvPr/>
+          </p:nvPicPr>
+          <p:blipFill>
+            <a:blip r:embed="rId4"/>
+            <a:stretch>
+              <a:fillRect/>
+            </a:stretch>
+          </p:blipFill>
+          <p:spPr>
+            <a:xfrm>
+              <a:off x="414867" y="649817"/>
+              <a:ext cx="7772400" cy="5829300"/>
+            </a:xfrm>
+            <a:prstGeom prst="rect">
+              <a:avLst/>
+            </a:prstGeom>
+          </p:spPr>
+        </p:pic>
+        <p:pic>
+          <p:nvPicPr>
+            <p:cNvPr id="11" name="Picture 10">
+              <a:extLst>
+                <a:ext uri="{FF2B5EF4-FFF2-40B4-BE49-F238E27FC236}">
+                  <a16:creationId xmlns:a16="http://schemas.microsoft.com/office/drawing/2014/main" id="{D0E199BD-CF03-7B70-4B3B-0043A9C8BAFF}"/>
+                </a:ext>
+              </a:extLst>
+            </p:cNvPr>
+            <p:cNvPicPr>
+              <a:picLocks noChangeAspect="1"/>
+            </p:cNvPicPr>
+            <p:nvPr/>
+          </p:nvPicPr>
+          <p:blipFill>
+            <a:blip r:embed="rId5"/>
+            <a:stretch>
+              <a:fillRect/>
+            </a:stretch>
+          </p:blipFill>
+          <p:spPr>
+            <a:xfrm>
+              <a:off x="8187267" y="649817"/>
+              <a:ext cx="7772400" cy="5829300"/>
+            </a:xfrm>
+            <a:prstGeom prst="rect">
+              <a:avLst/>
+            </a:prstGeom>
+          </p:spPr>
+        </p:pic>
+      </p:grpSp>
+      <p:pic>
+        <p:nvPicPr>
+          <p:cNvPr id="15" name="Picture 14">
+            <a:extLst>
+              <a:ext uri="{FF2B5EF4-FFF2-40B4-BE49-F238E27FC236}">
+                <a16:creationId xmlns:a16="http://schemas.microsoft.com/office/drawing/2014/main" id="{46EF5E0F-8560-A872-606D-A4D86A02FC90}"/>
+              </a:ext>
+            </a:extLst>
+          </p:cNvPr>
+          <p:cNvPicPr>
+            <a:picLocks noChangeAspect="1"/>
+          </p:cNvPicPr>
+          <p:nvPr/>
+        </p:nvPicPr>
+        <p:blipFill>
+          <a:blip r:embed="rId6"/>
+          <a:stretch>
+            <a:fillRect/>
+          </a:stretch>
+        </p:blipFill>
+        <p:spPr>
+          <a:xfrm>
+            <a:off x="2606445" y="2773387"/>
+            <a:ext cx="2993396" cy="1676732"/>
+          </a:xfrm>
+          <a:prstGeom prst="rect">
+            <a:avLst/>
+          </a:prstGeom>
+        </p:spPr>
+      </p:pic>
+      <p:sp>
+        <p:nvSpPr>
+          <p:cNvPr id="16" name="TextBox 15">
+            <a:extLst>
+              <a:ext uri="{FF2B5EF4-FFF2-40B4-BE49-F238E27FC236}">
+                <a16:creationId xmlns:a16="http://schemas.microsoft.com/office/drawing/2014/main" id="{0046C301-3A3E-302F-FD8B-299CFE1BA089}"/>
+              </a:ext>
+            </a:extLst>
+          </p:cNvPr>
+          <p:cNvSpPr txBox="1"/>
+          <p:nvPr/>
+        </p:nvSpPr>
+        <p:spPr>
+          <a:xfrm>
+            <a:off x="6696946" y="4684889"/>
+            <a:ext cx="5185162" cy="1477328"/>
+          </a:xfrm>
+          <a:prstGeom prst="rect">
+            <a:avLst/>
+          </a:prstGeom>
+          <a:noFill/>
+        </p:spPr>
+        <p:txBody>
+          <a:bodyPr wrap="square" rtlCol="0">
+            <a:spAutoFit/>
+          </a:bodyPr>
+          <a:lstStyle/>
+          <a:p>
+            <a:r>
+              <a:rPr lang="en-US" dirty="0"/>
+              <a:t>I haven’t checked this, but most of the difference in nonlinear phase shift should be acquired by the difference in forward vs backward seeding. So, I haven’t tested placing the gain section closer to center vs. one side of the loop</a:t>
+            </a:r>
+          </a:p>
+        </p:txBody>
+      </p:sp>
+      <p:sp>
+        <p:nvSpPr>
+          <p:cNvPr id="17" name="TextBox 16">
+            <a:extLst>
+              <a:ext uri="{FF2B5EF4-FFF2-40B4-BE49-F238E27FC236}">
+                <a16:creationId xmlns:a16="http://schemas.microsoft.com/office/drawing/2014/main" id="{6BB6AF05-3ABF-A321-73C0-F84D48F2D86D}"/>
+              </a:ext>
+            </a:extLst>
+          </p:cNvPr>
+          <p:cNvSpPr txBox="1"/>
+          <p:nvPr/>
+        </p:nvSpPr>
+        <p:spPr>
+          <a:xfrm>
+            <a:off x="234428" y="3327650"/>
+            <a:ext cx="2524539" cy="1077218"/>
+          </a:xfrm>
+          <a:prstGeom prst="rect">
+            <a:avLst/>
+          </a:prstGeom>
+          <a:noFill/>
+        </p:spPr>
+        <p:txBody>
+          <a:bodyPr wrap="square" rtlCol="0">
+            <a:spAutoFit/>
+          </a:bodyPr>
+          <a:lstStyle/>
+          <a:p>
+            <a:r>
+              <a:rPr lang="en-US" sz="1600" dirty="0"/>
+              <a:t>Simultaneous forward and backward seeding is calculated using shooting method</a:t>
+            </a:r>
+          </a:p>
+        </p:txBody>
+      </p:sp>
+      <p:sp>
+        <p:nvSpPr>
+          <p:cNvPr id="18" name="TextBox 17">
+            <a:extLst>
+              <a:ext uri="{FF2B5EF4-FFF2-40B4-BE49-F238E27FC236}">
+                <a16:creationId xmlns:a16="http://schemas.microsoft.com/office/drawing/2014/main" id="{126204B5-4929-95EE-2855-BBB81DE11FD9}"/>
+              </a:ext>
+            </a:extLst>
+          </p:cNvPr>
+          <p:cNvSpPr txBox="1"/>
+          <p:nvPr/>
+        </p:nvSpPr>
+        <p:spPr>
+          <a:xfrm>
+            <a:off x="974520" y="4431879"/>
+            <a:ext cx="1313180" cy="276999"/>
+          </a:xfrm>
+          <a:prstGeom prst="rect">
+            <a:avLst/>
+          </a:prstGeom>
+          <a:noFill/>
+        </p:spPr>
+        <p:txBody>
+          <a:bodyPr wrap="none" rtlCol="0">
+            <a:spAutoFit/>
+          </a:bodyPr>
+          <a:lstStyle/>
+          <a:p>
+            <a:r>
+              <a:rPr lang="en-US" sz="1200" dirty="0"/>
+              <a:t>With pump in EDF</a:t>
+            </a:r>
+          </a:p>
+        </p:txBody>
+      </p:sp>
+      <p:sp>
+        <p:nvSpPr>
+          <p:cNvPr id="19" name="TextBox 18">
+            <a:extLst>
+              <a:ext uri="{FF2B5EF4-FFF2-40B4-BE49-F238E27FC236}">
+                <a16:creationId xmlns:a16="http://schemas.microsoft.com/office/drawing/2014/main" id="{5FF262C3-AFB3-9E0F-7991-FABC12887C8D}"/>
+              </a:ext>
+            </a:extLst>
+          </p:cNvPr>
+          <p:cNvSpPr txBox="1"/>
+          <p:nvPr/>
+        </p:nvSpPr>
+        <p:spPr>
+          <a:xfrm>
+            <a:off x="3855176" y="4431879"/>
+            <a:ext cx="1468864" cy="276999"/>
+          </a:xfrm>
+          <a:prstGeom prst="rect">
+            <a:avLst/>
+          </a:prstGeom>
+          <a:noFill/>
+        </p:spPr>
+        <p:txBody>
+          <a:bodyPr wrap="none" rtlCol="0">
+            <a:spAutoFit/>
+          </a:bodyPr>
+          <a:lstStyle/>
+          <a:p>
+            <a:r>
+              <a:rPr lang="en-US" sz="1200" dirty="0"/>
+              <a:t>Against pump in EDF</a:t>
+            </a:r>
+          </a:p>
+        </p:txBody>
+      </p:sp>
+      <p:cxnSp>
+        <p:nvCxnSpPr>
+          <p:cNvPr id="21" name="Straight Arrow Connector 20">
+            <a:extLst>
+              <a:ext uri="{FF2B5EF4-FFF2-40B4-BE49-F238E27FC236}">
+                <a16:creationId xmlns:a16="http://schemas.microsoft.com/office/drawing/2014/main" id="{B0B21DD1-5068-B83C-1420-9F8E76CAE531}"/>
+              </a:ext>
+            </a:extLst>
+          </p:cNvPr>
+          <p:cNvCxnSpPr>
+            <a:cxnSpLocks/>
+          </p:cNvCxnSpPr>
+          <p:nvPr/>
+        </p:nvCxnSpPr>
+        <p:spPr>
+          <a:xfrm>
+            <a:off x="6096000" y="5423553"/>
+            <a:ext cx="440265" cy="0"/>
+          </a:xfrm>
+          <a:prstGeom prst="straightConnector1">
+            <a:avLst/>
+          </a:prstGeom>
+          <a:ln w="38100">
+            <a:solidFill>
+              <a:srgbClr val="FF0000"/>
+            </a:solidFill>
+            <a:tailEnd type="triangle"/>
+          </a:ln>
+        </p:spPr>
+        <p:style>
+          <a:lnRef idx="1">
+            <a:schemeClr val="accent1"/>
+          </a:lnRef>
+          <a:fillRef idx="0">
+            <a:schemeClr val="accent1"/>
+          </a:fillRef>
+          <a:effectRef idx="0">
+            <a:schemeClr val="accent1"/>
+          </a:effectRef>
+          <a:fontRef idx="minor">
+            <a:schemeClr val="tx1"/>
+          </a:fontRef>
+        </p:style>
+      </p:cxnSp>
+    </p:spTree>
+    <p:extLst>
+      <p:ext uri="{BB962C8B-B14F-4D97-AF65-F5344CB8AC3E}">
+        <p14:creationId xmlns:p14="http://schemas.microsoft.com/office/powerpoint/2010/main" val="1548702550"/>
+      </p:ext>
+    </p:extLst>
+  </p:cSld>
+  <p:clrMapOvr>
+    <a:masterClrMapping/>
+  </p:clrMapOvr>
+</p:sld>
+</file>
+
+<file path=ppt/slides/slide11.xml><?xml version="1.0" encoding="utf-8"?>
+<p:sld xmlns:a="http://schemas.openxmlformats.org/drawingml/2006/main" xmlns:r="http://schemas.openxmlformats.org/officeDocument/2006/relationships" xmlns:p="http://schemas.openxmlformats.org/presentationml/2006/main">
+  <p:cSld>
+    <p:spTree>
+      <p:nvGrpSpPr>
+        <p:cNvPr id="1" name=""/>
+        <p:cNvGrpSpPr/>
+        <p:nvPr/>
+      </p:nvGrpSpPr>
+      <p:grpSpPr>
+        <a:xfrm>
+          <a:off x="0" y="0"/>
+          <a:ext cx="0" cy="0"/>
+          <a:chOff x="0" y="0"/>
+          <a:chExt cx="0" cy="0"/>
+        </a:xfrm>
+      </p:grpSpPr>
+      <p:sp>
+        <p:nvSpPr>
+          <p:cNvPr id="2" name="Title 1">
+            <a:extLst>
+              <a:ext uri="{FF2B5EF4-FFF2-40B4-BE49-F238E27FC236}">
+                <a16:creationId xmlns:a16="http://schemas.microsoft.com/office/drawing/2014/main" id="{39E30EFF-0874-0215-F994-C9C7512D2A5B}"/>
+              </a:ext>
+            </a:extLst>
+          </p:cNvPr>
+          <p:cNvSpPr>
+            <a:spLocks noGrp="1"/>
+          </p:cNvSpPr>
+          <p:nvPr>
+            <p:ph type="title"/>
+          </p:nvPr>
+        </p:nvSpPr>
+        <p:spPr/>
+        <p:txBody>
+          <a:bodyPr/>
+          <a:lstStyle/>
+          <a:p>
+            <a:r>
+              <a:rPr lang="en-US" dirty="0"/>
+              <a:t>200 MHz</a:t>
+            </a:r>
+          </a:p>
+        </p:txBody>
+      </p:sp>
+      <p:sp>
+        <p:nvSpPr>
+          <p:cNvPr id="3" name="Slide Number Placeholder 2">
+            <a:extLst>
+              <a:ext uri="{FF2B5EF4-FFF2-40B4-BE49-F238E27FC236}">
+                <a16:creationId xmlns:a16="http://schemas.microsoft.com/office/drawing/2014/main" id="{3EEC6729-D725-6619-81B8-12E40889E39D}"/>
+              </a:ext>
+            </a:extLst>
+          </p:cNvPr>
+          <p:cNvSpPr>
+            <a:spLocks noGrp="1"/>
+          </p:cNvSpPr>
+          <p:nvPr>
+            <p:ph type="sldNum" sz="quarter" idx="12"/>
+          </p:nvPr>
+        </p:nvSpPr>
+        <p:spPr/>
+        <p:txBody>
+          <a:bodyPr/>
+          <a:lstStyle/>
+          <a:p>
+            <a:fld id="{B9982081-D51A-40C8-8A41-6498517A0DD4}" type="slidenum">
+              <a:rPr lang="en-US" smtClean="0"/>
+              <a:t>11</a:t>
+            </a:fld>
+            <a:endParaRPr lang="en-US" dirty="0"/>
+          </a:p>
+        </p:txBody>
+      </p:sp>
+      <p:sp>
+        <p:nvSpPr>
+          <p:cNvPr id="7" name="TextBox 6">
+            <a:extLst>
+              <a:ext uri="{FF2B5EF4-FFF2-40B4-BE49-F238E27FC236}">
+                <a16:creationId xmlns:a16="http://schemas.microsoft.com/office/drawing/2014/main" id="{E99C7153-4FFB-4194-4DE9-E592D32F9DB9}"/>
+              </a:ext>
+            </a:extLst>
+          </p:cNvPr>
+          <p:cNvSpPr txBox="1"/>
+          <p:nvPr/>
+        </p:nvSpPr>
+        <p:spPr>
+          <a:xfrm>
+            <a:off x="169333" y="5433020"/>
+            <a:ext cx="6494791" cy="923330"/>
+          </a:xfrm>
+          <a:prstGeom prst="rect">
+            <a:avLst/>
+          </a:prstGeom>
+          <a:noFill/>
+        </p:spPr>
+        <p:txBody>
+          <a:bodyPr wrap="none" rtlCol="0">
+            <a:spAutoFit/>
+          </a:bodyPr>
+          <a:lstStyle/>
+          <a:p>
+            <a:pPr marL="285750" indent="-285750">
+              <a:buFont typeface="Arial" panose="020B0604020202020204" pitchFamily="34" charset="0"/>
+              <a:buChar char="•"/>
+            </a:pPr>
+            <a:r>
+              <a:rPr lang="en-US" dirty="0"/>
+              <a:t>200 MHz, 4.5 </a:t>
+            </a:r>
+            <a:r>
+              <a:rPr lang="en-US" dirty="0" err="1"/>
+              <a:t>ps</a:t>
+            </a:r>
+            <a:r>
+              <a:rPr lang="en-US" dirty="0"/>
+              <a:t>/nm/km round trip</a:t>
+            </a:r>
+          </a:p>
+          <a:p>
+            <a:pPr marL="285750" indent="-285750">
+              <a:buFont typeface="Arial" panose="020B0604020202020204" pitchFamily="34" charset="0"/>
+              <a:buChar char="•"/>
+            </a:pPr>
+            <a:r>
+              <a:rPr lang="en-US" dirty="0"/>
+              <a:t>11 cm straight arm</a:t>
+            </a:r>
+          </a:p>
+          <a:p>
+            <a:pPr marL="742950" lvl="1" indent="-285750">
+              <a:buFont typeface="Arial" panose="020B0604020202020204" pitchFamily="34" charset="0"/>
+              <a:buChar char="•"/>
+            </a:pPr>
+            <a:r>
+              <a:rPr lang="en-US" dirty="0"/>
+              <a:t>accounting for: 0.7 dB insertion loss and 0.7 dB splicing loss</a:t>
+            </a:r>
+          </a:p>
+        </p:txBody>
+      </p:sp>
+      <p:grpSp>
+        <p:nvGrpSpPr>
+          <p:cNvPr id="10" name="Group 9">
+            <a:extLst>
+              <a:ext uri="{FF2B5EF4-FFF2-40B4-BE49-F238E27FC236}">
+                <a16:creationId xmlns:a16="http://schemas.microsoft.com/office/drawing/2014/main" id="{695B717E-1E08-54CD-B1A5-5E5893ADE1AC}"/>
+              </a:ext>
+            </a:extLst>
+          </p:cNvPr>
+          <p:cNvGrpSpPr/>
+          <p:nvPr/>
+        </p:nvGrpSpPr>
+        <p:grpSpPr>
+          <a:xfrm>
+            <a:off x="129823" y="1516591"/>
+            <a:ext cx="10199512" cy="3824817"/>
+            <a:chOff x="0" y="980017"/>
+            <a:chExt cx="12192000" cy="4572000"/>
+          </a:xfrm>
+        </p:grpSpPr>
+        <p:grpSp>
+          <p:nvGrpSpPr>
+            <p:cNvPr id="6" name="Group 5">
+              <a:extLst>
+                <a:ext uri="{FF2B5EF4-FFF2-40B4-BE49-F238E27FC236}">
+                  <a16:creationId xmlns:a16="http://schemas.microsoft.com/office/drawing/2014/main" id="{C5AA96C5-DE8C-B2A9-A849-A820D17BF538}"/>
+                </a:ext>
+              </a:extLst>
+            </p:cNvPr>
+            <p:cNvGrpSpPr/>
+            <p:nvPr/>
+          </p:nvGrpSpPr>
+          <p:grpSpPr>
+            <a:xfrm>
+              <a:off x="0" y="980017"/>
+              <a:ext cx="12192000" cy="4572000"/>
+              <a:chOff x="746759" y="1108790"/>
+              <a:chExt cx="12788950" cy="4795856"/>
+            </a:xfrm>
+          </p:grpSpPr>
+          <p:pic>
+            <p:nvPicPr>
+              <p:cNvPr id="4" name="Picture 3">
+                <a:extLst>
+                  <a:ext uri="{FF2B5EF4-FFF2-40B4-BE49-F238E27FC236}">
+                    <a16:creationId xmlns:a16="http://schemas.microsoft.com/office/drawing/2014/main" id="{FD1A35C2-3351-C6E9-DEA8-5888E65C5881}"/>
+                  </a:ext>
+                </a:extLst>
+              </p:cNvPr>
+              <p:cNvPicPr>
+                <a:picLocks noChangeAspect="1"/>
+              </p:cNvPicPr>
+              <p:nvPr/>
+            </p:nvPicPr>
+            <p:blipFill>
+              <a:blip r:embed="rId2"/>
+              <a:stretch>
+                <a:fillRect/>
+              </a:stretch>
+            </p:blipFill>
+            <p:spPr>
+              <a:xfrm>
+                <a:off x="746759" y="1108790"/>
+                <a:ext cx="6394475" cy="4795856"/>
+              </a:xfrm>
+              <a:prstGeom prst="rect">
+                <a:avLst/>
+              </a:prstGeom>
+            </p:spPr>
+          </p:pic>
+          <p:pic>
+            <p:nvPicPr>
+              <p:cNvPr id="5" name="Picture 4">
+                <a:extLst>
+                  <a:ext uri="{FF2B5EF4-FFF2-40B4-BE49-F238E27FC236}">
+                    <a16:creationId xmlns:a16="http://schemas.microsoft.com/office/drawing/2014/main" id="{4E04ED0E-A550-E3D2-A3D6-430370935A1C}"/>
+                  </a:ext>
+                </a:extLst>
+              </p:cNvPr>
+              <p:cNvPicPr>
+                <a:picLocks noChangeAspect="1"/>
+              </p:cNvPicPr>
+              <p:nvPr/>
+            </p:nvPicPr>
+            <p:blipFill>
+              <a:blip r:embed="rId3"/>
+              <a:stretch>
+                <a:fillRect/>
+              </a:stretch>
+            </p:blipFill>
+            <p:spPr>
+              <a:xfrm>
+                <a:off x="7141234" y="1108790"/>
+                <a:ext cx="6394475" cy="4795856"/>
+              </a:xfrm>
+              <a:prstGeom prst="rect">
+                <a:avLst/>
+              </a:prstGeom>
+            </p:spPr>
+          </p:pic>
+        </p:grpSp>
+        <p:sp>
+          <p:nvSpPr>
+            <p:cNvPr id="8" name="TextBox 7">
+              <a:extLst>
+                <a:ext uri="{FF2B5EF4-FFF2-40B4-BE49-F238E27FC236}">
+                  <a16:creationId xmlns:a16="http://schemas.microsoft.com/office/drawing/2014/main" id="{010929FC-9381-E950-3DEC-DBB4509D5E9A}"/>
+                </a:ext>
+              </a:extLst>
+            </p:cNvPr>
+            <p:cNvSpPr txBox="1"/>
+            <p:nvPr/>
+          </p:nvSpPr>
+          <p:spPr>
+            <a:xfrm>
+              <a:off x="1938866" y="1405466"/>
+              <a:ext cx="990600" cy="646331"/>
+            </a:xfrm>
+            <a:prstGeom prst="rect">
+              <a:avLst/>
+            </a:prstGeom>
+            <a:noFill/>
+          </p:spPr>
+          <p:txBody>
+            <a:bodyPr wrap="square" rtlCol="0">
+              <a:spAutoFit/>
+            </a:bodyPr>
+            <a:lstStyle/>
+            <a:p>
+              <a:r>
+                <a:rPr lang="en-US" sz="1400" dirty="0"/>
+                <a:t>400 </a:t>
+              </a:r>
+              <a:r>
+                <a:rPr lang="en-US" sz="1400" dirty="0" err="1"/>
+                <a:t>mW</a:t>
+              </a:r>
+              <a:r>
+                <a:rPr lang="en-US" sz="1400" dirty="0"/>
+                <a:t> pump</a:t>
+              </a:r>
+            </a:p>
+          </p:txBody>
+        </p:sp>
+        <p:sp>
+          <p:nvSpPr>
+            <p:cNvPr id="9" name="TextBox 8">
+              <a:extLst>
+                <a:ext uri="{FF2B5EF4-FFF2-40B4-BE49-F238E27FC236}">
+                  <a16:creationId xmlns:a16="http://schemas.microsoft.com/office/drawing/2014/main" id="{C7D57701-04F1-D7FE-BAD4-4AF9FB5CF2CE}"/>
+                </a:ext>
+              </a:extLst>
+            </p:cNvPr>
+            <p:cNvSpPr txBox="1"/>
+            <p:nvPr/>
+          </p:nvSpPr>
+          <p:spPr>
+            <a:xfrm>
+              <a:off x="8001001" y="1405466"/>
+              <a:ext cx="1024464" cy="646331"/>
+            </a:xfrm>
+            <a:prstGeom prst="rect">
+              <a:avLst/>
+            </a:prstGeom>
+            <a:noFill/>
+          </p:spPr>
+          <p:txBody>
+            <a:bodyPr wrap="square" rtlCol="0">
+              <a:spAutoFit/>
+            </a:bodyPr>
+            <a:lstStyle/>
+            <a:p>
+              <a:r>
+                <a:rPr lang="en-US" sz="1400" dirty="0"/>
+                <a:t>450 </a:t>
+              </a:r>
+              <a:r>
+                <a:rPr lang="en-US" sz="1400" dirty="0" err="1"/>
+                <a:t>mW</a:t>
+              </a:r>
+              <a:r>
+                <a:rPr lang="en-US" sz="1400" dirty="0"/>
+                <a:t> pump</a:t>
+              </a:r>
+            </a:p>
+          </p:txBody>
+        </p:sp>
+      </p:grpSp>
+      <mc:AlternateContent xmlns:mc="http://schemas.openxmlformats.org/markup-compatibility/2006">
+        <mc:Choice xmlns:a14="http://schemas.microsoft.com/office/drawing/2010/main" Requires="a14">
+          <p:sp>
+            <p:nvSpPr>
+              <p:cNvPr id="11" name="TextBox 10">
+                <a:extLst>
+                  <a:ext uri="{FF2B5EF4-FFF2-40B4-BE49-F238E27FC236}">
+                    <a16:creationId xmlns:a16="http://schemas.microsoft.com/office/drawing/2014/main" id="{590BDFAC-4028-DFE8-FB4B-616846733CDC}"/>
+                  </a:ext>
+                </a:extLst>
+              </p:cNvPr>
+              <p:cNvSpPr txBox="1"/>
+              <p:nvPr/>
+            </p:nvSpPr>
+            <p:spPr>
+              <a:xfrm>
+                <a:off x="10329335" y="2032268"/>
+                <a:ext cx="1676398" cy="646331"/>
+              </a:xfrm>
+              <a:prstGeom prst="rect">
+                <a:avLst/>
+              </a:prstGeom>
+              <a:noFill/>
+            </p:spPr>
+            <p:txBody>
+              <a:bodyPr wrap="square" rtlCol="0">
+                <a:spAutoFit/>
+              </a:bodyPr>
+              <a:lstStyle/>
+              <a:p>
+                <a:r>
+                  <a:rPr lang="en-US" dirty="0"/>
+                  <a:t>Output coupler:</a:t>
+                </a:r>
+              </a:p>
+              <a:p>
+                <a14:m>
+                  <m:oMath xmlns:m="http://schemas.openxmlformats.org/officeDocument/2006/math">
+                    <m:sSub>
+                      <m:sSubPr>
+                        <m:ctrlPr>
+                          <a:rPr lang="en-US" b="0" i="1" smtClean="0">
+                            <a:latin typeface="Cambria Math" panose="02040503050406030204" pitchFamily="18" charset="0"/>
+                          </a:rPr>
+                        </m:ctrlPr>
+                      </m:sSubPr>
+                      <m:e>
+                        <m:r>
+                          <a:rPr lang="en-US" b="0" i="1" smtClean="0">
+                            <a:latin typeface="Cambria Math" panose="02040503050406030204" pitchFamily="18" charset="0"/>
+                          </a:rPr>
+                          <m:t>𝐸</m:t>
+                        </m:r>
+                      </m:e>
+                      <m:sub>
+                        <m:r>
+                          <a:rPr lang="en-US" b="0" i="1" smtClean="0">
+                            <a:latin typeface="Cambria Math" panose="02040503050406030204" pitchFamily="18" charset="0"/>
+                          </a:rPr>
+                          <m:t>𝑐𝑤</m:t>
+                        </m:r>
+                      </m:sub>
+                    </m:sSub>
+                    <m:r>
+                      <a:rPr lang="en-US" b="0" i="1" smtClean="0">
+                        <a:latin typeface="Cambria Math" panose="02040503050406030204" pitchFamily="18" charset="0"/>
+                      </a:rPr>
+                      <m:t>−</m:t>
+                    </m:r>
+                    <m:sSub>
+                      <m:sSubPr>
+                        <m:ctrlPr>
+                          <a:rPr lang="en-US" b="0" i="1" smtClean="0">
+                            <a:latin typeface="Cambria Math" panose="02040503050406030204" pitchFamily="18" charset="0"/>
+                          </a:rPr>
+                        </m:ctrlPr>
+                      </m:sSubPr>
+                      <m:e>
+                        <m:r>
+                          <a:rPr lang="en-US" b="0" i="1" smtClean="0">
+                            <a:latin typeface="Cambria Math" panose="02040503050406030204" pitchFamily="18" charset="0"/>
+                          </a:rPr>
+                          <m:t>𝐸</m:t>
+                        </m:r>
+                      </m:e>
+                      <m:sub>
+                        <m:r>
+                          <a:rPr lang="en-US" b="0" i="1" smtClean="0">
+                            <a:latin typeface="Cambria Math" panose="02040503050406030204" pitchFamily="18" charset="0"/>
+                          </a:rPr>
+                          <m:t>𝑐𝑐𝑤</m:t>
+                        </m:r>
+                      </m:sub>
+                    </m:sSub>
+                  </m:oMath>
+                </a14:m>
+                <a:r>
+                  <a:rPr lang="en-US" dirty="0"/>
+                  <a:t> </a:t>
+                </a:r>
+              </a:p>
+            </p:txBody>
+          </p:sp>
+        </mc:Choice>
+        <mc:Fallback>
+          <p:sp>
+            <p:nvSpPr>
+              <p:cNvPr id="11" name="TextBox 10">
+                <a:extLst>
+                  <a:ext uri="{FF2B5EF4-FFF2-40B4-BE49-F238E27FC236}">
+                    <a16:creationId xmlns:a16="http://schemas.microsoft.com/office/drawing/2014/main" id="{590BDFAC-4028-DFE8-FB4B-616846733CDC}"/>
+                  </a:ext>
+                </a:extLst>
+              </p:cNvPr>
+              <p:cNvSpPr txBox="1">
+                <a:spLocks noRot="1" noChangeAspect="1" noMove="1" noResize="1" noEditPoints="1" noAdjustHandles="1" noChangeArrowheads="1" noChangeShapeType="1" noTextEdit="1"/>
+              </p:cNvSpPr>
+              <p:nvPr/>
+            </p:nvSpPr>
+            <p:spPr>
+              <a:xfrm>
+                <a:off x="10329335" y="2032268"/>
+                <a:ext cx="1676398" cy="646331"/>
+              </a:xfrm>
+              <a:prstGeom prst="rect">
+                <a:avLst/>
+              </a:prstGeom>
+              <a:blipFill>
+                <a:blip r:embed="rId4"/>
+                <a:stretch>
+                  <a:fillRect l="-3008" t="-3846" r="-2256" b="-15385"/>
+                </a:stretch>
+              </a:blipFill>
+            </p:spPr>
+            <p:txBody>
+              <a:bodyPr/>
+              <a:lstStyle/>
+              <a:p>
+                <a:r>
+                  <a:rPr lang="en-US">
+                    <a:noFill/>
+                  </a:rPr>
+                  <a:t> </a:t>
+                </a:r>
+              </a:p>
+            </p:txBody>
+          </p:sp>
+        </mc:Fallback>
+      </mc:AlternateContent>
+      <mc:AlternateContent xmlns:mc="http://schemas.openxmlformats.org/markup-compatibility/2006">
+        <mc:Choice xmlns:a14="http://schemas.microsoft.com/office/drawing/2010/main" Requires="a14">
+          <p:sp>
+            <p:nvSpPr>
+              <p:cNvPr id="13" name="TextBox 12">
+                <a:extLst>
+                  <a:ext uri="{FF2B5EF4-FFF2-40B4-BE49-F238E27FC236}">
+                    <a16:creationId xmlns:a16="http://schemas.microsoft.com/office/drawing/2014/main" id="{C0E6A858-D012-F0F8-9290-A03211FEE510}"/>
+                  </a:ext>
+                </a:extLst>
+              </p:cNvPr>
+              <p:cNvSpPr txBox="1"/>
+              <p:nvPr/>
+            </p:nvSpPr>
+            <p:spPr>
+              <a:xfrm>
+                <a:off x="10329335" y="3572933"/>
+                <a:ext cx="1676398" cy="923330"/>
+              </a:xfrm>
+              <a:prstGeom prst="rect">
+                <a:avLst/>
+              </a:prstGeom>
+              <a:noFill/>
+            </p:spPr>
+            <p:txBody>
+              <a:bodyPr wrap="square" rtlCol="0">
+                <a:spAutoFit/>
+              </a:bodyPr>
+              <a:lstStyle/>
+              <a:p>
+                <a:r>
+                  <a:rPr lang="en-US" dirty="0"/>
+                  <a:t>Reflected back to cavity:</a:t>
+                </a:r>
+              </a:p>
+              <a:p>
+                <a14:m>
+                  <m:oMathPara xmlns:m="http://schemas.openxmlformats.org/officeDocument/2006/math">
+                    <m:oMathParaPr>
+                      <m:jc m:val="centerGroup"/>
+                    </m:oMathParaPr>
+                    <m:oMath xmlns:m="http://schemas.openxmlformats.org/officeDocument/2006/math">
+                      <m:sSub>
+                        <m:sSubPr>
+                          <m:ctrlPr>
+                            <a:rPr lang="en-US" b="0" i="1" smtClean="0">
+                              <a:latin typeface="Cambria Math" panose="02040503050406030204" pitchFamily="18" charset="0"/>
+                            </a:rPr>
+                          </m:ctrlPr>
+                        </m:sSubPr>
+                        <m:e>
+                          <m:r>
+                            <a:rPr lang="en-US" b="0" i="1" smtClean="0">
+                              <a:latin typeface="Cambria Math" panose="02040503050406030204" pitchFamily="18" charset="0"/>
+                            </a:rPr>
+                            <m:t>𝐸</m:t>
+                          </m:r>
+                        </m:e>
+                        <m:sub>
+                          <m:r>
+                            <a:rPr lang="en-US" b="0" i="1" smtClean="0">
+                              <a:latin typeface="Cambria Math" panose="02040503050406030204" pitchFamily="18" charset="0"/>
+                            </a:rPr>
+                            <m:t>𝑐𝑤</m:t>
+                          </m:r>
+                        </m:sub>
+                      </m:sSub>
+                      <m:r>
+                        <a:rPr lang="en-US" b="0" i="1" smtClean="0">
+                          <a:latin typeface="Cambria Math" panose="02040503050406030204" pitchFamily="18" charset="0"/>
+                        </a:rPr>
+                        <m:t>+</m:t>
+                      </m:r>
+                      <m:sSub>
+                        <m:sSubPr>
+                          <m:ctrlPr>
+                            <a:rPr lang="en-US" b="0" i="1" smtClean="0">
+                              <a:latin typeface="Cambria Math" panose="02040503050406030204" pitchFamily="18" charset="0"/>
+                            </a:rPr>
+                          </m:ctrlPr>
+                        </m:sSubPr>
+                        <m:e>
+                          <m:r>
+                            <a:rPr lang="en-US" b="0" i="1" smtClean="0">
+                              <a:latin typeface="Cambria Math" panose="02040503050406030204" pitchFamily="18" charset="0"/>
+                            </a:rPr>
+                            <m:t>𝐸</m:t>
+                          </m:r>
+                        </m:e>
+                        <m:sub>
+                          <m:r>
+                            <a:rPr lang="en-US" b="0" i="1" smtClean="0">
+                              <a:latin typeface="Cambria Math" panose="02040503050406030204" pitchFamily="18" charset="0"/>
+                            </a:rPr>
+                            <m:t>𝑐𝑐𝑤</m:t>
+                          </m:r>
+                        </m:sub>
+                      </m:sSub>
+                    </m:oMath>
+                  </m:oMathPara>
+                </a14:m>
+                <a:endParaRPr lang="en-US" dirty="0"/>
+              </a:p>
+            </p:txBody>
+          </p:sp>
+        </mc:Choice>
+        <mc:Fallback>
+          <p:sp>
+            <p:nvSpPr>
+              <p:cNvPr id="13" name="TextBox 12">
+                <a:extLst>
+                  <a:ext uri="{FF2B5EF4-FFF2-40B4-BE49-F238E27FC236}">
+                    <a16:creationId xmlns:a16="http://schemas.microsoft.com/office/drawing/2014/main" id="{C0E6A858-D012-F0F8-9290-A03211FEE510}"/>
+                  </a:ext>
+                </a:extLst>
+              </p:cNvPr>
+              <p:cNvSpPr txBox="1">
+                <a:spLocks noRot="1" noChangeAspect="1" noMove="1" noResize="1" noEditPoints="1" noAdjustHandles="1" noChangeArrowheads="1" noChangeShapeType="1" noTextEdit="1"/>
+              </p:cNvSpPr>
+              <p:nvPr/>
+            </p:nvSpPr>
+            <p:spPr>
+              <a:xfrm>
+                <a:off x="10329335" y="3572933"/>
+                <a:ext cx="1676398" cy="923330"/>
+              </a:xfrm>
+              <a:prstGeom prst="rect">
+                <a:avLst/>
+              </a:prstGeom>
+              <a:blipFill>
+                <a:blip r:embed="rId5"/>
+                <a:stretch>
+                  <a:fillRect l="-3008" t="-2703"/>
+                </a:stretch>
+              </a:blipFill>
+            </p:spPr>
+            <p:txBody>
+              <a:bodyPr/>
+              <a:lstStyle/>
+              <a:p>
+                <a:r>
+                  <a:rPr lang="en-US">
+                    <a:noFill/>
+                  </a:rPr>
+                  <a:t> </a:t>
+                </a:r>
+              </a:p>
+            </p:txBody>
+          </p:sp>
+        </mc:Fallback>
+      </mc:AlternateContent>
+      <p:cxnSp>
+        <p:nvCxnSpPr>
+          <p:cNvPr id="17" name="Straight Arrow Connector 16">
+            <a:extLst>
+              <a:ext uri="{FF2B5EF4-FFF2-40B4-BE49-F238E27FC236}">
+                <a16:creationId xmlns:a16="http://schemas.microsoft.com/office/drawing/2014/main" id="{A3C9E243-9754-72AB-CB7C-3A6B061E51DB}"/>
+              </a:ext>
+            </a:extLst>
+          </p:cNvPr>
+          <p:cNvCxnSpPr/>
+          <p:nvPr/>
+        </p:nvCxnSpPr>
+        <p:spPr>
+          <a:xfrm flipH="1">
+            <a:off x="9922935" y="2438615"/>
+            <a:ext cx="406400" cy="0"/>
+          </a:xfrm>
+          <a:prstGeom prst="straightConnector1">
+            <a:avLst/>
+          </a:prstGeom>
+          <a:ln w="25400">
+            <a:solidFill>
+              <a:srgbClr val="FF0000"/>
+            </a:solidFill>
+            <a:tailEnd type="triangle"/>
+          </a:ln>
+        </p:spPr>
+        <p:style>
+          <a:lnRef idx="1">
+            <a:schemeClr val="accent1"/>
+          </a:lnRef>
+          <a:fillRef idx="0">
+            <a:schemeClr val="accent1"/>
+          </a:fillRef>
+          <a:effectRef idx="0">
+            <a:schemeClr val="accent1"/>
+          </a:effectRef>
+          <a:fontRef idx="minor">
+            <a:schemeClr val="tx1"/>
+          </a:fontRef>
+        </p:style>
+      </p:cxnSp>
+      <p:cxnSp>
+        <p:nvCxnSpPr>
+          <p:cNvPr id="18" name="Straight Arrow Connector 17">
+            <a:extLst>
+              <a:ext uri="{FF2B5EF4-FFF2-40B4-BE49-F238E27FC236}">
+                <a16:creationId xmlns:a16="http://schemas.microsoft.com/office/drawing/2014/main" id="{223070F9-4288-4113-703A-DCB474D8F8E2}"/>
+              </a:ext>
+            </a:extLst>
+          </p:cNvPr>
+          <p:cNvCxnSpPr/>
+          <p:nvPr/>
+        </p:nvCxnSpPr>
+        <p:spPr>
+          <a:xfrm flipH="1">
+            <a:off x="9922935" y="4157349"/>
+            <a:ext cx="406400" cy="0"/>
+          </a:xfrm>
+          <a:prstGeom prst="straightConnector1">
+            <a:avLst/>
+          </a:prstGeom>
+          <a:ln w="25400">
+            <a:solidFill>
+              <a:srgbClr val="FF0000"/>
+            </a:solidFill>
+            <a:tailEnd type="triangle"/>
+          </a:ln>
+        </p:spPr>
+        <p:style>
+          <a:lnRef idx="1">
+            <a:schemeClr val="accent1"/>
+          </a:lnRef>
+          <a:fillRef idx="0">
+            <a:schemeClr val="accent1"/>
+          </a:fillRef>
+          <a:effectRef idx="0">
+            <a:schemeClr val="accent1"/>
+          </a:effectRef>
+          <a:fontRef idx="minor">
+            <a:schemeClr val="tx1"/>
+          </a:fontRef>
+        </p:style>
+      </p:cxnSp>
+    </p:spTree>
+    <p:extLst>
+      <p:ext uri="{BB962C8B-B14F-4D97-AF65-F5344CB8AC3E}">
+        <p14:creationId xmlns:p14="http://schemas.microsoft.com/office/powerpoint/2010/main" val="2476284306"/>
+      </p:ext>
+    </p:extLst>
+  </p:cSld>
+  <p:clrMapOvr>
+    <a:masterClrMapping/>
+  </p:clrMapOvr>
+</p:sld>
+</file>
+
+<file path=ppt/slides/slide12.xml><?xml version="1.0" encoding="utf-8"?>
+<p:sld xmlns:a="http://schemas.openxmlformats.org/drawingml/2006/main" xmlns:r="http://schemas.openxmlformats.org/officeDocument/2006/relationships" xmlns:p="http://schemas.openxmlformats.org/presentationml/2006/main">
+  <p:cSld>
+    <p:spTree>
+      <p:nvGrpSpPr>
+        <p:cNvPr id="1" name=""/>
+        <p:cNvGrpSpPr/>
+        <p:nvPr/>
+      </p:nvGrpSpPr>
+      <p:grpSpPr>
+        <a:xfrm>
+          <a:off x="0" y="0"/>
+          <a:ext cx="0" cy="0"/>
+          <a:chOff x="0" y="0"/>
+          <a:chExt cx="0" cy="0"/>
+        </a:xfrm>
+      </p:grpSpPr>
+      <p:sp>
+        <p:nvSpPr>
+          <p:cNvPr id="2" name="Title 1">
+            <a:extLst>
+              <a:ext uri="{FF2B5EF4-FFF2-40B4-BE49-F238E27FC236}">
+                <a16:creationId xmlns:a16="http://schemas.microsoft.com/office/drawing/2014/main" id="{CFE05767-C0B7-764A-87A3-93D09B3493E6}"/>
+              </a:ext>
+            </a:extLst>
+          </p:cNvPr>
+          <p:cNvSpPr>
+            <a:spLocks noGrp="1"/>
+          </p:cNvSpPr>
+          <p:nvPr>
+            <p:ph type="title"/>
+          </p:nvPr>
+        </p:nvSpPr>
+        <p:spPr/>
+        <p:txBody>
+          <a:bodyPr/>
+          <a:lstStyle/>
+          <a:p>
+            <a:r>
+              <a:rPr lang="en-US" dirty="0"/>
+              <a:t>100 MHz</a:t>
+            </a:r>
+          </a:p>
+        </p:txBody>
+      </p:sp>
+      <p:sp>
+        <p:nvSpPr>
+          <p:cNvPr id="3" name="Slide Number Placeholder 2">
+            <a:extLst>
+              <a:ext uri="{FF2B5EF4-FFF2-40B4-BE49-F238E27FC236}">
+                <a16:creationId xmlns:a16="http://schemas.microsoft.com/office/drawing/2014/main" id="{EBEFB8EE-5343-108E-9E2D-5FA6121D93BA}"/>
+              </a:ext>
+            </a:extLst>
+          </p:cNvPr>
+          <p:cNvSpPr>
+            <a:spLocks noGrp="1"/>
+          </p:cNvSpPr>
+          <p:nvPr>
+            <p:ph type="sldNum" sz="quarter" idx="12"/>
+          </p:nvPr>
+        </p:nvSpPr>
+        <p:spPr/>
+        <p:txBody>
+          <a:bodyPr/>
+          <a:lstStyle/>
+          <a:p>
+            <a:fld id="{B9982081-D51A-40C8-8A41-6498517A0DD4}" type="slidenum">
+              <a:rPr lang="en-US" smtClean="0"/>
+              <a:t>12</a:t>
+            </a:fld>
+            <a:endParaRPr lang="en-US"/>
+          </a:p>
+        </p:txBody>
+      </p:sp>
+      <p:grpSp>
+        <p:nvGrpSpPr>
+          <p:cNvPr id="7" name="Group 6">
+            <a:extLst>
+              <a:ext uri="{FF2B5EF4-FFF2-40B4-BE49-F238E27FC236}">
+                <a16:creationId xmlns:a16="http://schemas.microsoft.com/office/drawing/2014/main" id="{7BCB966A-1876-70DB-1804-BCCC3AF3CEB8}"/>
+              </a:ext>
+            </a:extLst>
+          </p:cNvPr>
+          <p:cNvGrpSpPr/>
+          <p:nvPr/>
+        </p:nvGrpSpPr>
+        <p:grpSpPr>
+          <a:xfrm>
+            <a:off x="0" y="1450178"/>
+            <a:ext cx="10199510" cy="3824817"/>
+            <a:chOff x="160866" y="1028699"/>
+            <a:chExt cx="15544800" cy="5829301"/>
+          </a:xfrm>
+        </p:grpSpPr>
+        <p:pic>
+          <p:nvPicPr>
+            <p:cNvPr id="8" name="Picture 7">
+              <a:extLst>
+                <a:ext uri="{FF2B5EF4-FFF2-40B4-BE49-F238E27FC236}">
+                  <a16:creationId xmlns:a16="http://schemas.microsoft.com/office/drawing/2014/main" id="{DEEFD849-7FE9-0E25-5C4F-3A6A172D8C35}"/>
+                </a:ext>
+              </a:extLst>
+            </p:cNvPr>
+            <p:cNvPicPr>
+              <a:picLocks noChangeAspect="1"/>
+            </p:cNvPicPr>
+            <p:nvPr/>
+          </p:nvPicPr>
+          <p:blipFill>
+            <a:blip r:embed="rId2"/>
+            <a:stretch>
+              <a:fillRect/>
+            </a:stretch>
+          </p:blipFill>
+          <p:spPr>
+            <a:xfrm>
+              <a:off x="160866" y="1028700"/>
+              <a:ext cx="7772400" cy="5829300"/>
+            </a:xfrm>
+            <a:prstGeom prst="rect">
+              <a:avLst/>
+            </a:prstGeom>
+          </p:spPr>
+        </p:pic>
+        <p:pic>
+          <p:nvPicPr>
+            <p:cNvPr id="9" name="Picture 8">
+              <a:extLst>
+                <a:ext uri="{FF2B5EF4-FFF2-40B4-BE49-F238E27FC236}">
+                  <a16:creationId xmlns:a16="http://schemas.microsoft.com/office/drawing/2014/main" id="{5CDAD1ED-D62B-E426-C506-9C7EEE4DA88B}"/>
+                </a:ext>
+              </a:extLst>
+            </p:cNvPr>
+            <p:cNvPicPr>
+              <a:picLocks noChangeAspect="1"/>
+            </p:cNvPicPr>
+            <p:nvPr/>
+          </p:nvPicPr>
+          <p:blipFill>
+            <a:blip r:embed="rId3"/>
+            <a:stretch>
+              <a:fillRect/>
+            </a:stretch>
+          </p:blipFill>
+          <p:spPr>
+            <a:xfrm>
+              <a:off x="7933266" y="1028699"/>
+              <a:ext cx="7772400" cy="5829300"/>
+            </a:xfrm>
+            <a:prstGeom prst="rect">
+              <a:avLst/>
+            </a:prstGeom>
+          </p:spPr>
+        </p:pic>
+      </p:grpSp>
+      <p:sp>
+        <p:nvSpPr>
+          <p:cNvPr id="10" name="TextBox 9">
+            <a:extLst>
+              <a:ext uri="{FF2B5EF4-FFF2-40B4-BE49-F238E27FC236}">
+                <a16:creationId xmlns:a16="http://schemas.microsoft.com/office/drawing/2014/main" id="{F957740D-46B4-7360-9941-8C60ED3B610C}"/>
+              </a:ext>
+            </a:extLst>
+          </p:cNvPr>
+          <p:cNvSpPr txBox="1"/>
+          <p:nvPr/>
+        </p:nvSpPr>
+        <p:spPr>
+          <a:xfrm>
+            <a:off x="169333" y="5433020"/>
+            <a:ext cx="6494791" cy="923330"/>
+          </a:xfrm>
+          <a:prstGeom prst="rect">
+            <a:avLst/>
+          </a:prstGeom>
+          <a:noFill/>
+        </p:spPr>
+        <p:txBody>
+          <a:bodyPr wrap="none" rtlCol="0">
+            <a:spAutoFit/>
+          </a:bodyPr>
+          <a:lstStyle/>
+          <a:p>
+            <a:pPr marL="285750" indent="-285750">
+              <a:buFont typeface="Arial" panose="020B0604020202020204" pitchFamily="34" charset="0"/>
+              <a:buChar char="•"/>
+            </a:pPr>
+            <a:r>
+              <a:rPr lang="en-US" dirty="0"/>
+              <a:t>100 MHz, 3.5 </a:t>
+            </a:r>
+            <a:r>
+              <a:rPr lang="en-US" dirty="0" err="1"/>
+              <a:t>ps</a:t>
+            </a:r>
+            <a:r>
+              <a:rPr lang="en-US" dirty="0"/>
+              <a:t>/nm/km round trip</a:t>
+            </a:r>
+          </a:p>
+          <a:p>
+            <a:pPr marL="285750" indent="-285750">
+              <a:buFont typeface="Arial" panose="020B0604020202020204" pitchFamily="34" charset="0"/>
+              <a:buChar char="•"/>
+            </a:pPr>
+            <a:r>
+              <a:rPr lang="en-US" dirty="0"/>
+              <a:t>15 cm straight arm</a:t>
+            </a:r>
+          </a:p>
+          <a:p>
+            <a:pPr marL="742950" lvl="1" indent="-285750">
+              <a:buFont typeface="Arial" panose="020B0604020202020204" pitchFamily="34" charset="0"/>
+              <a:buChar char="•"/>
+            </a:pPr>
+            <a:r>
+              <a:rPr lang="en-US" dirty="0"/>
+              <a:t>accounting for: 0.7 dB insertion loss and 0.7 dB splicing loss</a:t>
+            </a:r>
+          </a:p>
+        </p:txBody>
+      </p:sp>
+      <mc:AlternateContent xmlns:mc="http://schemas.openxmlformats.org/markup-compatibility/2006">
+        <mc:Choice xmlns:a14="http://schemas.microsoft.com/office/drawing/2010/main" Requires="a14">
+          <p:sp>
+            <p:nvSpPr>
+              <p:cNvPr id="11" name="TextBox 10">
+                <a:extLst>
+                  <a:ext uri="{FF2B5EF4-FFF2-40B4-BE49-F238E27FC236}">
+                    <a16:creationId xmlns:a16="http://schemas.microsoft.com/office/drawing/2014/main" id="{E7A9181A-7B64-C617-7530-EB0706B2076D}"/>
+                  </a:ext>
+                </a:extLst>
+              </p:cNvPr>
+              <p:cNvSpPr txBox="1"/>
+              <p:nvPr/>
+            </p:nvSpPr>
+            <p:spPr>
+              <a:xfrm>
+                <a:off x="10329335" y="2032268"/>
+                <a:ext cx="1676398" cy="646331"/>
+              </a:xfrm>
+              <a:prstGeom prst="rect">
+                <a:avLst/>
+              </a:prstGeom>
+              <a:noFill/>
+            </p:spPr>
+            <p:txBody>
+              <a:bodyPr wrap="square" rtlCol="0">
+                <a:spAutoFit/>
+              </a:bodyPr>
+              <a:lstStyle/>
+              <a:p>
+                <a:r>
+                  <a:rPr lang="en-US" dirty="0"/>
+                  <a:t>Output coupler:</a:t>
+                </a:r>
+              </a:p>
+              <a:p>
+                <a14:m>
+                  <m:oMath xmlns:m="http://schemas.openxmlformats.org/officeDocument/2006/math">
+                    <m:sSub>
+                      <m:sSubPr>
+                        <m:ctrlPr>
+                          <a:rPr lang="en-US" b="0" i="1" smtClean="0">
+                            <a:latin typeface="Cambria Math" panose="02040503050406030204" pitchFamily="18" charset="0"/>
+                          </a:rPr>
+                        </m:ctrlPr>
+                      </m:sSubPr>
+                      <m:e>
+                        <m:r>
+                          <a:rPr lang="en-US" b="0" i="1" smtClean="0">
+                            <a:latin typeface="Cambria Math" panose="02040503050406030204" pitchFamily="18" charset="0"/>
+                          </a:rPr>
+                          <m:t>𝐸</m:t>
+                        </m:r>
+                      </m:e>
+                      <m:sub>
+                        <m:r>
+                          <a:rPr lang="en-US" b="0" i="1" smtClean="0">
+                            <a:latin typeface="Cambria Math" panose="02040503050406030204" pitchFamily="18" charset="0"/>
+                          </a:rPr>
+                          <m:t>𝑐𝑤</m:t>
+                        </m:r>
+                      </m:sub>
+                    </m:sSub>
+                    <m:r>
+                      <a:rPr lang="en-US" b="0" i="1" smtClean="0">
+                        <a:latin typeface="Cambria Math" panose="02040503050406030204" pitchFamily="18" charset="0"/>
+                      </a:rPr>
+                      <m:t>−</m:t>
+                    </m:r>
+                    <m:sSub>
+                      <m:sSubPr>
+                        <m:ctrlPr>
+                          <a:rPr lang="en-US" b="0" i="1" smtClean="0">
+                            <a:latin typeface="Cambria Math" panose="02040503050406030204" pitchFamily="18" charset="0"/>
+                          </a:rPr>
+                        </m:ctrlPr>
+                      </m:sSubPr>
+                      <m:e>
+                        <m:r>
+                          <a:rPr lang="en-US" b="0" i="1" smtClean="0">
+                            <a:latin typeface="Cambria Math" panose="02040503050406030204" pitchFamily="18" charset="0"/>
+                          </a:rPr>
+                          <m:t>𝐸</m:t>
+                        </m:r>
+                      </m:e>
+                      <m:sub>
+                        <m:r>
+                          <a:rPr lang="en-US" b="0" i="1" smtClean="0">
+                            <a:latin typeface="Cambria Math" panose="02040503050406030204" pitchFamily="18" charset="0"/>
+                          </a:rPr>
+                          <m:t>𝑐𝑐𝑤</m:t>
+                        </m:r>
+                      </m:sub>
+                    </m:sSub>
+                  </m:oMath>
+                </a14:m>
+                <a:r>
+                  <a:rPr lang="en-US" dirty="0"/>
+                  <a:t> </a:t>
+                </a:r>
+              </a:p>
+            </p:txBody>
+          </p:sp>
+        </mc:Choice>
+        <mc:Fallback>
+          <p:sp>
+            <p:nvSpPr>
+              <p:cNvPr id="11" name="TextBox 10">
+                <a:extLst>
+                  <a:ext uri="{FF2B5EF4-FFF2-40B4-BE49-F238E27FC236}">
+                    <a16:creationId xmlns:a16="http://schemas.microsoft.com/office/drawing/2014/main" id="{E7A9181A-7B64-C617-7530-EB0706B2076D}"/>
+                  </a:ext>
+                </a:extLst>
+              </p:cNvPr>
+              <p:cNvSpPr txBox="1">
+                <a:spLocks noRot="1" noChangeAspect="1" noMove="1" noResize="1" noEditPoints="1" noAdjustHandles="1" noChangeArrowheads="1" noChangeShapeType="1" noTextEdit="1"/>
+              </p:cNvSpPr>
+              <p:nvPr/>
+            </p:nvSpPr>
+            <p:spPr>
+              <a:xfrm>
+                <a:off x="10329335" y="2032268"/>
+                <a:ext cx="1676398" cy="646331"/>
+              </a:xfrm>
+              <a:prstGeom prst="rect">
+                <a:avLst/>
+              </a:prstGeom>
+              <a:blipFill>
+                <a:blip r:embed="rId4"/>
+                <a:stretch>
+                  <a:fillRect l="-3008" t="-3846" r="-2256"/>
+                </a:stretch>
+              </a:blipFill>
+            </p:spPr>
+            <p:txBody>
+              <a:bodyPr/>
+              <a:lstStyle/>
+              <a:p>
+                <a:r>
+                  <a:rPr lang="en-US">
+                    <a:noFill/>
+                  </a:rPr>
+                  <a:t> </a:t>
+                </a:r>
+              </a:p>
+            </p:txBody>
+          </p:sp>
+        </mc:Fallback>
+      </mc:AlternateContent>
+      <mc:AlternateContent xmlns:mc="http://schemas.openxmlformats.org/markup-compatibility/2006">
+        <mc:Choice xmlns:a14="http://schemas.microsoft.com/office/drawing/2010/main" Requires="a14">
+          <p:sp>
+            <p:nvSpPr>
+              <p:cNvPr id="12" name="TextBox 11">
+                <a:extLst>
+                  <a:ext uri="{FF2B5EF4-FFF2-40B4-BE49-F238E27FC236}">
+                    <a16:creationId xmlns:a16="http://schemas.microsoft.com/office/drawing/2014/main" id="{FE51138E-6AB5-DF80-871F-81AB4ED69F1C}"/>
+                  </a:ext>
+                </a:extLst>
+              </p:cNvPr>
+              <p:cNvSpPr txBox="1"/>
+              <p:nvPr/>
+            </p:nvSpPr>
+            <p:spPr>
+              <a:xfrm>
+                <a:off x="10329335" y="3572933"/>
+                <a:ext cx="1676398" cy="923330"/>
+              </a:xfrm>
+              <a:prstGeom prst="rect">
+                <a:avLst/>
+              </a:prstGeom>
+              <a:noFill/>
+            </p:spPr>
+            <p:txBody>
+              <a:bodyPr wrap="square" rtlCol="0">
+                <a:spAutoFit/>
+              </a:bodyPr>
+              <a:lstStyle/>
+              <a:p>
+                <a:r>
+                  <a:rPr lang="en-US" dirty="0"/>
+                  <a:t>Reflected back to cavity:</a:t>
+                </a:r>
+              </a:p>
+              <a:p>
+                <a14:m>
+                  <m:oMathPara xmlns:m="http://schemas.openxmlformats.org/officeDocument/2006/math">
+                    <m:oMathParaPr>
+                      <m:jc m:val="centerGroup"/>
+                    </m:oMathParaPr>
+                    <m:oMath xmlns:m="http://schemas.openxmlformats.org/officeDocument/2006/math">
+                      <m:sSub>
+                        <m:sSubPr>
+                          <m:ctrlPr>
+                            <a:rPr lang="en-US" b="0" i="1" smtClean="0">
+                              <a:latin typeface="Cambria Math" panose="02040503050406030204" pitchFamily="18" charset="0"/>
+                            </a:rPr>
+                          </m:ctrlPr>
+                        </m:sSubPr>
+                        <m:e>
+                          <m:r>
+                            <a:rPr lang="en-US" b="0" i="1" smtClean="0">
+                              <a:latin typeface="Cambria Math" panose="02040503050406030204" pitchFamily="18" charset="0"/>
+                            </a:rPr>
+                            <m:t>𝐸</m:t>
+                          </m:r>
+                        </m:e>
+                        <m:sub>
+                          <m:r>
+                            <a:rPr lang="en-US" b="0" i="1" smtClean="0">
+                              <a:latin typeface="Cambria Math" panose="02040503050406030204" pitchFamily="18" charset="0"/>
+                            </a:rPr>
+                            <m:t>𝑐𝑤</m:t>
+                          </m:r>
+                        </m:sub>
+                      </m:sSub>
+                      <m:r>
+                        <a:rPr lang="en-US" b="0" i="1" smtClean="0">
+                          <a:latin typeface="Cambria Math" panose="02040503050406030204" pitchFamily="18" charset="0"/>
+                        </a:rPr>
+                        <m:t>+</m:t>
+                      </m:r>
+                      <m:sSub>
+                        <m:sSubPr>
+                          <m:ctrlPr>
+                            <a:rPr lang="en-US" b="0" i="1" smtClean="0">
+                              <a:latin typeface="Cambria Math" panose="02040503050406030204" pitchFamily="18" charset="0"/>
+                            </a:rPr>
+                          </m:ctrlPr>
+                        </m:sSubPr>
+                        <m:e>
+                          <m:r>
+                            <a:rPr lang="en-US" b="0" i="1" smtClean="0">
+                              <a:latin typeface="Cambria Math" panose="02040503050406030204" pitchFamily="18" charset="0"/>
+                            </a:rPr>
+                            <m:t>𝐸</m:t>
+                          </m:r>
+                        </m:e>
+                        <m:sub>
+                          <m:r>
+                            <a:rPr lang="en-US" b="0" i="1" smtClean="0">
+                              <a:latin typeface="Cambria Math" panose="02040503050406030204" pitchFamily="18" charset="0"/>
+                            </a:rPr>
+                            <m:t>𝑐𝑐𝑤</m:t>
+                          </m:r>
+                        </m:sub>
+                      </m:sSub>
+                    </m:oMath>
+                  </m:oMathPara>
+                </a14:m>
+                <a:endParaRPr lang="en-US" dirty="0"/>
+              </a:p>
+            </p:txBody>
+          </p:sp>
+        </mc:Choice>
+        <mc:Fallback>
+          <p:sp>
+            <p:nvSpPr>
+              <p:cNvPr id="12" name="TextBox 11">
+                <a:extLst>
+                  <a:ext uri="{FF2B5EF4-FFF2-40B4-BE49-F238E27FC236}">
+                    <a16:creationId xmlns:a16="http://schemas.microsoft.com/office/drawing/2014/main" id="{FE51138E-6AB5-DF80-871F-81AB4ED69F1C}"/>
+                  </a:ext>
+                </a:extLst>
+              </p:cNvPr>
+              <p:cNvSpPr txBox="1">
+                <a:spLocks noRot="1" noChangeAspect="1" noMove="1" noResize="1" noEditPoints="1" noAdjustHandles="1" noChangeArrowheads="1" noChangeShapeType="1" noTextEdit="1"/>
+              </p:cNvSpPr>
+              <p:nvPr/>
+            </p:nvSpPr>
+            <p:spPr>
+              <a:xfrm>
+                <a:off x="10329335" y="3572933"/>
+                <a:ext cx="1676398" cy="923330"/>
+              </a:xfrm>
+              <a:prstGeom prst="rect">
+                <a:avLst/>
+              </a:prstGeom>
+              <a:blipFill>
+                <a:blip r:embed="rId5"/>
+                <a:stretch>
+                  <a:fillRect l="-3008" t="-2703"/>
+                </a:stretch>
+              </a:blipFill>
+            </p:spPr>
+            <p:txBody>
+              <a:bodyPr/>
+              <a:lstStyle/>
+              <a:p>
+                <a:r>
+                  <a:rPr lang="en-US">
+                    <a:noFill/>
+                  </a:rPr>
+                  <a:t> </a:t>
+                </a:r>
+              </a:p>
+            </p:txBody>
+          </p:sp>
+        </mc:Fallback>
+      </mc:AlternateContent>
+      <p:cxnSp>
+        <p:nvCxnSpPr>
+          <p:cNvPr id="13" name="Straight Arrow Connector 12">
+            <a:extLst>
+              <a:ext uri="{FF2B5EF4-FFF2-40B4-BE49-F238E27FC236}">
+                <a16:creationId xmlns:a16="http://schemas.microsoft.com/office/drawing/2014/main" id="{B39ED3A8-388C-F6A9-CF93-75366CCC3E8E}"/>
+              </a:ext>
+            </a:extLst>
+          </p:cNvPr>
+          <p:cNvCxnSpPr/>
+          <p:nvPr/>
+        </p:nvCxnSpPr>
+        <p:spPr>
+          <a:xfrm flipH="1">
+            <a:off x="9922935" y="2438615"/>
+            <a:ext cx="406400" cy="0"/>
+          </a:xfrm>
+          <a:prstGeom prst="straightConnector1">
+            <a:avLst/>
+          </a:prstGeom>
+          <a:ln w="25400">
+            <a:solidFill>
+              <a:srgbClr val="FF0000"/>
+            </a:solidFill>
+            <a:tailEnd type="triangle"/>
+          </a:ln>
+        </p:spPr>
+        <p:style>
+          <a:lnRef idx="1">
+            <a:schemeClr val="accent1"/>
+          </a:lnRef>
+          <a:fillRef idx="0">
+            <a:schemeClr val="accent1"/>
+          </a:fillRef>
+          <a:effectRef idx="0">
+            <a:schemeClr val="accent1"/>
+          </a:effectRef>
+          <a:fontRef idx="minor">
+            <a:schemeClr val="tx1"/>
+          </a:fontRef>
+        </p:style>
+      </p:cxnSp>
+      <p:cxnSp>
+        <p:nvCxnSpPr>
+          <p:cNvPr id="14" name="Straight Arrow Connector 13">
+            <a:extLst>
+              <a:ext uri="{FF2B5EF4-FFF2-40B4-BE49-F238E27FC236}">
+                <a16:creationId xmlns:a16="http://schemas.microsoft.com/office/drawing/2014/main" id="{DEA14D14-E3A2-078C-D610-B6072D2E93DB}"/>
+              </a:ext>
+            </a:extLst>
+          </p:cNvPr>
+          <p:cNvCxnSpPr/>
+          <p:nvPr/>
+        </p:nvCxnSpPr>
+        <p:spPr>
+          <a:xfrm flipH="1">
+            <a:off x="9922935" y="4157349"/>
+            <a:ext cx="406400" cy="0"/>
+          </a:xfrm>
+          <a:prstGeom prst="straightConnector1">
+            <a:avLst/>
+          </a:prstGeom>
+          <a:ln w="25400">
+            <a:solidFill>
+              <a:srgbClr val="FF0000"/>
+            </a:solidFill>
+            <a:tailEnd type="triangle"/>
+          </a:ln>
+        </p:spPr>
+        <p:style>
+          <a:lnRef idx="1">
+            <a:schemeClr val="accent1"/>
+          </a:lnRef>
+          <a:fillRef idx="0">
+            <a:schemeClr val="accent1"/>
+          </a:fillRef>
+          <a:effectRef idx="0">
+            <a:schemeClr val="accent1"/>
+          </a:effectRef>
+          <a:fontRef idx="minor">
+            <a:schemeClr val="tx1"/>
+          </a:fontRef>
+        </p:style>
+      </p:cxnSp>
+      <p:sp>
+        <p:nvSpPr>
+          <p:cNvPr id="15" name="TextBox 14">
+            <a:extLst>
+              <a:ext uri="{FF2B5EF4-FFF2-40B4-BE49-F238E27FC236}">
+                <a16:creationId xmlns:a16="http://schemas.microsoft.com/office/drawing/2014/main" id="{AA6DB8C7-753E-99DF-71EB-5404CE4D0C87}"/>
+              </a:ext>
+            </a:extLst>
+          </p:cNvPr>
+          <p:cNvSpPr txBox="1"/>
+          <p:nvPr/>
+        </p:nvSpPr>
+        <p:spPr>
+          <a:xfrm>
+            <a:off x="1629832" y="1832213"/>
+            <a:ext cx="1117600" cy="523220"/>
+          </a:xfrm>
+          <a:prstGeom prst="rect">
+            <a:avLst/>
+          </a:prstGeom>
+          <a:noFill/>
+        </p:spPr>
+        <p:txBody>
+          <a:bodyPr wrap="square" rtlCol="0">
+            <a:spAutoFit/>
+          </a:bodyPr>
+          <a:lstStyle/>
+          <a:p>
+            <a:r>
+              <a:rPr lang="en-US" sz="1400" dirty="0"/>
+              <a:t>60 </a:t>
+            </a:r>
+            <a:r>
+              <a:rPr lang="en-US" sz="1400" dirty="0" err="1"/>
+              <a:t>mW</a:t>
+            </a:r>
+            <a:r>
+              <a:rPr lang="en-US" sz="1400" dirty="0"/>
+              <a:t> pump</a:t>
+            </a:r>
+          </a:p>
+        </p:txBody>
+      </p:sp>
+      <p:sp>
+        <p:nvSpPr>
+          <p:cNvPr id="16" name="TextBox 15">
+            <a:extLst>
+              <a:ext uri="{FF2B5EF4-FFF2-40B4-BE49-F238E27FC236}">
+                <a16:creationId xmlns:a16="http://schemas.microsoft.com/office/drawing/2014/main" id="{5AB02D45-AD8A-F52C-6F0A-4C2214F95F90}"/>
+              </a:ext>
+            </a:extLst>
+          </p:cNvPr>
+          <p:cNvSpPr txBox="1"/>
+          <p:nvPr/>
+        </p:nvSpPr>
+        <p:spPr>
+          <a:xfrm>
+            <a:off x="6769098" y="1832213"/>
+            <a:ext cx="1117600" cy="523220"/>
+          </a:xfrm>
+          <a:prstGeom prst="rect">
+            <a:avLst/>
+          </a:prstGeom>
+          <a:noFill/>
+        </p:spPr>
+        <p:txBody>
+          <a:bodyPr wrap="square" rtlCol="0">
+            <a:spAutoFit/>
+          </a:bodyPr>
+          <a:lstStyle/>
+          <a:p>
+            <a:r>
+              <a:rPr lang="en-US" sz="1400" dirty="0"/>
+              <a:t>75 </a:t>
+            </a:r>
+            <a:r>
+              <a:rPr lang="en-US" sz="1400" dirty="0" err="1"/>
+              <a:t>mW</a:t>
+            </a:r>
+            <a:r>
+              <a:rPr lang="en-US" sz="1400" dirty="0"/>
+              <a:t> pump</a:t>
+            </a:r>
+          </a:p>
+        </p:txBody>
+      </p:sp>
+    </p:spTree>
+    <p:extLst>
+      <p:ext uri="{BB962C8B-B14F-4D97-AF65-F5344CB8AC3E}">
+        <p14:creationId xmlns:p14="http://schemas.microsoft.com/office/powerpoint/2010/main" val="3422921867"/>
+      </p:ext>
+    </p:extLst>
+  </p:cSld>
+  <p:clrMapOvr>
+    <a:masterClrMapping/>
+  </p:clrMapOvr>
+</p:sld>
+</file>
+
+<file path=ppt/slides/slide13.xml><?xml version="1.0" encoding="utf-8"?>
+<p:sld xmlns:a="http://schemas.openxmlformats.org/drawingml/2006/main" xmlns:r="http://schemas.openxmlformats.org/officeDocument/2006/relationships" xmlns:p="http://schemas.openxmlformats.org/presentationml/2006/main">
+  <p:cSld>
+    <p:spTree>
+      <p:nvGrpSpPr>
+        <p:cNvPr id="1" name=""/>
+        <p:cNvGrpSpPr/>
+        <p:nvPr/>
+      </p:nvGrpSpPr>
+      <p:grpSpPr>
+        <a:xfrm>
+          <a:off x="0" y="0"/>
+          <a:ext cx="0" cy="0"/>
+          <a:chOff x="0" y="0"/>
+          <a:chExt cx="0" cy="0"/>
+        </a:xfrm>
+      </p:grpSpPr>
+      <p:sp>
+        <p:nvSpPr>
+          <p:cNvPr id="2" name="Title 1">
+            <a:extLst>
+              <a:ext uri="{FF2B5EF4-FFF2-40B4-BE49-F238E27FC236}">
+                <a16:creationId xmlns:a16="http://schemas.microsoft.com/office/drawing/2014/main" id="{11DB3E3B-B31A-4BFA-2DF6-DCE77E19E8F6}"/>
+              </a:ext>
+            </a:extLst>
+          </p:cNvPr>
+          <p:cNvSpPr>
+            <a:spLocks noGrp="1"/>
+          </p:cNvSpPr>
+          <p:nvPr>
+            <p:ph type="title"/>
+          </p:nvPr>
+        </p:nvSpPr>
+        <p:spPr/>
+        <p:txBody>
+          <a:bodyPr/>
+          <a:lstStyle/>
+          <a:p>
+            <a:r>
+              <a:rPr lang="en-US" dirty="0"/>
+              <a:t>Length of straight section is important</a:t>
+            </a:r>
+          </a:p>
+        </p:txBody>
+      </p:sp>
+      <p:sp>
+        <p:nvSpPr>
+          <p:cNvPr id="3" name="Slide Number Placeholder 2">
+            <a:extLst>
+              <a:ext uri="{FF2B5EF4-FFF2-40B4-BE49-F238E27FC236}">
+                <a16:creationId xmlns:a16="http://schemas.microsoft.com/office/drawing/2014/main" id="{BCD2728D-841A-A24A-2A60-E66224E4E59D}"/>
+              </a:ext>
+            </a:extLst>
+          </p:cNvPr>
+          <p:cNvSpPr>
+            <a:spLocks noGrp="1"/>
+          </p:cNvSpPr>
+          <p:nvPr>
+            <p:ph type="sldNum" sz="quarter" idx="12"/>
+          </p:nvPr>
+        </p:nvSpPr>
+        <p:spPr/>
+        <p:txBody>
+          <a:bodyPr/>
+          <a:lstStyle/>
+          <a:p>
+            <a:fld id="{B9982081-D51A-40C8-8A41-6498517A0DD4}" type="slidenum">
+              <a:rPr lang="en-US" smtClean="0"/>
+              <a:t>13</a:t>
+            </a:fld>
+            <a:endParaRPr lang="en-US"/>
+          </a:p>
+        </p:txBody>
+      </p:sp>
+      <p:grpSp>
+        <p:nvGrpSpPr>
+          <p:cNvPr id="7" name="Group 6">
+            <a:extLst>
+              <a:ext uri="{FF2B5EF4-FFF2-40B4-BE49-F238E27FC236}">
+                <a16:creationId xmlns:a16="http://schemas.microsoft.com/office/drawing/2014/main" id="{BC457F54-4A02-AA8B-7901-5B94DA6ECFE2}"/>
+              </a:ext>
+            </a:extLst>
+          </p:cNvPr>
+          <p:cNvGrpSpPr/>
+          <p:nvPr/>
+        </p:nvGrpSpPr>
+        <p:grpSpPr>
+          <a:xfrm>
+            <a:off x="0" y="1066799"/>
+            <a:ext cx="12192000" cy="3048000"/>
+            <a:chOff x="0" y="1028699"/>
+            <a:chExt cx="23317200" cy="5829300"/>
+          </a:xfrm>
+        </p:grpSpPr>
+        <p:pic>
+          <p:nvPicPr>
+            <p:cNvPr id="4" name="Picture 3">
+              <a:extLst>
+                <a:ext uri="{FF2B5EF4-FFF2-40B4-BE49-F238E27FC236}">
+                  <a16:creationId xmlns:a16="http://schemas.microsoft.com/office/drawing/2014/main" id="{E8E9631A-F47D-53BE-D431-21BAA2F4C468}"/>
+                </a:ext>
+              </a:extLst>
+            </p:cNvPr>
+            <p:cNvPicPr>
+              <a:picLocks noChangeAspect="1"/>
+            </p:cNvPicPr>
+            <p:nvPr/>
+          </p:nvPicPr>
+          <p:blipFill>
+            <a:blip r:embed="rId2"/>
+            <a:stretch>
+              <a:fillRect/>
+            </a:stretch>
+          </p:blipFill>
+          <p:spPr>
+            <a:xfrm>
+              <a:off x="0" y="1028699"/>
+              <a:ext cx="7772400" cy="5829300"/>
+            </a:xfrm>
+            <a:prstGeom prst="rect">
+              <a:avLst/>
+            </a:prstGeom>
+          </p:spPr>
+        </p:pic>
+        <p:pic>
+          <p:nvPicPr>
+            <p:cNvPr id="5" name="Picture 4">
+              <a:extLst>
+                <a:ext uri="{FF2B5EF4-FFF2-40B4-BE49-F238E27FC236}">
+                  <a16:creationId xmlns:a16="http://schemas.microsoft.com/office/drawing/2014/main" id="{26FD56AE-5D72-3044-B916-8AC18C8E9A1D}"/>
+                </a:ext>
+              </a:extLst>
+            </p:cNvPr>
+            <p:cNvPicPr>
+              <a:picLocks noChangeAspect="1"/>
+            </p:cNvPicPr>
+            <p:nvPr/>
+          </p:nvPicPr>
+          <p:blipFill>
+            <a:blip r:embed="rId3"/>
+            <a:stretch>
+              <a:fillRect/>
+            </a:stretch>
+          </p:blipFill>
+          <p:spPr>
+            <a:xfrm>
+              <a:off x="7772400" y="1028699"/>
+              <a:ext cx="7772400" cy="5829300"/>
+            </a:xfrm>
+            <a:prstGeom prst="rect">
+              <a:avLst/>
+            </a:prstGeom>
+          </p:spPr>
+        </p:pic>
+        <p:pic>
+          <p:nvPicPr>
+            <p:cNvPr id="6" name="Picture 5">
+              <a:extLst>
+                <a:ext uri="{FF2B5EF4-FFF2-40B4-BE49-F238E27FC236}">
+                  <a16:creationId xmlns:a16="http://schemas.microsoft.com/office/drawing/2014/main" id="{9296765C-F11C-929B-252E-885BDE800D75}"/>
+                </a:ext>
+              </a:extLst>
+            </p:cNvPr>
+            <p:cNvPicPr>
+              <a:picLocks noChangeAspect="1"/>
+            </p:cNvPicPr>
+            <p:nvPr/>
+          </p:nvPicPr>
+          <p:blipFill>
+            <a:blip r:embed="rId4"/>
+            <a:stretch>
+              <a:fillRect/>
+            </a:stretch>
+          </p:blipFill>
+          <p:spPr>
+            <a:xfrm>
+              <a:off x="15544800" y="1028699"/>
+              <a:ext cx="7772400" cy="5829300"/>
+            </a:xfrm>
+            <a:prstGeom prst="rect">
+              <a:avLst/>
+            </a:prstGeom>
+          </p:spPr>
+        </p:pic>
+      </p:grpSp>
+      <p:sp>
+        <p:nvSpPr>
+          <p:cNvPr id="9" name="TextBox 8">
+            <a:extLst>
+              <a:ext uri="{FF2B5EF4-FFF2-40B4-BE49-F238E27FC236}">
+                <a16:creationId xmlns:a16="http://schemas.microsoft.com/office/drawing/2014/main" id="{D7FA7EEC-E65F-B531-CFE6-D2FD4186C88A}"/>
+              </a:ext>
+            </a:extLst>
+          </p:cNvPr>
+          <p:cNvSpPr txBox="1"/>
+          <p:nvPr/>
+        </p:nvSpPr>
+        <p:spPr>
+          <a:xfrm>
+            <a:off x="669929" y="4258733"/>
+            <a:ext cx="3394071" cy="369332"/>
+          </a:xfrm>
+          <a:prstGeom prst="rect">
+            <a:avLst/>
+          </a:prstGeom>
+          <a:noFill/>
+        </p:spPr>
+        <p:txBody>
+          <a:bodyPr wrap="none" rtlCol="0">
+            <a:spAutoFit/>
+          </a:bodyPr>
+          <a:lstStyle/>
+          <a:p>
+            <a:r>
+              <a:rPr lang="en-US" dirty="0"/>
+              <a:t>15 cm straight section @ 100 MHz</a:t>
+            </a:r>
+          </a:p>
+        </p:txBody>
+      </p:sp>
+      <mc:AlternateContent xmlns:mc="http://schemas.openxmlformats.org/markup-compatibility/2006">
+        <mc:Choice xmlns:a14="http://schemas.microsoft.com/office/drawing/2010/main" Requires="a14">
+          <p:sp>
+            <p:nvSpPr>
+              <p:cNvPr id="12" name="TextBox 11">
+                <a:extLst>
+                  <a:ext uri="{FF2B5EF4-FFF2-40B4-BE49-F238E27FC236}">
+                    <a16:creationId xmlns:a16="http://schemas.microsoft.com/office/drawing/2014/main" id="{9C47A671-05DA-CE0A-5FAD-F72B0B82413F}"/>
+                  </a:ext>
+                </a:extLst>
+              </p:cNvPr>
+              <p:cNvSpPr txBox="1"/>
+              <p:nvPr/>
+            </p:nvSpPr>
+            <p:spPr>
+              <a:xfrm>
+                <a:off x="413741" y="4771999"/>
+                <a:ext cx="7900526" cy="1815882"/>
+              </a:xfrm>
+              <a:prstGeom prst="rect">
+                <a:avLst/>
+              </a:prstGeom>
+              <a:noFill/>
+            </p:spPr>
+            <p:txBody>
+              <a:bodyPr wrap="square" rtlCol="0">
+                <a:spAutoFit/>
+              </a:bodyPr>
+              <a:lstStyle/>
+              <a:p>
+                <a:r>
+                  <a:rPr lang="en-US" sz="1400" dirty="0"/>
+                  <a:t>I can’t quite pin down the effect of elongating the straight section</a:t>
+                </a:r>
+              </a:p>
+              <a:p>
+                <a:pPr marL="285750" indent="-285750">
+                  <a:buFont typeface="Arial" panose="020B0604020202020204" pitchFamily="34" charset="0"/>
+                  <a:buChar char="•"/>
+                </a:pPr>
+                <a:r>
+                  <a:rPr lang="en-US" sz="1400" dirty="0"/>
+                  <a:t>I think it has a similar effect as pushing the cavity more anomalous, even if the round-trip dispersion is kept the same. </a:t>
+                </a:r>
+              </a:p>
+              <a:p>
+                <a:pPr marL="285750" indent="-285750">
+                  <a:buFont typeface="Arial" panose="020B0604020202020204" pitchFamily="34" charset="0"/>
+                  <a:buChar char="•"/>
+                </a:pPr>
+                <a:r>
+                  <a:rPr lang="en-US" sz="1400" dirty="0"/>
+                  <a:t>Each simulation takes </a:t>
+                </a:r>
+                <a14:m>
+                  <m:oMath xmlns:m="http://schemas.openxmlformats.org/officeDocument/2006/math">
+                    <m:r>
+                      <a:rPr lang="en-US" sz="1400" b="0" i="1" smtClean="0">
+                        <a:latin typeface="Cambria Math" panose="02040503050406030204" pitchFamily="18" charset="0"/>
+                      </a:rPr>
+                      <m:t>~</m:t>
+                    </m:r>
+                  </m:oMath>
+                </a14:m>
+                <a:r>
+                  <a:rPr lang="en-US" sz="1400" dirty="0"/>
+                  <a:t> 5 – 7 min, so I haven’t tested parameters thoroughly, but at 100 MHz I think I can push the straight section to around 30 cm. Whereas, for 200 MHz, I have a hard time reaching stability with any straight section longer than </a:t>
+                </a:r>
+                <a14:m>
+                  <m:oMath xmlns:m="http://schemas.openxmlformats.org/officeDocument/2006/math">
+                    <m:r>
+                      <a:rPr lang="en-US" sz="1400" b="0" i="1" smtClean="0">
+                        <a:latin typeface="Cambria Math" panose="02040503050406030204" pitchFamily="18" charset="0"/>
+                      </a:rPr>
+                      <m:t>~</m:t>
+                    </m:r>
+                  </m:oMath>
+                </a14:m>
+                <a:r>
+                  <a:rPr lang="en-US" sz="1400" dirty="0"/>
+                  <a:t>11 cm</a:t>
+                </a:r>
+              </a:p>
+              <a:p>
+                <a:pPr marL="742950" lvl="1" indent="-285750">
+                  <a:buFont typeface="Arial" panose="020B0604020202020204" pitchFamily="34" charset="0"/>
+                  <a:buChar char="•"/>
+                </a:pPr>
+                <a:r>
+                  <a:rPr lang="en-US" sz="1400" dirty="0">
+                    <a:solidFill>
+                      <a:srgbClr val="00B0F0"/>
+                    </a:solidFill>
+                  </a:rPr>
+                  <a:t>This is different than what I was doing experimentally, where I thought only the </a:t>
+                </a:r>
+                <a:r>
+                  <a:rPr lang="en-US" sz="1400" i="1" dirty="0">
+                    <a:solidFill>
+                      <a:srgbClr val="00B0F0"/>
+                    </a:solidFill>
+                  </a:rPr>
+                  <a:t>total</a:t>
+                </a:r>
+                <a:r>
+                  <a:rPr lang="en-US" sz="1400" dirty="0">
+                    <a:solidFill>
+                      <a:srgbClr val="00B0F0"/>
+                    </a:solidFill>
+                  </a:rPr>
+                  <a:t> round trip dispersion mattered. I think it turns out different lengths of straight section has a big effect.</a:t>
+                </a:r>
+              </a:p>
+            </p:txBody>
+          </p:sp>
+        </mc:Choice>
+        <mc:Fallback>
+          <p:sp>
+            <p:nvSpPr>
+              <p:cNvPr id="12" name="TextBox 11">
+                <a:extLst>
+                  <a:ext uri="{FF2B5EF4-FFF2-40B4-BE49-F238E27FC236}">
+                    <a16:creationId xmlns:a16="http://schemas.microsoft.com/office/drawing/2014/main" id="{9C47A671-05DA-CE0A-5FAD-F72B0B82413F}"/>
+                  </a:ext>
+                </a:extLst>
+              </p:cNvPr>
+              <p:cNvSpPr txBox="1">
+                <a:spLocks noRot="1" noChangeAspect="1" noMove="1" noResize="1" noEditPoints="1" noAdjustHandles="1" noChangeArrowheads="1" noChangeShapeType="1" noTextEdit="1"/>
+              </p:cNvSpPr>
+              <p:nvPr/>
+            </p:nvSpPr>
+            <p:spPr>
+              <a:xfrm>
+                <a:off x="413741" y="4771999"/>
+                <a:ext cx="7900526" cy="1815882"/>
+              </a:xfrm>
+              <a:prstGeom prst="rect">
+                <a:avLst/>
+              </a:prstGeom>
+              <a:blipFill>
+                <a:blip r:embed="rId5"/>
+                <a:stretch>
+                  <a:fillRect l="-161" t="-694" b="-3472"/>
+                </a:stretch>
+              </a:blipFill>
+            </p:spPr>
+            <p:txBody>
+              <a:bodyPr/>
+              <a:lstStyle/>
+              <a:p>
+                <a:r>
+                  <a:rPr lang="en-US">
+                    <a:noFill/>
+                  </a:rPr>
+                  <a:t> </a:t>
+                </a:r>
+              </a:p>
+            </p:txBody>
+          </p:sp>
+        </mc:Fallback>
+      </mc:AlternateContent>
+      <p:sp>
+        <p:nvSpPr>
+          <p:cNvPr id="13" name="TextBox 12">
+            <a:extLst>
+              <a:ext uri="{FF2B5EF4-FFF2-40B4-BE49-F238E27FC236}">
+                <a16:creationId xmlns:a16="http://schemas.microsoft.com/office/drawing/2014/main" id="{A9BB71AD-AABD-D7BF-6E1A-853CF14F913A}"/>
+              </a:ext>
+            </a:extLst>
+          </p:cNvPr>
+          <p:cNvSpPr txBox="1"/>
+          <p:nvPr/>
+        </p:nvSpPr>
+        <p:spPr>
+          <a:xfrm>
+            <a:off x="4733929" y="4258733"/>
+            <a:ext cx="3394071" cy="369332"/>
+          </a:xfrm>
+          <a:prstGeom prst="rect">
+            <a:avLst/>
+          </a:prstGeom>
+          <a:noFill/>
+        </p:spPr>
+        <p:txBody>
+          <a:bodyPr wrap="none" rtlCol="0">
+            <a:spAutoFit/>
+          </a:bodyPr>
+          <a:lstStyle/>
+          <a:p>
+            <a:r>
+              <a:rPr lang="en-US" dirty="0"/>
+              <a:t>20 cm straight section @ 100 MHz</a:t>
+            </a:r>
+          </a:p>
+        </p:txBody>
+      </p:sp>
+      <p:sp>
+        <p:nvSpPr>
+          <p:cNvPr id="14" name="TextBox 13">
+            <a:extLst>
+              <a:ext uri="{FF2B5EF4-FFF2-40B4-BE49-F238E27FC236}">
+                <a16:creationId xmlns:a16="http://schemas.microsoft.com/office/drawing/2014/main" id="{166F7FF0-9194-788E-1D26-113C9359D440}"/>
+              </a:ext>
+            </a:extLst>
+          </p:cNvPr>
+          <p:cNvSpPr txBox="1"/>
+          <p:nvPr/>
+        </p:nvSpPr>
+        <p:spPr>
+          <a:xfrm>
+            <a:off x="8610600" y="4258733"/>
+            <a:ext cx="3394071" cy="369332"/>
+          </a:xfrm>
+          <a:prstGeom prst="rect">
+            <a:avLst/>
+          </a:prstGeom>
+          <a:noFill/>
+        </p:spPr>
+        <p:txBody>
+          <a:bodyPr wrap="none" rtlCol="0">
+            <a:spAutoFit/>
+          </a:bodyPr>
+          <a:lstStyle/>
+          <a:p>
+            <a:r>
+              <a:rPr lang="en-US" dirty="0"/>
+              <a:t>30 cm straight section @ 100 MHz</a:t>
+            </a:r>
+          </a:p>
+        </p:txBody>
+      </p:sp>
+    </p:spTree>
+    <p:extLst>
+      <p:ext uri="{BB962C8B-B14F-4D97-AF65-F5344CB8AC3E}">
+        <p14:creationId xmlns:p14="http://schemas.microsoft.com/office/powerpoint/2010/main" val="2155446868"/>
       </p:ext>
     </p:extLst>
   </p:cSld>
@@ -5562,7 +8183,7 @@
             <p:spPr>
               <a:xfrm>
                 <a:off x="6256909" y="4827554"/>
-                <a:ext cx="4094839" cy="517770"/>
+                <a:ext cx="4098494" cy="517770"/>
               </a:xfrm>
               <a:prstGeom prst="rect">
                 <a:avLst/>
@@ -5716,7 +8337,7 @@
                       <a:srgbClr val="002060"/>
                     </a:solidFill>
                   </a:rPr>
-                  <a:t> will reach steady state!</a:t>
+                  <a:t> will reach steady state</a:t>
                 </a:r>
               </a:p>
             </p:txBody>
@@ -5740,7 +8361,7 @@
             <p:spPr>
               <a:xfrm>
                 <a:off x="6256909" y="4827554"/>
-                <a:ext cx="4094839" cy="517770"/>
+                <a:ext cx="4098494" cy="517770"/>
               </a:xfrm>
               <a:prstGeom prst="rect">
                 <a:avLst/>
@@ -5748,7 +8369,346 @@
               <a:blipFill>
                 <a:blip r:embed="rId8"/>
                 <a:stretch>
-                  <a:fillRect l="-1235" r="-309" b="-2439"/>
+                  <a:fillRect l="-1235" b="-2439"/>
+                </a:stretch>
+              </a:blipFill>
+            </p:spPr>
+            <p:txBody>
+              <a:bodyPr/>
+              <a:lstStyle/>
+              <a:p>
+                <a:r>
+                  <a:rPr lang="en-US">
+                    <a:noFill/>
+                  </a:rPr>
+                  <a:t> </a:t>
+                </a:r>
+              </a:p>
+            </p:txBody>
+          </p:sp>
+        </mc:Fallback>
+      </mc:AlternateContent>
+      <p:sp>
+        <p:nvSpPr>
+          <p:cNvPr id="4" name="TextBox 3">
+            <a:extLst>
+              <a:ext uri="{FF2B5EF4-FFF2-40B4-BE49-F238E27FC236}">
+                <a16:creationId xmlns:a16="http://schemas.microsoft.com/office/drawing/2014/main" id="{2073F913-87DE-AA5F-3424-6C3118443D48}"/>
+              </a:ext>
+            </a:extLst>
+          </p:cNvPr>
+          <p:cNvSpPr txBox="1"/>
+          <p:nvPr/>
+        </p:nvSpPr>
+        <p:spPr>
+          <a:xfrm>
+            <a:off x="9742130" y="2978490"/>
+            <a:ext cx="1238544" cy="369332"/>
+          </a:xfrm>
+          <a:prstGeom prst="rect">
+            <a:avLst/>
+          </a:prstGeom>
+          <a:noFill/>
+        </p:spPr>
+        <p:txBody>
+          <a:bodyPr wrap="none" rtlCol="0">
+            <a:spAutoFit/>
+          </a:bodyPr>
+          <a:lstStyle/>
+          <a:p>
+            <a:r>
+              <a:rPr lang="en-US" dirty="0">
+                <a:solidFill>
+                  <a:srgbClr val="00B0F0"/>
+                </a:solidFill>
+              </a:rPr>
+              <a:t>Pump term</a:t>
+            </a:r>
+          </a:p>
+        </p:txBody>
+      </p:sp>
+      <p:sp>
+        <p:nvSpPr>
+          <p:cNvPr id="7" name="TextBox 6">
+            <a:extLst>
+              <a:ext uri="{FF2B5EF4-FFF2-40B4-BE49-F238E27FC236}">
+                <a16:creationId xmlns:a16="http://schemas.microsoft.com/office/drawing/2014/main" id="{E8CB9043-0692-42D6-8CF9-7A4BE5F3068D}"/>
+              </a:ext>
+            </a:extLst>
+          </p:cNvPr>
+          <p:cNvSpPr txBox="1"/>
+          <p:nvPr/>
+        </p:nvSpPr>
+        <p:spPr>
+          <a:xfrm>
+            <a:off x="9742130" y="3655502"/>
+            <a:ext cx="1244956" cy="369332"/>
+          </a:xfrm>
+          <a:prstGeom prst="rect">
+            <a:avLst/>
+          </a:prstGeom>
+          <a:noFill/>
+        </p:spPr>
+        <p:txBody>
+          <a:bodyPr wrap="none" rtlCol="0">
+            <a:spAutoFit/>
+          </a:bodyPr>
+          <a:lstStyle/>
+          <a:p>
+            <a:r>
+              <a:rPr lang="en-US" dirty="0">
+                <a:solidFill>
+                  <a:srgbClr val="00B0F0"/>
+                </a:solidFill>
+              </a:rPr>
+              <a:t>Signal term</a:t>
+            </a:r>
+          </a:p>
+        </p:txBody>
+      </p:sp>
+      <p:sp>
+        <p:nvSpPr>
+          <p:cNvPr id="9" name="TextBox 8">
+            <a:extLst>
+              <a:ext uri="{FF2B5EF4-FFF2-40B4-BE49-F238E27FC236}">
+                <a16:creationId xmlns:a16="http://schemas.microsoft.com/office/drawing/2014/main" id="{107915F7-63F9-C3D8-31AE-7B92CE3EACA6}"/>
+              </a:ext>
+            </a:extLst>
+          </p:cNvPr>
+          <p:cNvSpPr txBox="1"/>
+          <p:nvPr/>
+        </p:nvSpPr>
+        <p:spPr>
+          <a:xfrm>
+            <a:off x="9742130" y="4268010"/>
+            <a:ext cx="2290884" cy="369332"/>
+          </a:xfrm>
+          <a:prstGeom prst="rect">
+            <a:avLst/>
+          </a:prstGeom>
+          <a:noFill/>
+        </p:spPr>
+        <p:txBody>
+          <a:bodyPr wrap="none" rtlCol="0">
+            <a:spAutoFit/>
+          </a:bodyPr>
+          <a:lstStyle/>
+          <a:p>
+            <a:r>
+              <a:rPr lang="en-US" dirty="0">
+                <a:solidFill>
+                  <a:srgbClr val="00B0F0"/>
+                </a:solidFill>
+              </a:rPr>
+              <a:t>Spontaneous emission</a:t>
+            </a:r>
+          </a:p>
+        </p:txBody>
+      </p:sp>
+      <mc:AlternateContent xmlns:mc="http://schemas.openxmlformats.org/markup-compatibility/2006">
+        <mc:Choice xmlns:a14="http://schemas.microsoft.com/office/drawing/2010/main" Requires="a14">
+          <p:sp>
+            <p:nvSpPr>
+              <p:cNvPr id="18" name="TextBox 17">
+                <a:extLst>
+                  <a:ext uri="{FF2B5EF4-FFF2-40B4-BE49-F238E27FC236}">
+                    <a16:creationId xmlns:a16="http://schemas.microsoft.com/office/drawing/2014/main" id="{7AEDB4C6-2522-300B-A22A-7F49F69428F9}"/>
+                  </a:ext>
+                </a:extLst>
+              </p:cNvPr>
+              <p:cNvSpPr txBox="1"/>
+              <p:nvPr/>
+            </p:nvSpPr>
+            <p:spPr>
+              <a:xfrm>
+                <a:off x="6685534" y="5410893"/>
+                <a:ext cx="3296666" cy="369332"/>
+              </a:xfrm>
+              <a:prstGeom prst="rect">
+                <a:avLst/>
+              </a:prstGeom>
+              <a:noFill/>
+            </p:spPr>
+            <p:txBody>
+              <a:bodyPr wrap="square">
+                <a:spAutoFit/>
+              </a:bodyPr>
+              <a:lstStyle/>
+              <a:p>
+                <a:pPr marL="285750" indent="-285750">
+                  <a:buFont typeface="Arial" panose="020B0604020202020204" pitchFamily="34" charset="0"/>
+                  <a:buChar char="•"/>
+                </a:pPr>
+                <a:r>
+                  <a:rPr lang="en-US" dirty="0">
+                    <a:solidFill>
+                      <a:srgbClr val="002060"/>
+                    </a:solidFill>
+                  </a:rPr>
+                  <a:t>Set </a:t>
+                </a:r>
+                <a14:m>
+                  <m:oMath xmlns:m="http://schemas.openxmlformats.org/officeDocument/2006/math">
+                    <m:sSub>
+                      <m:sSubPr>
+                        <m:ctrlPr>
+                          <a:rPr lang="en-US" b="0" i="1" dirty="0" smtClean="0">
+                            <a:solidFill>
+                              <a:srgbClr val="002060"/>
+                            </a:solidFill>
+                            <a:latin typeface="Cambria Math" panose="02040503050406030204" pitchFamily="18" charset="0"/>
+                          </a:rPr>
+                        </m:ctrlPr>
+                      </m:sSubPr>
+                      <m:e>
+                        <m:acc>
+                          <m:accPr>
+                            <m:chr m:val="̇"/>
+                            <m:ctrlPr>
+                              <a:rPr lang="en-US" b="0" i="1" smtClean="0">
+                                <a:solidFill>
+                                  <a:srgbClr val="002060"/>
+                                </a:solidFill>
+                                <a:latin typeface="Cambria Math" panose="02040503050406030204" pitchFamily="18" charset="0"/>
+                              </a:rPr>
+                            </m:ctrlPr>
+                          </m:accPr>
+                          <m:e>
+                            <m:r>
+                              <a:rPr lang="en-US" b="0" i="1" smtClean="0">
+                                <a:solidFill>
+                                  <a:srgbClr val="002060"/>
+                                </a:solidFill>
+                                <a:latin typeface="Cambria Math" panose="02040503050406030204" pitchFamily="18" charset="0"/>
+                              </a:rPr>
+                              <m:t>𝑛</m:t>
+                            </m:r>
+                          </m:e>
+                        </m:acc>
+                      </m:e>
+                      <m:sub>
+                        <m:r>
+                          <a:rPr lang="en-US" b="0" i="1" dirty="0" smtClean="0">
+                            <a:solidFill>
+                              <a:srgbClr val="002060"/>
+                            </a:solidFill>
+                            <a:latin typeface="Cambria Math" panose="02040503050406030204" pitchFamily="18" charset="0"/>
+                          </a:rPr>
+                          <m:t>2</m:t>
+                        </m:r>
+                      </m:sub>
+                    </m:sSub>
+                    <m:r>
+                      <a:rPr lang="en-US" b="0" i="1" dirty="0" smtClean="0">
+                        <a:solidFill>
+                          <a:srgbClr val="002060"/>
+                        </a:solidFill>
+                        <a:latin typeface="Cambria Math" panose="02040503050406030204" pitchFamily="18" charset="0"/>
+                      </a:rPr>
+                      <m:t>=0</m:t>
+                    </m:r>
+                  </m:oMath>
+                </a14:m>
+                <a:r>
+                  <a:rPr lang="en-US" dirty="0">
+                    <a:solidFill>
+                      <a:srgbClr val="002060"/>
+                    </a:solidFill>
+                  </a:rPr>
+                  <a:t> and solve for </a:t>
+                </a:r>
+                <a14:m>
+                  <m:oMath xmlns:m="http://schemas.openxmlformats.org/officeDocument/2006/math">
+                    <m:sSub>
+                      <m:sSubPr>
+                        <m:ctrlPr>
+                          <a:rPr lang="en-US" b="0" i="1" smtClean="0">
+                            <a:solidFill>
+                              <a:srgbClr val="002060"/>
+                            </a:solidFill>
+                            <a:latin typeface="Cambria Math" panose="02040503050406030204" pitchFamily="18" charset="0"/>
+                          </a:rPr>
+                        </m:ctrlPr>
+                      </m:sSubPr>
+                      <m:e>
+                        <m:r>
+                          <a:rPr lang="en-US" b="0" i="1" smtClean="0">
+                            <a:solidFill>
+                              <a:srgbClr val="002060"/>
+                            </a:solidFill>
+                            <a:latin typeface="Cambria Math" panose="02040503050406030204" pitchFamily="18" charset="0"/>
+                          </a:rPr>
+                          <m:t>𝑛</m:t>
+                        </m:r>
+                      </m:e>
+                      <m:sub>
+                        <m:r>
+                          <a:rPr lang="en-US" b="0" i="1" smtClean="0">
+                            <a:solidFill>
+                              <a:srgbClr val="002060"/>
+                            </a:solidFill>
+                            <a:latin typeface="Cambria Math" panose="02040503050406030204" pitchFamily="18" charset="0"/>
+                          </a:rPr>
+                          <m:t>2</m:t>
+                        </m:r>
+                      </m:sub>
+                    </m:sSub>
+                    <m:r>
+                      <a:rPr lang="en-US" b="0" i="1" smtClean="0">
+                        <a:solidFill>
+                          <a:srgbClr val="002060"/>
+                        </a:solidFill>
+                        <a:latin typeface="Cambria Math" panose="02040503050406030204" pitchFamily="18" charset="0"/>
+                      </a:rPr>
+                      <m:t>/</m:t>
+                    </m:r>
+                    <m:r>
+                      <a:rPr lang="en-US" b="0" i="1" smtClean="0">
+                        <a:solidFill>
+                          <a:srgbClr val="002060"/>
+                        </a:solidFill>
+                        <a:latin typeface="Cambria Math" panose="02040503050406030204" pitchFamily="18" charset="0"/>
+                      </a:rPr>
+                      <m:t>𝑛</m:t>
+                    </m:r>
+                  </m:oMath>
+                </a14:m>
+                <a:endParaRPr lang="en-US" dirty="0">
+                  <a:solidFill>
+                    <a:srgbClr val="002060"/>
+                  </a:solidFill>
+                </a:endParaRPr>
+              </a:p>
+            </p:txBody>
+          </p:sp>
+        </mc:Choice>
+        <mc:Fallback>
+          <p:sp>
+            <p:nvSpPr>
+              <p:cNvPr id="18" name="TextBox 17">
+                <a:extLst>
+                  <a:ext uri="{FF2B5EF4-FFF2-40B4-BE49-F238E27FC236}">
+                    <a16:creationId xmlns:a16="http://schemas.microsoft.com/office/drawing/2014/main" id="{7AEDB4C6-2522-300B-A22A-7F49F69428F9}"/>
+                  </a:ext>
+                </a:extLst>
+              </p:cNvPr>
+              <p:cNvSpPr txBox="1">
+                <a:spLocks noRot="1" noChangeAspect="1" noMove="1" noResize="1" noEditPoints="1" noAdjustHandles="1" noChangeArrowheads="1" noChangeShapeType="1" noTextEdit="1"/>
+              </p:cNvSpPr>
+              <p:nvPr/>
+            </p:nvSpPr>
+            <p:spPr>
+              <a:xfrm>
+                <a:off x="6685534" y="5410893"/>
+                <a:ext cx="3296666" cy="369332"/>
+              </a:xfrm>
+              <a:prstGeom prst="rect">
+                <a:avLst/>
+              </a:prstGeom>
+              <a:blipFill>
+                <a:blip r:embed="rId9"/>
+                <a:stretch>
+                  <a:fillRect l="-1149" t="-10000" b="-23333"/>
                 </a:stretch>
               </a:blipFill>
             </p:spPr>
@@ -8853,7 +11813,7 @@
           <a:p>
             <a:r>
               <a:rPr lang="en-US" dirty="0"/>
-              <a:t>So, the next step to try is to  account for excited state absorption, since green fluorescence is always observed. </a:t>
+              <a:t>So, the next step to try is to  account for excited state absorption, since after all green fluorescence is always observed. </a:t>
             </a:r>
           </a:p>
         </p:txBody>
@@ -9378,6 +12338,45 @@
           </a:p>
         </p:txBody>
       </p:sp>
+      <p:sp>
+        <p:nvSpPr>
+          <p:cNvPr id="2" name="TextBox 1">
+            <a:extLst>
+              <a:ext uri="{FF2B5EF4-FFF2-40B4-BE49-F238E27FC236}">
+                <a16:creationId xmlns:a16="http://schemas.microsoft.com/office/drawing/2014/main" id="{EB21746F-3EC9-0600-CA35-2F91B787CA85}"/>
+              </a:ext>
+            </a:extLst>
+          </p:cNvPr>
+          <p:cNvSpPr txBox="1"/>
+          <p:nvPr/>
+        </p:nvSpPr>
+        <p:spPr>
+          <a:xfrm>
+            <a:off x="5235839" y="5779185"/>
+            <a:ext cx="5290872" cy="646331"/>
+          </a:xfrm>
+          <a:prstGeom prst="rect">
+            <a:avLst/>
+          </a:prstGeom>
+          <a:noFill/>
+        </p:spPr>
+        <p:txBody>
+          <a:bodyPr wrap="square" rtlCol="0">
+            <a:spAutoFit/>
+          </a:bodyPr>
+          <a:lstStyle/>
+          <a:p>
+            <a:pPr marL="285750" indent="-285750">
+              <a:buFont typeface="Arial" panose="020B0604020202020204" pitchFamily="34" charset="0"/>
+              <a:buChar char="•"/>
+            </a:pPr>
+            <a:r>
+              <a:rPr lang="en-US" dirty="0"/>
+              <a:t>Computed in Mathematica and then copied to Python using Sympy</a:t>
+            </a:r>
+          </a:p>
+        </p:txBody>
+      </p:sp>
     </p:spTree>
     <p:extLst>
       <p:ext uri="{BB962C8B-B14F-4D97-AF65-F5344CB8AC3E}">
@@ -9452,7 +12451,7 @@
         <p:spPr>
           <a:xfrm>
             <a:off x="8411289" y="1540807"/>
-            <a:ext cx="3141822" cy="369332"/>
+            <a:ext cx="3543644" cy="923330"/>
           </a:xfrm>
           <a:prstGeom prst="rect">
             <a:avLst/>
@@ -9460,7 +12459,7 @@
           <a:noFill/>
         </p:spPr>
         <p:txBody>
-          <a:bodyPr wrap="none" rtlCol="0">
+          <a:bodyPr wrap="square" rtlCol="0">
             <a:spAutoFit/>
           </a:bodyPr>
           <a:lstStyle/>
@@ -9471,7 +12470,7 @@
                   <a:srgbClr val="FF0000"/>
                 </a:solidFill>
               </a:rPr>
-              <a:t>More realistic power evolution!</a:t>
+              <a:t>Not perfect, but much more realistic power evolution, maybe actually a little too lossy.</a:t>
             </a:r>
           </a:p>
         </p:txBody>
@@ -9550,7 +12549,7 @@
         </p:nvSpPr>
         <p:spPr>
           <a:xfrm>
-            <a:off x="8610600" y="2336801"/>
+            <a:off x="8610600" y="2516696"/>
             <a:ext cx="2743200" cy="646331"/>
           </a:xfrm>
           <a:prstGeom prst="rect">
@@ -9567,6 +12566,53 @@
             <a:r>
               <a:rPr lang="en-US" dirty="0"/>
               <a:t>Used: 0.7 dB insertion loss, 0.2 dB splicing loss</a:t>
+            </a:r>
+          </a:p>
+        </p:txBody>
+      </p:sp>
+      <p:sp>
+        <p:nvSpPr>
+          <p:cNvPr id="10" name="TextBox 9">
+            <a:extLst>
+              <a:ext uri="{FF2B5EF4-FFF2-40B4-BE49-F238E27FC236}">
+                <a16:creationId xmlns:a16="http://schemas.microsoft.com/office/drawing/2014/main" id="{5CD31E83-005A-27FA-8A60-A53314C77CA8}"/>
+              </a:ext>
+            </a:extLst>
+          </p:cNvPr>
+          <p:cNvSpPr txBox="1"/>
+          <p:nvPr/>
+        </p:nvSpPr>
+        <p:spPr>
+          <a:xfrm>
+            <a:off x="8576733" y="3307603"/>
+            <a:ext cx="3141133" cy="1384995"/>
+          </a:xfrm>
+          <a:prstGeom prst="rect">
+            <a:avLst/>
+          </a:prstGeom>
+          <a:noFill/>
+        </p:spPr>
+        <p:txBody>
+          <a:bodyPr wrap="square" rtlCol="0">
+            <a:spAutoFit/>
+          </a:bodyPr>
+          <a:lstStyle/>
+          <a:p>
+            <a:pPr marL="285750" indent="-285750">
+              <a:buFont typeface="Arial" panose="020B0604020202020204" pitchFamily="34" charset="0"/>
+              <a:buChar char="•"/>
+            </a:pPr>
+            <a:r>
+              <a:rPr lang="en-US" sz="1400" dirty="0"/>
+              <a:t>Better match to experiment can be achieved by varying 5-level parameters, although the ones obtained from </a:t>
+            </a:r>
+            <a:r>
+              <a:rPr lang="en-US" sz="1400" dirty="0" err="1"/>
+              <a:t>Barmenkov</a:t>
+            </a:r>
+            <a:r>
+              <a:rPr lang="en-US" sz="1400" dirty="0"/>
+              <a:t> et al. are not too bad. Their numbers are similar to other older papers.</a:t>
             </a:r>
           </a:p>
         </p:txBody>
@@ -9718,7 +12764,7 @@
           <a:p>
             <a:r>
               <a:rPr lang="en-US" dirty="0"/>
-              <a:t>Backward pumping also matches experiment okay. </a:t>
+              <a:t>Backward pumping also matches experiment better. </a:t>
             </a:r>
           </a:p>
         </p:txBody>
@@ -9829,10 +12875,10 @@
       </p:grpSpPr>
       <p:sp>
         <p:nvSpPr>
-          <p:cNvPr id="2" name="Title 1">
-            <a:extLst>
-              <a:ext uri="{FF2B5EF4-FFF2-40B4-BE49-F238E27FC236}">
-                <a16:creationId xmlns:a16="http://schemas.microsoft.com/office/drawing/2014/main" id="{39E30EFF-0874-0215-F994-C9C7512D2A5B}"/>
+          <p:cNvPr id="6" name="Title 5">
+            <a:extLst>
+              <a:ext uri="{FF2B5EF4-FFF2-40B4-BE49-F238E27FC236}">
+                <a16:creationId xmlns:a16="http://schemas.microsoft.com/office/drawing/2014/main" id="{DF977188-04BD-95A5-F6F0-6F9A3085DE5C}"/>
               </a:ext>
             </a:extLst>
           </p:cNvPr>
@@ -9857,10 +12903,35 @@
       </p:sp>
       <p:sp>
         <p:nvSpPr>
+          <p:cNvPr id="7" name="Text Placeholder 6">
+            <a:extLst>
+              <a:ext uri="{FF2B5EF4-FFF2-40B4-BE49-F238E27FC236}">
+                <a16:creationId xmlns:a16="http://schemas.microsoft.com/office/drawing/2014/main" id="{B0CFC0D4-E8E9-3B5E-1FA7-1659814BA79E}"/>
+              </a:ext>
+            </a:extLst>
+          </p:cNvPr>
+          <p:cNvSpPr>
+            <a:spLocks noGrp="1"/>
+          </p:cNvSpPr>
+          <p:nvPr>
+            <p:ph type="body" idx="1"/>
+          </p:nvPr>
+        </p:nvSpPr>
+        <p:spPr/>
+        <p:txBody>
+          <a:bodyPr/>
+          <a:lstStyle/>
+          <a:p>
+            <a:endParaRPr lang="en-US"/>
+          </a:p>
+        </p:txBody>
+      </p:sp>
+      <p:sp>
+        <p:nvSpPr>
           <p:cNvPr id="3" name="Slide Number Placeholder 2">
             <a:extLst>
               <a:ext uri="{FF2B5EF4-FFF2-40B4-BE49-F238E27FC236}">
-                <a16:creationId xmlns:a16="http://schemas.microsoft.com/office/drawing/2014/main" id="{3EEC6729-D725-6619-81B8-12E40889E39D}"/>
+                <a16:creationId xmlns:a16="http://schemas.microsoft.com/office/drawing/2014/main" id="{0F057EAC-10F3-68BB-67F7-17B1CA59B0E4}"/>
               </a:ext>
             </a:extLst>
           </p:cNvPr>
@@ -9887,7 +12958,7 @@
     </p:spTree>
     <p:extLst>
       <p:ext uri="{BB962C8B-B14F-4D97-AF65-F5344CB8AC3E}">
-        <p14:creationId xmlns:p14="http://schemas.microsoft.com/office/powerpoint/2010/main" val="2476284306"/>
+        <p14:creationId xmlns:p14="http://schemas.microsoft.com/office/powerpoint/2010/main" val="1612518591"/>
       </p:ext>
     </p:extLst>
   </p:cSld>

</xml_diff>

<commit_message>
ran a lot of simulations
</commit_message>
<xml_diff>
--- a/memo.pptx
+++ b/memo.pptx
@@ -5,7 +5,7 @@
     <p:sldMasterId id="2147483648" r:id="rId1"/>
   </p:sldMasterIdLst>
   <p:notesMasterIdLst>
-    <p:notesMasterId r:id="rId15"/>
+    <p:notesMasterId r:id="rId16"/>
   </p:notesMasterIdLst>
   <p:sldIdLst>
     <p:sldId id="278" r:id="rId2"/>
@@ -18,9 +18,10 @@
     <p:sldId id="276" r:id="rId9"/>
     <p:sldId id="281" r:id="rId10"/>
     <p:sldId id="282" r:id="rId11"/>
-    <p:sldId id="277" r:id="rId12"/>
-    <p:sldId id="279" r:id="rId13"/>
-    <p:sldId id="280" r:id="rId14"/>
+    <p:sldId id="283" r:id="rId12"/>
+    <p:sldId id="277" r:id="rId13"/>
+    <p:sldId id="279" r:id="rId14"/>
+    <p:sldId id="280" r:id="rId15"/>
   </p:sldIdLst>
   <p:sldSz cx="12192000" cy="6858000"/>
   <p:notesSz cx="6858000" cy="9144000"/>
@@ -4219,7 +4220,7 @@
           <a:bodyPr/>
           <a:lstStyle/>
           <a:p>
-            <a:endParaRPr lang="en-US"/>
+            <a:endParaRPr lang="en-US" dirty="0"/>
           </a:p>
         </p:txBody>
       </p:sp>
@@ -5173,7 +5174,7 @@
           <p:cNvPr id="2" name="Title 1">
             <a:extLst>
               <a:ext uri="{FF2B5EF4-FFF2-40B4-BE49-F238E27FC236}">
-                <a16:creationId xmlns:a16="http://schemas.microsoft.com/office/drawing/2014/main" id="{39E30EFF-0874-0215-F994-C9C7512D2A5B}"/>
+                <a16:creationId xmlns:a16="http://schemas.microsoft.com/office/drawing/2014/main" id="{1201BFAD-BD48-A43D-73C7-9E8DB67DDF48}"/>
               </a:ext>
             </a:extLst>
           </p:cNvPr>
@@ -5191,7 +5192,7 @@
           <a:p>
             <a:r>
               <a:rPr lang="en-US" dirty="0"/>
-              <a:t>200 MHz</a:t>
+              <a:t>Looking for stability</a:t>
             </a:r>
           </a:p>
         </p:txBody>
@@ -5201,7 +5202,7 @@
           <p:cNvPr id="3" name="Slide Number Placeholder 2">
             <a:extLst>
               <a:ext uri="{FF2B5EF4-FFF2-40B4-BE49-F238E27FC236}">
-                <a16:creationId xmlns:a16="http://schemas.microsoft.com/office/drawing/2014/main" id="{3EEC6729-D725-6619-81B8-12E40889E39D}"/>
+                <a16:creationId xmlns:a16="http://schemas.microsoft.com/office/drawing/2014/main" id="{EDB5526C-1E30-EB6C-24AB-AD714B840ABE}"/>
               </a:ext>
             </a:extLst>
           </p:cNvPr>
@@ -5220,6 +5221,539 @@
             <a:fld id="{B9982081-D51A-40C8-8A41-6498517A0DD4}" type="slidenum">
               <a:rPr lang="en-US" smtClean="0"/>
               <a:t>11</a:t>
+            </a:fld>
+            <a:endParaRPr lang="en-US" dirty="0"/>
+          </a:p>
+        </p:txBody>
+      </p:sp>
+      <p:pic>
+        <p:nvPicPr>
+          <p:cNvPr id="4" name="ezgif.com-gif-to-mp4">
+            <a:hlinkClick r:id="" action="ppaction://media"/>
+            <a:extLst>
+              <a:ext uri="{FF2B5EF4-FFF2-40B4-BE49-F238E27FC236}">
+                <a16:creationId xmlns:a16="http://schemas.microsoft.com/office/drawing/2014/main" id="{1C5E577D-8230-07C7-C200-647FFC831234}"/>
+              </a:ext>
+            </a:extLst>
+          </p:cNvPr>
+          <p:cNvPicPr>
+            <a:picLocks noChangeAspect="1"/>
+          </p:cNvPicPr>
+          <p:nvPr>
+            <a:videoFile r:link="rId2"/>
+            <p:extLst>
+              <p:ext uri="{DAA4B4D4-6D71-4841-9C94-3DE7FCFB9230}">
+                <p14:media xmlns:p14="http://schemas.microsoft.com/office/powerpoint/2010/main" r:embed="rId1"/>
+              </p:ext>
+            </p:extLst>
+          </p:nvPr>
+        </p:nvPicPr>
+        <p:blipFill>
+          <a:blip r:embed="rId4"/>
+          <a:stretch>
+            <a:fillRect/>
+          </a:stretch>
+        </p:blipFill>
+        <p:spPr>
+          <a:xfrm>
+            <a:off x="190463" y="1703498"/>
+            <a:ext cx="6511551" cy="4883663"/>
+          </a:xfrm>
+          <a:prstGeom prst="rect">
+            <a:avLst/>
+          </a:prstGeom>
+        </p:spPr>
+      </p:pic>
+      <p:sp>
+        <p:nvSpPr>
+          <p:cNvPr id="6" name="TextBox 5">
+            <a:extLst>
+              <a:ext uri="{FF2B5EF4-FFF2-40B4-BE49-F238E27FC236}">
+                <a16:creationId xmlns:a16="http://schemas.microsoft.com/office/drawing/2014/main" id="{105139A3-90F2-D956-44B5-2B2ECA0563D4}"/>
+              </a:ext>
+            </a:extLst>
+          </p:cNvPr>
+          <p:cNvSpPr txBox="1"/>
+          <p:nvPr/>
+        </p:nvSpPr>
+        <p:spPr>
+          <a:xfrm>
+            <a:off x="7164593" y="1355464"/>
+            <a:ext cx="3948056" cy="2862322"/>
+          </a:xfrm>
+          <a:prstGeom prst="rect">
+            <a:avLst/>
+          </a:prstGeom>
+          <a:noFill/>
+        </p:spPr>
+        <p:txBody>
+          <a:bodyPr wrap="square" rtlCol="0">
+            <a:spAutoFit/>
+          </a:bodyPr>
+          <a:lstStyle/>
+          <a:p>
+            <a:r>
+              <a:rPr lang="en-US" dirty="0"/>
+              <a:t>Run simulation until output spectrum doesn’t differ from the previous by more than some threshold</a:t>
+            </a:r>
+          </a:p>
+          <a:p>
+            <a:endParaRPr lang="en-US" dirty="0"/>
+          </a:p>
+          <a:p>
+            <a:r>
+              <a:rPr lang="en-US" dirty="0"/>
+              <a:t>Seed with a 1 </a:t>
+            </a:r>
+            <a:r>
+              <a:rPr lang="en-US" dirty="0" err="1"/>
+              <a:t>mW</a:t>
+            </a:r>
+            <a:r>
+              <a:rPr lang="en-US" dirty="0"/>
+              <a:t> 2ps pulse. (So, kind of skip to the middle where you already have quasi-CW?)</a:t>
+            </a:r>
+          </a:p>
+          <a:p>
+            <a:endParaRPr lang="en-US" dirty="0"/>
+          </a:p>
+          <a:p>
+            <a:r>
+              <a:rPr lang="en-US" dirty="0"/>
+              <a:t>If loop counts exceed 500, then cavity is deemed unstable. </a:t>
+            </a:r>
+          </a:p>
+        </p:txBody>
+      </p:sp>
+      <p:sp>
+        <p:nvSpPr>
+          <p:cNvPr id="7" name="TextBox 6">
+            <a:extLst>
+              <a:ext uri="{FF2B5EF4-FFF2-40B4-BE49-F238E27FC236}">
+                <a16:creationId xmlns:a16="http://schemas.microsoft.com/office/drawing/2014/main" id="{855D8917-E82B-26A2-8AFC-D4F9EE67AC87}"/>
+              </a:ext>
+            </a:extLst>
+          </p:cNvPr>
+          <p:cNvSpPr txBox="1"/>
+          <p:nvPr/>
+        </p:nvSpPr>
+        <p:spPr>
+          <a:xfrm>
+            <a:off x="1183342" y="1057167"/>
+            <a:ext cx="5325035" cy="646331"/>
+          </a:xfrm>
+          <a:prstGeom prst="rect">
+            <a:avLst/>
+          </a:prstGeom>
+          <a:noFill/>
+        </p:spPr>
+        <p:txBody>
+          <a:bodyPr wrap="square" rtlCol="0">
+            <a:spAutoFit/>
+          </a:bodyPr>
+          <a:lstStyle/>
+          <a:p>
+            <a:r>
+              <a:rPr lang="en-US" b="1" dirty="0"/>
+              <a:t>Output spectrum for 200 MHz, 11 cm straight section, 4 </a:t>
+            </a:r>
+            <a:r>
+              <a:rPr lang="en-US" b="1" dirty="0" err="1"/>
+              <a:t>ps</a:t>
+            </a:r>
+            <a:r>
+              <a:rPr lang="en-US" b="1" dirty="0"/>
+              <a:t>/nm/km round trip dispersion</a:t>
+            </a:r>
+          </a:p>
+        </p:txBody>
+      </p:sp>
+      <p:pic>
+        <p:nvPicPr>
+          <p:cNvPr id="13" name="Picture 12">
+            <a:extLst>
+              <a:ext uri="{FF2B5EF4-FFF2-40B4-BE49-F238E27FC236}">
+                <a16:creationId xmlns:a16="http://schemas.microsoft.com/office/drawing/2014/main" id="{269146B5-DA17-4E2E-AE7B-E67AABC2D9DB}"/>
+              </a:ext>
+            </a:extLst>
+          </p:cNvPr>
+          <p:cNvPicPr>
+            <a:picLocks noChangeAspect="1"/>
+          </p:cNvPicPr>
+          <p:nvPr/>
+        </p:nvPicPr>
+        <p:blipFill>
+          <a:blip r:embed="rId5"/>
+          <a:stretch>
+            <a:fillRect/>
+          </a:stretch>
+        </p:blipFill>
+        <p:spPr>
+          <a:xfrm>
+            <a:off x="6721433" y="4230867"/>
+            <a:ext cx="2514006" cy="1845216"/>
+          </a:xfrm>
+          <a:prstGeom prst="rect">
+            <a:avLst/>
+          </a:prstGeom>
+        </p:spPr>
+      </p:pic>
+      <p:pic>
+        <p:nvPicPr>
+          <p:cNvPr id="14" name="Picture 13">
+            <a:extLst>
+              <a:ext uri="{FF2B5EF4-FFF2-40B4-BE49-F238E27FC236}">
+                <a16:creationId xmlns:a16="http://schemas.microsoft.com/office/drawing/2014/main" id="{F0CD071E-678C-C3A7-BD3E-1596A3FB3CEF}"/>
+              </a:ext>
+            </a:extLst>
+          </p:cNvPr>
+          <p:cNvPicPr>
+            <a:picLocks noChangeAspect="1"/>
+          </p:cNvPicPr>
+          <p:nvPr/>
+        </p:nvPicPr>
+        <p:blipFill>
+          <a:blip r:embed="rId6"/>
+          <a:stretch>
+            <a:fillRect/>
+          </a:stretch>
+        </p:blipFill>
+        <p:spPr>
+          <a:xfrm>
+            <a:off x="9254859" y="4217786"/>
+            <a:ext cx="2514006" cy="1858297"/>
+          </a:xfrm>
+          <a:prstGeom prst="rect">
+            <a:avLst/>
+          </a:prstGeom>
+        </p:spPr>
+      </p:pic>
+      <p:sp>
+        <p:nvSpPr>
+          <p:cNvPr id="15" name="TextBox 14">
+            <a:extLst>
+              <a:ext uri="{FF2B5EF4-FFF2-40B4-BE49-F238E27FC236}">
+                <a16:creationId xmlns:a16="http://schemas.microsoft.com/office/drawing/2014/main" id="{B9CA9286-60F8-A18A-F23C-4CF1AE56523D}"/>
+              </a:ext>
+            </a:extLst>
+          </p:cNvPr>
+          <p:cNvSpPr txBox="1"/>
+          <p:nvPr/>
+        </p:nvSpPr>
+        <p:spPr>
+          <a:xfrm>
+            <a:off x="8304558" y="4592936"/>
+            <a:ext cx="1047217" cy="338554"/>
+          </a:xfrm>
+          <a:prstGeom prst="rect">
+            <a:avLst/>
+          </a:prstGeom>
+          <a:noFill/>
+        </p:spPr>
+        <p:txBody>
+          <a:bodyPr wrap="square" rtlCol="0">
+            <a:spAutoFit/>
+          </a:bodyPr>
+          <a:lstStyle/>
+          <a:p>
+            <a:r>
+              <a:rPr lang="en-US" sz="1600" dirty="0"/>
+              <a:t>unstable</a:t>
+            </a:r>
+          </a:p>
+        </p:txBody>
+      </p:sp>
+      <p:sp>
+        <p:nvSpPr>
+          <p:cNvPr id="17" name="TextBox 16">
+            <a:extLst>
+              <a:ext uri="{FF2B5EF4-FFF2-40B4-BE49-F238E27FC236}">
+                <a16:creationId xmlns:a16="http://schemas.microsoft.com/office/drawing/2014/main" id="{13C8176B-60E9-3933-7B0C-39C2C0454006}"/>
+              </a:ext>
+            </a:extLst>
+          </p:cNvPr>
+          <p:cNvSpPr txBox="1"/>
+          <p:nvPr/>
+        </p:nvSpPr>
+        <p:spPr>
+          <a:xfrm>
+            <a:off x="7065156" y="6125496"/>
+            <a:ext cx="4047493" cy="461665"/>
+          </a:xfrm>
+          <a:prstGeom prst="rect">
+            <a:avLst/>
+          </a:prstGeom>
+          <a:noFill/>
+        </p:spPr>
+        <p:txBody>
+          <a:bodyPr wrap="square" rtlCol="0">
+            <a:spAutoFit/>
+          </a:bodyPr>
+          <a:lstStyle/>
+          <a:p>
+            <a:r>
+              <a:rPr lang="en-US" sz="1200" dirty="0">
+                <a:solidFill>
+                  <a:srgbClr val="00B050"/>
+                </a:solidFill>
+              </a:rPr>
+              <a:t>Flip side is: the more anomalous the cavity, the higher pump the required pump current</a:t>
+            </a:r>
+          </a:p>
+        </p:txBody>
+      </p:sp>
+      <p:sp>
+        <p:nvSpPr>
+          <p:cNvPr id="18" name="TextBox 17">
+            <a:extLst>
+              <a:ext uri="{FF2B5EF4-FFF2-40B4-BE49-F238E27FC236}">
+                <a16:creationId xmlns:a16="http://schemas.microsoft.com/office/drawing/2014/main" id="{7A8AA4D6-C257-6E66-12E1-0A7A41EC2D9A}"/>
+              </a:ext>
+            </a:extLst>
+          </p:cNvPr>
+          <p:cNvSpPr txBox="1"/>
+          <p:nvPr/>
+        </p:nvSpPr>
+        <p:spPr>
+          <a:xfrm>
+            <a:off x="10954320" y="4592936"/>
+            <a:ext cx="1047217" cy="338554"/>
+          </a:xfrm>
+          <a:prstGeom prst="rect">
+            <a:avLst/>
+          </a:prstGeom>
+          <a:noFill/>
+        </p:spPr>
+        <p:txBody>
+          <a:bodyPr wrap="square" rtlCol="0">
+            <a:spAutoFit/>
+          </a:bodyPr>
+          <a:lstStyle/>
+          <a:p>
+            <a:r>
+              <a:rPr lang="en-US" sz="1600" dirty="0"/>
+              <a:t>stable</a:t>
+            </a:r>
+          </a:p>
+        </p:txBody>
+      </p:sp>
+    </p:spTree>
+    <p:extLst>
+      <p:ext uri="{BB962C8B-B14F-4D97-AF65-F5344CB8AC3E}">
+        <p14:creationId xmlns:p14="http://schemas.microsoft.com/office/powerpoint/2010/main" val="1903822799"/>
+      </p:ext>
+    </p:extLst>
+  </p:cSld>
+  <p:clrMapOvr>
+    <a:masterClrMapping/>
+  </p:clrMapOvr>
+  <p:timing>
+    <p:tnLst>
+      <p:par>
+        <p:cTn id="1" dur="indefinite" restart="never" nodeType="tmRoot">
+          <p:childTnLst>
+            <p:seq concurrent="1" nextAc="seek">
+              <p:cTn id="2" dur="indefinite" nodeType="mainSeq">
+                <p:childTnLst>
+                  <p:par>
+                    <p:cTn id="3" fill="hold">
+                      <p:stCondLst>
+                        <p:cond delay="indefinite"/>
+                      </p:stCondLst>
+                      <p:childTnLst>
+                        <p:par>
+                          <p:cTn id="4" fill="hold">
+                            <p:stCondLst>
+                              <p:cond delay="0"/>
+                            </p:stCondLst>
+                            <p:childTnLst>
+                              <p:par>
+                                <p:cTn id="5" presetID="1" presetClass="mediacall" presetSubtype="0" fill="hold" nodeType="clickEffect">
+                                  <p:stCondLst>
+                                    <p:cond delay="0"/>
+                                  </p:stCondLst>
+                                  <p:childTnLst>
+                                    <p:cmd type="call" cmd="playFrom(0.0)">
+                                      <p:cBhvr>
+                                        <p:cTn id="6" dur="36000" fill="hold"/>
+                                        <p:tgtEl>
+                                          <p:spTgt spid="4"/>
+                                        </p:tgtEl>
+                                      </p:cBhvr>
+                                    </p:cmd>
+                                  </p:childTnLst>
+                                </p:cTn>
+                              </p:par>
+                            </p:childTnLst>
+                          </p:cTn>
+                        </p:par>
+                      </p:childTnLst>
+                    </p:cTn>
+                  </p:par>
+                </p:childTnLst>
+              </p:cTn>
+              <p:prevCondLst>
+                <p:cond evt="onPrev" delay="0">
+                  <p:tgtEl>
+                    <p:sldTgt/>
+                  </p:tgtEl>
+                </p:cond>
+              </p:prevCondLst>
+              <p:nextCondLst>
+                <p:cond evt="onNext" delay="0">
+                  <p:tgtEl>
+                    <p:sldTgt/>
+                  </p:tgtEl>
+                </p:cond>
+              </p:nextCondLst>
+            </p:seq>
+            <p:video>
+              <p:cMediaNode vol="80000">
+                <p:cTn id="7" fill="hold" display="0">
+                  <p:stCondLst>
+                    <p:cond delay="indefinite"/>
+                  </p:stCondLst>
+                </p:cTn>
+                <p:tgtEl>
+                  <p:spTgt spid="4"/>
+                </p:tgtEl>
+              </p:cMediaNode>
+            </p:video>
+            <p:seq concurrent="1" nextAc="seek">
+              <p:cTn id="8" restart="whenNotActive" fill="hold" evtFilter="cancelBubble" nodeType="interactiveSeq">
+                <p:stCondLst>
+                  <p:cond evt="onClick" delay="0">
+                    <p:tgtEl>
+                      <p:spTgt spid="4"/>
+                    </p:tgtEl>
+                  </p:cond>
+                </p:stCondLst>
+                <p:endSync evt="end" delay="0">
+                  <p:rtn val="all"/>
+                </p:endSync>
+                <p:childTnLst>
+                  <p:par>
+                    <p:cTn id="9" fill="hold">
+                      <p:stCondLst>
+                        <p:cond delay="0"/>
+                      </p:stCondLst>
+                      <p:childTnLst>
+                        <p:par>
+                          <p:cTn id="10" fill="hold">
+                            <p:stCondLst>
+                              <p:cond delay="0"/>
+                            </p:stCondLst>
+                            <p:childTnLst>
+                              <p:par>
+                                <p:cTn id="11" presetID="2" presetClass="mediacall" presetSubtype="0" fill="hold" nodeType="clickEffect">
+                                  <p:stCondLst>
+                                    <p:cond delay="0"/>
+                                  </p:stCondLst>
+                                  <p:childTnLst>
+                                    <p:cmd type="call" cmd="togglePause">
+                                      <p:cBhvr>
+                                        <p:cTn id="12" dur="1" fill="hold"/>
+                                        <p:tgtEl>
+                                          <p:spTgt spid="4"/>
+                                        </p:tgtEl>
+                                      </p:cBhvr>
+                                    </p:cmd>
+                                  </p:childTnLst>
+                                </p:cTn>
+                              </p:par>
+                            </p:childTnLst>
+                          </p:cTn>
+                        </p:par>
+                      </p:childTnLst>
+                    </p:cTn>
+                  </p:par>
+                </p:childTnLst>
+              </p:cTn>
+              <p:nextCondLst>
+                <p:cond evt="onClick" delay="0">
+                  <p:tgtEl>
+                    <p:spTgt spid="4"/>
+                  </p:tgtEl>
+                </p:cond>
+              </p:nextCondLst>
+            </p:seq>
+          </p:childTnLst>
+        </p:cTn>
+      </p:par>
+    </p:tnLst>
+  </p:timing>
+</p:sld>
+</file>
+
+<file path=ppt/slides/slide12.xml><?xml version="1.0" encoding="utf-8"?>
+<p:sld xmlns:a="http://schemas.openxmlformats.org/drawingml/2006/main" xmlns:r="http://schemas.openxmlformats.org/officeDocument/2006/relationships" xmlns:p="http://schemas.openxmlformats.org/presentationml/2006/main">
+  <p:cSld>
+    <p:spTree>
+      <p:nvGrpSpPr>
+        <p:cNvPr id="1" name=""/>
+        <p:cNvGrpSpPr/>
+        <p:nvPr/>
+      </p:nvGrpSpPr>
+      <p:grpSpPr>
+        <a:xfrm>
+          <a:off x="0" y="0"/>
+          <a:ext cx="0" cy="0"/>
+          <a:chOff x="0" y="0"/>
+          <a:chExt cx="0" cy="0"/>
+        </a:xfrm>
+      </p:grpSpPr>
+      <p:sp>
+        <p:nvSpPr>
+          <p:cNvPr id="2" name="Title 1">
+            <a:extLst>
+              <a:ext uri="{FF2B5EF4-FFF2-40B4-BE49-F238E27FC236}">
+                <a16:creationId xmlns:a16="http://schemas.microsoft.com/office/drawing/2014/main" id="{39E30EFF-0874-0215-F994-C9C7512D2A5B}"/>
+              </a:ext>
+            </a:extLst>
+          </p:cNvPr>
+          <p:cNvSpPr>
+            <a:spLocks noGrp="1"/>
+          </p:cNvSpPr>
+          <p:nvPr>
+            <p:ph type="title"/>
+          </p:nvPr>
+        </p:nvSpPr>
+        <p:spPr/>
+        <p:txBody>
+          <a:bodyPr/>
+          <a:lstStyle/>
+          <a:p>
+            <a:r>
+              <a:rPr lang="en-US" dirty="0"/>
+              <a:t>200 MHz</a:t>
+            </a:r>
+          </a:p>
+        </p:txBody>
+      </p:sp>
+      <p:sp>
+        <p:nvSpPr>
+          <p:cNvPr id="3" name="Slide Number Placeholder 2">
+            <a:extLst>
+              <a:ext uri="{FF2B5EF4-FFF2-40B4-BE49-F238E27FC236}">
+                <a16:creationId xmlns:a16="http://schemas.microsoft.com/office/drawing/2014/main" id="{3EEC6729-D725-6619-81B8-12E40889E39D}"/>
+              </a:ext>
+            </a:extLst>
+          </p:cNvPr>
+          <p:cNvSpPr>
+            <a:spLocks noGrp="1"/>
+          </p:cNvSpPr>
+          <p:nvPr>
+            <p:ph type="sldNum" sz="quarter" idx="12"/>
+          </p:nvPr>
+        </p:nvSpPr>
+        <p:spPr/>
+        <p:txBody>
+          <a:bodyPr/>
+          <a:lstStyle/>
+          <a:p>
+            <a:fld id="{B9982081-D51A-40C8-8A41-6498517A0DD4}" type="slidenum">
+              <a:rPr lang="en-US" smtClean="0"/>
+              <a:t>12</a:t>
             </a:fld>
             <a:endParaRPr lang="en-US" dirty="0"/>
           </a:p>
@@ -5878,7 +6412,7 @@
 </p:sld>
 </file>
 
-<file path=ppt/slides/slide12.xml><?xml version="1.0" encoding="utf-8"?>
+<file path=ppt/slides/slide13.xml><?xml version="1.0" encoding="utf-8"?>
 <p:sld xmlns:a="http://schemas.openxmlformats.org/drawingml/2006/main" xmlns:r="http://schemas.openxmlformats.org/officeDocument/2006/relationships" xmlns:p="http://schemas.openxmlformats.org/presentationml/2006/main">
   <p:cSld>
     <p:spTree>
@@ -5946,93 +6480,12 @@
           <a:p>
             <a:fld id="{B9982081-D51A-40C8-8A41-6498517A0DD4}" type="slidenum">
               <a:rPr lang="en-US" smtClean="0"/>
-              <a:t>12</a:t>
+              <a:t>13</a:t>
             </a:fld>
             <a:endParaRPr lang="en-US"/>
           </a:p>
         </p:txBody>
       </p:sp>
-      <p:grpSp>
-        <p:nvGrpSpPr>
-          <p:cNvPr id="7" name="Group 6">
-            <a:extLst>
-              <a:ext uri="{FF2B5EF4-FFF2-40B4-BE49-F238E27FC236}">
-                <a16:creationId xmlns:a16="http://schemas.microsoft.com/office/drawing/2014/main" id="{7BCB966A-1876-70DB-1804-BCCC3AF3CEB8}"/>
-              </a:ext>
-            </a:extLst>
-          </p:cNvPr>
-          <p:cNvGrpSpPr/>
-          <p:nvPr/>
-        </p:nvGrpSpPr>
-        <p:grpSpPr>
-          <a:xfrm>
-            <a:off x="0" y="1450178"/>
-            <a:ext cx="10199510" cy="3824817"/>
-            <a:chOff x="160866" y="1028699"/>
-            <a:chExt cx="15544800" cy="5829301"/>
-          </a:xfrm>
-        </p:grpSpPr>
-        <p:pic>
-          <p:nvPicPr>
-            <p:cNvPr id="8" name="Picture 7">
-              <a:extLst>
-                <a:ext uri="{FF2B5EF4-FFF2-40B4-BE49-F238E27FC236}">
-                  <a16:creationId xmlns:a16="http://schemas.microsoft.com/office/drawing/2014/main" id="{DEEFD849-7FE9-0E25-5C4F-3A6A172D8C35}"/>
-                </a:ext>
-              </a:extLst>
-            </p:cNvPr>
-            <p:cNvPicPr>
-              <a:picLocks noChangeAspect="1"/>
-            </p:cNvPicPr>
-            <p:nvPr/>
-          </p:nvPicPr>
-          <p:blipFill>
-            <a:blip r:embed="rId2"/>
-            <a:stretch>
-              <a:fillRect/>
-            </a:stretch>
-          </p:blipFill>
-          <p:spPr>
-            <a:xfrm>
-              <a:off x="160866" y="1028700"/>
-              <a:ext cx="7772400" cy="5829300"/>
-            </a:xfrm>
-            <a:prstGeom prst="rect">
-              <a:avLst/>
-            </a:prstGeom>
-          </p:spPr>
-        </p:pic>
-        <p:pic>
-          <p:nvPicPr>
-            <p:cNvPr id="9" name="Picture 8">
-              <a:extLst>
-                <a:ext uri="{FF2B5EF4-FFF2-40B4-BE49-F238E27FC236}">
-                  <a16:creationId xmlns:a16="http://schemas.microsoft.com/office/drawing/2014/main" id="{5CDAD1ED-D62B-E426-C506-9C7EEE4DA88B}"/>
-                </a:ext>
-              </a:extLst>
-            </p:cNvPr>
-            <p:cNvPicPr>
-              <a:picLocks noChangeAspect="1"/>
-            </p:cNvPicPr>
-            <p:nvPr/>
-          </p:nvPicPr>
-          <p:blipFill>
-            <a:blip r:embed="rId3"/>
-            <a:stretch>
-              <a:fillRect/>
-            </a:stretch>
-          </p:blipFill>
-          <p:spPr>
-            <a:xfrm>
-              <a:off x="7933266" y="1028699"/>
-              <a:ext cx="7772400" cy="5829300"/>
-            </a:xfrm>
-            <a:prstGeom prst="rect">
-              <a:avLst/>
-            </a:prstGeom>
-          </p:spPr>
-        </p:pic>
-      </p:grpSp>
       <p:sp>
         <p:nvSpPr>
           <p:cNvPr id="10" name="TextBox 9">
@@ -6571,6 +7024,87 @@
           </a:p>
         </p:txBody>
       </p:sp>
+      <p:grpSp>
+        <p:nvGrpSpPr>
+          <p:cNvPr id="4" name="Group 3">
+            <a:extLst>
+              <a:ext uri="{FF2B5EF4-FFF2-40B4-BE49-F238E27FC236}">
+                <a16:creationId xmlns:a16="http://schemas.microsoft.com/office/drawing/2014/main" id="{D2BBD3ED-669D-F343-4EB5-23AC12D502BA}"/>
+              </a:ext>
+            </a:extLst>
+          </p:cNvPr>
+          <p:cNvGrpSpPr/>
+          <p:nvPr/>
+        </p:nvGrpSpPr>
+        <p:grpSpPr>
+          <a:xfrm>
+            <a:off x="130635" y="1511141"/>
+            <a:ext cx="10199510" cy="3824817"/>
+            <a:chOff x="160866" y="1028699"/>
+            <a:chExt cx="15544800" cy="5829301"/>
+          </a:xfrm>
+        </p:grpSpPr>
+        <p:pic>
+          <p:nvPicPr>
+            <p:cNvPr id="5" name="Picture 4">
+              <a:extLst>
+                <a:ext uri="{FF2B5EF4-FFF2-40B4-BE49-F238E27FC236}">
+                  <a16:creationId xmlns:a16="http://schemas.microsoft.com/office/drawing/2014/main" id="{17A94417-5EBD-6B7D-80FC-23185A4696FB}"/>
+                </a:ext>
+              </a:extLst>
+            </p:cNvPr>
+            <p:cNvPicPr>
+              <a:picLocks noChangeAspect="1"/>
+            </p:cNvPicPr>
+            <p:nvPr/>
+          </p:nvPicPr>
+          <p:blipFill>
+            <a:blip r:embed="rId6"/>
+            <a:stretch>
+              <a:fillRect/>
+            </a:stretch>
+          </p:blipFill>
+          <p:spPr>
+            <a:xfrm>
+              <a:off x="160866" y="1028700"/>
+              <a:ext cx="7772400" cy="5829300"/>
+            </a:xfrm>
+            <a:prstGeom prst="rect">
+              <a:avLst/>
+            </a:prstGeom>
+          </p:spPr>
+        </p:pic>
+        <p:pic>
+          <p:nvPicPr>
+            <p:cNvPr id="6" name="Picture 5">
+              <a:extLst>
+                <a:ext uri="{FF2B5EF4-FFF2-40B4-BE49-F238E27FC236}">
+                  <a16:creationId xmlns:a16="http://schemas.microsoft.com/office/drawing/2014/main" id="{79DF6768-8063-4490-CE31-C670D1BE1472}"/>
+                </a:ext>
+              </a:extLst>
+            </p:cNvPr>
+            <p:cNvPicPr>
+              <a:picLocks noChangeAspect="1"/>
+            </p:cNvPicPr>
+            <p:nvPr/>
+          </p:nvPicPr>
+          <p:blipFill>
+            <a:blip r:embed="rId7"/>
+            <a:stretch>
+              <a:fillRect/>
+            </a:stretch>
+          </p:blipFill>
+          <p:spPr>
+            <a:xfrm>
+              <a:off x="7933266" y="1028699"/>
+              <a:ext cx="7772400" cy="5829300"/>
+            </a:xfrm>
+            <a:prstGeom prst="rect">
+              <a:avLst/>
+            </a:prstGeom>
+          </p:spPr>
+        </p:pic>
+      </p:grpSp>
     </p:spTree>
     <p:extLst>
       <p:ext uri="{BB962C8B-B14F-4D97-AF65-F5344CB8AC3E}">
@@ -6584,7 +7118,7 @@
 </p:sld>
 </file>
 
-<file path=ppt/slides/slide13.xml><?xml version="1.0" encoding="utf-8"?>
+<file path=ppt/slides/slide14.xml><?xml version="1.0" encoding="utf-8"?>
 <p:sld xmlns:a="http://schemas.openxmlformats.org/drawingml/2006/main" xmlns:r="http://schemas.openxmlformats.org/officeDocument/2006/relationships" xmlns:p="http://schemas.openxmlformats.org/presentationml/2006/main">
   <p:cSld>
     <p:spTree>
@@ -6652,7 +7186,7 @@
           <a:p>
             <a:fld id="{B9982081-D51A-40C8-8A41-6498517A0DD4}" type="slidenum">
               <a:rPr lang="en-US" smtClean="0"/>
-              <a:t>13</a:t>
+              <a:t>14</a:t>
             </a:fld>
             <a:endParaRPr lang="en-US"/>
           </a:p>

</xml_diff>

<commit_message>
scripting update and ppt
</commit_message>
<xml_diff>
--- a/memo.pptx
+++ b/memo.pptx
@@ -5257,7 +5257,7 @@
         <p:spPr>
           <a:xfrm>
             <a:off x="190463" y="1703498"/>
-            <a:ext cx="6511551" cy="4883663"/>
+            <a:ext cx="5000327" cy="3750245"/>
           </a:xfrm>
           <a:prstGeom prst="rect">
             <a:avLst/>
@@ -5278,8 +5278,8 @@
         </p:nvSpPr>
         <p:spPr>
           <a:xfrm>
-            <a:off x="7164593" y="1355464"/>
-            <a:ext cx="3948056" cy="2862322"/>
+            <a:off x="5306802" y="1559987"/>
+            <a:ext cx="6188511" cy="2031325"/>
           </a:xfrm>
           <a:prstGeom prst="rect">
             <a:avLst/>
@@ -5368,72 +5368,104 @@
           </a:p>
         </p:txBody>
       </p:sp>
-      <p:pic>
-        <p:nvPicPr>
-          <p:cNvPr id="13" name="Picture 12">
-            <a:extLst>
-              <a:ext uri="{FF2B5EF4-FFF2-40B4-BE49-F238E27FC236}">
-                <a16:creationId xmlns:a16="http://schemas.microsoft.com/office/drawing/2014/main" id="{269146B5-DA17-4E2E-AE7B-E67AABC2D9DB}"/>
-              </a:ext>
-            </a:extLst>
-          </p:cNvPr>
-          <p:cNvPicPr>
-            <a:picLocks noChangeAspect="1"/>
-          </p:cNvPicPr>
+      <p:grpSp>
+        <p:nvGrpSpPr>
+          <p:cNvPr id="21" name="Group 20">
+            <a:extLst>
+              <a:ext uri="{FF2B5EF4-FFF2-40B4-BE49-F238E27FC236}">
+                <a16:creationId xmlns:a16="http://schemas.microsoft.com/office/drawing/2014/main" id="{03F10711-D6BD-7DF0-812B-A593FAB775BF}"/>
+              </a:ext>
+            </a:extLst>
+          </p:cNvPr>
+          <p:cNvGrpSpPr/>
           <p:nvPr/>
-        </p:nvPicPr>
-        <p:blipFill>
-          <a:blip r:embed="rId5"/>
-          <a:stretch>
-            <a:fillRect/>
-          </a:stretch>
-        </p:blipFill>
-        <p:spPr>
+        </p:nvGrpSpPr>
+        <p:grpSpPr>
           <a:xfrm>
-            <a:off x="6721433" y="4230867"/>
-            <a:ext cx="2514006" cy="1845216"/>
+            <a:off x="5190792" y="3479583"/>
+            <a:ext cx="2580478" cy="1724008"/>
+            <a:chOff x="6721433" y="4230867"/>
+            <a:chExt cx="2761900" cy="1845216"/>
           </a:xfrm>
-          <a:prstGeom prst="rect">
-            <a:avLst/>
-          </a:prstGeom>
-        </p:spPr>
-      </p:pic>
-      <p:pic>
-        <p:nvPicPr>
-          <p:cNvPr id="14" name="Picture 13">
-            <a:extLst>
-              <a:ext uri="{FF2B5EF4-FFF2-40B4-BE49-F238E27FC236}">
-                <a16:creationId xmlns:a16="http://schemas.microsoft.com/office/drawing/2014/main" id="{F0CD071E-678C-C3A7-BD3E-1596A3FB3CEF}"/>
-              </a:ext>
-            </a:extLst>
-          </p:cNvPr>
-          <p:cNvPicPr>
-            <a:picLocks noChangeAspect="1"/>
-          </p:cNvPicPr>
-          <p:nvPr/>
-        </p:nvPicPr>
-        <p:blipFill>
-          <a:blip r:embed="rId6"/>
-          <a:stretch>
-            <a:fillRect/>
-          </a:stretch>
-        </p:blipFill>
-        <p:spPr>
-          <a:xfrm>
-            <a:off x="9254859" y="4217786"/>
-            <a:ext cx="2514006" cy="1858297"/>
-          </a:xfrm>
-          <a:prstGeom prst="rect">
-            <a:avLst/>
-          </a:prstGeom>
-        </p:spPr>
-      </p:pic>
+        </p:grpSpPr>
+        <p:pic>
+          <p:nvPicPr>
+            <p:cNvPr id="13" name="Picture 12">
+              <a:extLst>
+                <a:ext uri="{FF2B5EF4-FFF2-40B4-BE49-F238E27FC236}">
+                  <a16:creationId xmlns:a16="http://schemas.microsoft.com/office/drawing/2014/main" id="{269146B5-DA17-4E2E-AE7B-E67AABC2D9DB}"/>
+                </a:ext>
+              </a:extLst>
+            </p:cNvPr>
+            <p:cNvPicPr>
+              <a:picLocks noChangeAspect="1"/>
+            </p:cNvPicPr>
+            <p:nvPr/>
+          </p:nvPicPr>
+          <p:blipFill>
+            <a:blip r:embed="rId5"/>
+            <a:stretch>
+              <a:fillRect/>
+            </a:stretch>
+          </p:blipFill>
+          <p:spPr>
+            <a:xfrm>
+              <a:off x="6721433" y="4230867"/>
+              <a:ext cx="2514006" cy="1845216"/>
+            </a:xfrm>
+            <a:prstGeom prst="rect">
+              <a:avLst/>
+            </a:prstGeom>
+          </p:spPr>
+        </p:pic>
+        <p:sp>
+          <p:nvSpPr>
+            <p:cNvPr id="15" name="TextBox 14">
+              <a:extLst>
+                <a:ext uri="{FF2B5EF4-FFF2-40B4-BE49-F238E27FC236}">
+                  <a16:creationId xmlns:a16="http://schemas.microsoft.com/office/drawing/2014/main" id="{B9CA9286-60F8-A18A-F23C-4CF1AE56523D}"/>
+                </a:ext>
+              </a:extLst>
+            </p:cNvPr>
+            <p:cNvSpPr txBox="1"/>
+            <p:nvPr/>
+          </p:nvSpPr>
+          <p:spPr>
+            <a:xfrm>
+              <a:off x="8436116" y="4679256"/>
+              <a:ext cx="1047217" cy="625888"/>
+            </a:xfrm>
+            <a:prstGeom prst="rect">
+              <a:avLst/>
+            </a:prstGeom>
+            <a:noFill/>
+          </p:spPr>
+          <p:txBody>
+            <a:bodyPr wrap="square" rtlCol="0">
+              <a:spAutoFit/>
+            </a:bodyPr>
+            <a:lstStyle/>
+            <a:p>
+              <a:r>
+                <a:rPr lang="en-US" sz="1600" dirty="0"/>
+                <a:t>not </a:t>
+              </a:r>
+            </a:p>
+            <a:p>
+              <a:r>
+                <a:rPr lang="en-US" sz="1600" dirty="0"/>
+                <a:t>stable</a:t>
+              </a:r>
+            </a:p>
+          </p:txBody>
+        </p:sp>
+      </p:grpSp>
       <p:sp>
         <p:nvSpPr>
-          <p:cNvPr id="15" name="TextBox 14">
-            <a:extLst>
-              <a:ext uri="{FF2B5EF4-FFF2-40B4-BE49-F238E27FC236}">
-                <a16:creationId xmlns:a16="http://schemas.microsoft.com/office/drawing/2014/main" id="{B9CA9286-60F8-A18A-F23C-4CF1AE56523D}"/>
+          <p:cNvPr id="17" name="TextBox 16">
+            <a:extLst>
+              <a:ext uri="{FF2B5EF4-FFF2-40B4-BE49-F238E27FC236}">
+                <a16:creationId xmlns:a16="http://schemas.microsoft.com/office/drawing/2014/main" id="{13C8176B-60E9-3933-7B0C-39C2C0454006}"/>
               </a:ext>
             </a:extLst>
           </p:cNvPr>
@@ -5442,8 +5474,8 @@
         </p:nvSpPr>
         <p:spPr>
           <a:xfrm>
-            <a:off x="8304558" y="4592936"/>
-            <a:ext cx="1047217" cy="338554"/>
+            <a:off x="8047076" y="5286942"/>
+            <a:ext cx="2743200" cy="830997"/>
           </a:xfrm>
           <a:prstGeom prst="rect">
             <a:avLst/>
@@ -5457,86 +5489,132 @@
           <a:lstStyle/>
           <a:p>
             <a:r>
-              <a:rPr lang="en-US" sz="1600" dirty="0"/>
-              <a:t>unstable</a:t>
-            </a:r>
-          </a:p>
-        </p:txBody>
-      </p:sp>
-      <p:sp>
-        <p:nvSpPr>
-          <p:cNvPr id="17" name="TextBox 16">
-            <a:extLst>
-              <a:ext uri="{FF2B5EF4-FFF2-40B4-BE49-F238E27FC236}">
-                <a16:creationId xmlns:a16="http://schemas.microsoft.com/office/drawing/2014/main" id="{13C8176B-60E9-3933-7B0C-39C2C0454006}"/>
-              </a:ext>
-            </a:extLst>
-          </p:cNvPr>
-          <p:cNvSpPr txBox="1"/>
-          <p:nvPr/>
-        </p:nvSpPr>
-        <p:spPr>
-          <a:xfrm>
-            <a:off x="7065156" y="6125496"/>
-            <a:ext cx="4047493" cy="461665"/>
-          </a:xfrm>
-          <a:prstGeom prst="rect">
-            <a:avLst/>
-          </a:prstGeom>
-          <a:noFill/>
-        </p:spPr>
-        <p:txBody>
-          <a:bodyPr wrap="square" rtlCol="0">
-            <a:spAutoFit/>
-          </a:bodyPr>
-          <a:lstStyle/>
-          <a:p>
-            <a:r>
               <a:rPr lang="en-US" sz="1200" dirty="0">
                 <a:solidFill>
                   <a:srgbClr val="00B050"/>
                 </a:solidFill>
               </a:rPr>
-              <a:t>Flip side is: the more anomalous the cavity, the higher pump the required pump current</a:t>
+              <a:t>Being too normal doesn’t work. However, too anomalous is not good either as a higher pump current is needed to reach the same bandwidth.</a:t>
             </a:r>
           </a:p>
         </p:txBody>
       </p:sp>
-      <p:sp>
-        <p:nvSpPr>
-          <p:cNvPr id="18" name="TextBox 17">
-            <a:extLst>
-              <a:ext uri="{FF2B5EF4-FFF2-40B4-BE49-F238E27FC236}">
-                <a16:creationId xmlns:a16="http://schemas.microsoft.com/office/drawing/2014/main" id="{7A8AA4D6-C257-6E66-12E1-0A7A41EC2D9A}"/>
-              </a:ext>
-            </a:extLst>
-          </p:cNvPr>
-          <p:cNvSpPr txBox="1"/>
+      <p:grpSp>
+        <p:nvGrpSpPr>
+          <p:cNvPr id="22" name="Group 21">
+            <a:extLst>
+              <a:ext uri="{FF2B5EF4-FFF2-40B4-BE49-F238E27FC236}">
+                <a16:creationId xmlns:a16="http://schemas.microsoft.com/office/drawing/2014/main" id="{6B24A61D-47C6-BB19-742E-655ABD8EAB95}"/>
+              </a:ext>
+            </a:extLst>
+          </p:cNvPr>
+          <p:cNvGrpSpPr/>
           <p:nvPr/>
-        </p:nvSpPr>
+        </p:nvGrpSpPr>
+        <p:grpSpPr>
+          <a:xfrm>
+            <a:off x="7704796" y="3479584"/>
+            <a:ext cx="2566255" cy="1736230"/>
+            <a:chOff x="9254859" y="4217786"/>
+            <a:chExt cx="2746678" cy="1858297"/>
+          </a:xfrm>
+        </p:grpSpPr>
+        <p:pic>
+          <p:nvPicPr>
+            <p:cNvPr id="14" name="Picture 13">
+              <a:extLst>
+                <a:ext uri="{FF2B5EF4-FFF2-40B4-BE49-F238E27FC236}">
+                  <a16:creationId xmlns:a16="http://schemas.microsoft.com/office/drawing/2014/main" id="{F0CD071E-678C-C3A7-BD3E-1596A3FB3CEF}"/>
+                </a:ext>
+              </a:extLst>
+            </p:cNvPr>
+            <p:cNvPicPr>
+              <a:picLocks noChangeAspect="1"/>
+            </p:cNvPicPr>
+            <p:nvPr/>
+          </p:nvPicPr>
+          <p:blipFill>
+            <a:blip r:embed="rId6"/>
+            <a:stretch>
+              <a:fillRect/>
+            </a:stretch>
+          </p:blipFill>
+          <p:spPr>
+            <a:xfrm>
+              <a:off x="9254859" y="4217786"/>
+              <a:ext cx="2514006" cy="1858297"/>
+            </a:xfrm>
+            <a:prstGeom prst="rect">
+              <a:avLst/>
+            </a:prstGeom>
+          </p:spPr>
+        </p:pic>
+        <p:sp>
+          <p:nvSpPr>
+            <p:cNvPr id="18" name="TextBox 17">
+              <a:extLst>
+                <a:ext uri="{FF2B5EF4-FFF2-40B4-BE49-F238E27FC236}">
+                  <a16:creationId xmlns:a16="http://schemas.microsoft.com/office/drawing/2014/main" id="{7A8AA4D6-C257-6E66-12E1-0A7A41EC2D9A}"/>
+                </a:ext>
+              </a:extLst>
+            </p:cNvPr>
+            <p:cNvSpPr txBox="1"/>
+            <p:nvPr/>
+          </p:nvSpPr>
+          <p:spPr>
+            <a:xfrm>
+              <a:off x="10954320" y="4592936"/>
+              <a:ext cx="1047217" cy="338554"/>
+            </a:xfrm>
+            <a:prstGeom prst="rect">
+              <a:avLst/>
+            </a:prstGeom>
+            <a:noFill/>
+          </p:spPr>
+          <p:txBody>
+            <a:bodyPr wrap="square" rtlCol="0">
+              <a:spAutoFit/>
+            </a:bodyPr>
+            <a:lstStyle/>
+            <a:p>
+              <a:r>
+                <a:rPr lang="en-US" sz="1600" dirty="0"/>
+                <a:t>stable</a:t>
+              </a:r>
+            </a:p>
+          </p:txBody>
+        </p:sp>
+      </p:grpSp>
+      <p:pic>
+        <p:nvPicPr>
+          <p:cNvPr id="20" name="Picture 19">
+            <a:extLst>
+              <a:ext uri="{FF2B5EF4-FFF2-40B4-BE49-F238E27FC236}">
+                <a16:creationId xmlns:a16="http://schemas.microsoft.com/office/drawing/2014/main" id="{FEDA688B-F9FB-8E4F-3261-8BBD29D35F7E}"/>
+              </a:ext>
+            </a:extLst>
+          </p:cNvPr>
+          <p:cNvPicPr>
+            <a:picLocks noChangeAspect="1"/>
+          </p:cNvPicPr>
+          <p:nvPr/>
+        </p:nvPicPr>
+        <p:blipFill>
+          <a:blip r:embed="rId7"/>
+          <a:stretch>
+            <a:fillRect/>
+          </a:stretch>
+        </p:blipFill>
         <p:spPr>
           <a:xfrm>
-            <a:off x="10954320" y="4592936"/>
-            <a:ext cx="1047217" cy="338554"/>
+            <a:off x="5190790" y="5121770"/>
+            <a:ext cx="2754655" cy="1736230"/>
           </a:xfrm>
           <a:prstGeom prst="rect">
             <a:avLst/>
           </a:prstGeom>
-          <a:noFill/>
         </p:spPr>
-        <p:txBody>
-          <a:bodyPr wrap="square" rtlCol="0">
-            <a:spAutoFit/>
-          </a:bodyPr>
-          <a:lstStyle/>
-          <a:p>
-            <a:r>
-              <a:rPr lang="en-US" sz="1600" dirty="0"/>
-              <a:t>stable</a:t>
-            </a:r>
-          </a:p>
-        </p:txBody>
-      </p:sp>
+      </p:pic>
     </p:spTree>
     <p:extLst>
       <p:ext uri="{BB962C8B-B14F-4D97-AF65-F5344CB8AC3E}">

</xml_diff>